<commit_message>
docs: finishing EXP presentation
</commit_message>
<xml_diff>
--- a/S4/EXP/files/À-t-on encore besoin d'ingénieurs.pptx
+++ b/S4/EXP/files/À-t-on encore besoin d'ingénieurs.pptx
@@ -5,13 +5,19 @@
     <p:sldMasterId id="2147483648" r:id="rId1"/>
   </p:sldMasterIdLst>
   <p:notesMasterIdLst>
-    <p:notesMasterId r:id="rId6"/>
+    <p:notesMasterId r:id="rId12"/>
   </p:notesMasterIdLst>
   <p:sldIdLst>
     <p:sldId id="256" r:id="rId2"/>
     <p:sldId id="257" r:id="rId3"/>
     <p:sldId id="258" r:id="rId4"/>
     <p:sldId id="259" r:id="rId5"/>
+    <p:sldId id="260" r:id="rId6"/>
+    <p:sldId id="261" r:id="rId7"/>
+    <p:sldId id="266" r:id="rId8"/>
+    <p:sldId id="262" r:id="rId9"/>
+    <p:sldId id="264" r:id="rId10"/>
+    <p:sldId id="265" r:id="rId11"/>
   </p:sldIdLst>
   <p:sldSz cx="12192000" cy="6858000"/>
   <p:notesSz cx="6858000" cy="9144000"/>
@@ -121,7 +127,7 @@
 <file path=ppt/revisionInfo.xml><?xml version="1.0" encoding="utf-8"?>
 <p1510:revInfo xmlns:a="http://schemas.openxmlformats.org/drawingml/2006/main" xmlns:r="http://schemas.openxmlformats.org/officeDocument/2006/relationships" xmlns:p1510="http://schemas.microsoft.com/office/powerpoint/2015/10/main">
   <p1510:revLst>
-    <p1510:client id="{ECDFB03D-1764-5B4F-B940-9C9F945837E9}" v="83" dt="2024-05-08T14:39:06.106"/>
+    <p1510:client id="{ECDFB03D-1764-5B4F-B940-9C9F945837E9}" v="211" dt="2024-05-10T09:32:14.428"/>
   </p1510:revLst>
 </p1510:revInfo>
 </file>
@@ -131,18 +137,26 @@
   <pc:docChgLst>
     <pc:chgData name="Trüeb Guillaume" userId="cdddf057-9811-4cdd-8552-6ae0b8a7753d" providerId="ADAL" clId="{ECDFB03D-1764-5B4F-B940-9C9F945837E9}"/>
     <pc:docChg chg="undo custSel addSld delSld modSld">
-      <pc:chgData name="Trüeb Guillaume" userId="cdddf057-9811-4cdd-8552-6ae0b8a7753d" providerId="ADAL" clId="{ECDFB03D-1764-5B4F-B940-9C9F945837E9}" dt="2024-05-08T15:32:10.260" v="346" actId="680"/>
+      <pc:chgData name="Trüeb Guillaume" userId="cdddf057-9811-4cdd-8552-6ae0b8a7753d" providerId="ADAL" clId="{ECDFB03D-1764-5B4F-B940-9C9F945837E9}" dt="2024-05-10T09:32:14.428" v="3952" actId="1076"/>
       <pc:docMkLst>
         <pc:docMk/>
       </pc:docMkLst>
-      <pc:sldChg chg="modSp mod modNotesTx">
-        <pc:chgData name="Trüeb Guillaume" userId="cdddf057-9811-4cdd-8552-6ae0b8a7753d" providerId="ADAL" clId="{ECDFB03D-1764-5B4F-B940-9C9F945837E9}" dt="2024-05-08T15:20:17.588" v="343" actId="20577"/>
+      <pc:sldChg chg="modSp mod setBg modNotesTx">
+        <pc:chgData name="Trüeb Guillaume" userId="cdddf057-9811-4cdd-8552-6ae0b8a7753d" providerId="ADAL" clId="{ECDFB03D-1764-5B4F-B940-9C9F945837E9}" dt="2024-05-10T07:08:03.234" v="3714" actId="113"/>
         <pc:sldMkLst>
           <pc:docMk/>
           <pc:sldMk cId="624417057" sldId="256"/>
         </pc:sldMkLst>
         <pc:spChg chg="mod">
-          <ac:chgData name="Trüeb Guillaume" userId="cdddf057-9811-4cdd-8552-6ae0b8a7753d" providerId="ADAL" clId="{ECDFB03D-1764-5B4F-B940-9C9F945837E9}" dt="2024-05-08T15:11:08.858" v="328" actId="113"/>
+          <ac:chgData name="Trüeb Guillaume" userId="cdddf057-9811-4cdd-8552-6ae0b8a7753d" providerId="ADAL" clId="{ECDFB03D-1764-5B4F-B940-9C9F945837E9}" dt="2024-05-10T07:08:03.234" v="3714" actId="113"/>
+          <ac:spMkLst>
+            <pc:docMk/>
+            <pc:sldMk cId="624417057" sldId="256"/>
+            <ac:spMk id="2" creationId="{BB81C4E9-D116-9039-9821-C867B37DB1CA}"/>
+          </ac:spMkLst>
+        </pc:spChg>
+        <pc:spChg chg="mod">
+          <ac:chgData name="Trüeb Guillaume" userId="cdddf057-9811-4cdd-8552-6ae0b8a7753d" providerId="ADAL" clId="{ECDFB03D-1764-5B4F-B940-9C9F945837E9}" dt="2024-05-09T13:55:31.501" v="425" actId="1076"/>
           <ac:spMkLst>
             <pc:docMk/>
             <pc:sldMk cId="624417057" sldId="256"/>
@@ -150,14 +164,14 @@
           </ac:spMkLst>
         </pc:spChg>
       </pc:sldChg>
-      <pc:sldChg chg="delSp modSp new mod">
-        <pc:chgData name="Trüeb Guillaume" userId="cdddf057-9811-4cdd-8552-6ae0b8a7753d" providerId="ADAL" clId="{ECDFB03D-1764-5B4F-B940-9C9F945837E9}" dt="2024-05-08T14:24:50.004" v="171" actId="403"/>
+      <pc:sldChg chg="delSp modSp new mod setBg">
+        <pc:chgData name="Trüeb Guillaume" userId="cdddf057-9811-4cdd-8552-6ae0b8a7753d" providerId="ADAL" clId="{ECDFB03D-1764-5B4F-B940-9C9F945837E9}" dt="2024-05-09T14:58:43.127" v="3252"/>
         <pc:sldMkLst>
           <pc:docMk/>
           <pc:sldMk cId="3224372592" sldId="257"/>
         </pc:sldMkLst>
         <pc:spChg chg="mod">
-          <ac:chgData name="Trüeb Guillaume" userId="cdddf057-9811-4cdd-8552-6ae0b8a7753d" providerId="ADAL" clId="{ECDFB03D-1764-5B4F-B940-9C9F945837E9}" dt="2024-05-08T14:24:50.004" v="171" actId="403"/>
+          <ac:chgData name="Trüeb Guillaume" userId="cdddf057-9811-4cdd-8552-6ae0b8a7753d" providerId="ADAL" clId="{ECDFB03D-1764-5B4F-B940-9C9F945837E9}" dt="2024-05-09T13:55:10.703" v="421" actId="2711"/>
           <ac:spMkLst>
             <pc:docMk/>
             <pc:sldMk cId="3224372592" sldId="257"/>
@@ -180,14 +194,14 @@
           <pc:sldMk cId="3783827879" sldId="257"/>
         </pc:sldMkLst>
       </pc:sldChg>
-      <pc:sldChg chg="addSp modSp new mod modAnim">
-        <pc:chgData name="Trüeb Guillaume" userId="cdddf057-9811-4cdd-8552-6ae0b8a7753d" providerId="ADAL" clId="{ECDFB03D-1764-5B4F-B940-9C9F945837E9}" dt="2024-05-08T14:39:06.106" v="288" actId="171"/>
+      <pc:sldChg chg="addSp modSp new mod setBg modAnim">
+        <pc:chgData name="Trüeb Guillaume" userId="cdddf057-9811-4cdd-8552-6ae0b8a7753d" providerId="ADAL" clId="{ECDFB03D-1764-5B4F-B940-9C9F945837E9}" dt="2024-05-10T09:22:41.238" v="3909" actId="1076"/>
         <pc:sldMkLst>
           <pc:docMk/>
           <pc:sldMk cId="404715531" sldId="258"/>
         </pc:sldMkLst>
         <pc:spChg chg="add mod">
-          <ac:chgData name="Trüeb Guillaume" userId="cdddf057-9811-4cdd-8552-6ae0b8a7753d" providerId="ADAL" clId="{ECDFB03D-1764-5B4F-B940-9C9F945837E9}" dt="2024-05-08T14:39:06.106" v="288" actId="171"/>
+          <ac:chgData name="Trüeb Guillaume" userId="cdddf057-9811-4cdd-8552-6ae0b8a7753d" providerId="ADAL" clId="{ECDFB03D-1764-5B4F-B940-9C9F945837E9}" dt="2024-05-10T09:22:38.430" v="3908" actId="113"/>
           <ac:spMkLst>
             <pc:docMk/>
             <pc:sldMk cId="404715531" sldId="258"/>
@@ -203,7 +217,7 @@
           </ac:picMkLst>
         </pc:picChg>
         <pc:picChg chg="add mod">
-          <ac:chgData name="Trüeb Guillaume" userId="cdddf057-9811-4cdd-8552-6ae0b8a7753d" providerId="ADAL" clId="{ECDFB03D-1764-5B4F-B940-9C9F945837E9}" dt="2024-05-08T14:38:47.947" v="287" actId="1076"/>
+          <ac:chgData name="Trüeb Guillaume" userId="cdddf057-9811-4cdd-8552-6ae0b8a7753d" providerId="ADAL" clId="{ECDFB03D-1764-5B4F-B940-9C9F945837E9}" dt="2024-05-10T09:22:41.238" v="3909" actId="1076"/>
           <ac:picMkLst>
             <pc:docMk/>
             <pc:sldMk cId="404715531" sldId="258"/>
@@ -211,8 +225,8 @@
           </ac:picMkLst>
         </pc:picChg>
       </pc:sldChg>
-      <pc:sldChg chg="new">
-        <pc:chgData name="Trüeb Guillaume" userId="cdddf057-9811-4cdd-8552-6ae0b8a7753d" providerId="ADAL" clId="{ECDFB03D-1764-5B4F-B940-9C9F945837E9}" dt="2024-05-08T15:32:10.260" v="346" actId="680"/>
+      <pc:sldChg chg="new del">
+        <pc:chgData name="Trüeb Guillaume" userId="cdddf057-9811-4cdd-8552-6ae0b8a7753d" providerId="ADAL" clId="{ECDFB03D-1764-5B4F-B940-9C9F945837E9}" dt="2024-05-09T13:51:30.603" v="347" actId="2696"/>
         <pc:sldMkLst>
           <pc:docMk/>
           <pc:sldMk cId="907941206" sldId="259"/>
@@ -224,6 +238,277 @@
           <pc:docMk/>
           <pc:sldMk cId="1305884459" sldId="259"/>
         </pc:sldMkLst>
+      </pc:sldChg>
+      <pc:sldChg chg="addSp modSp new mod setBg modNotesTx">
+        <pc:chgData name="Trüeb Guillaume" userId="cdddf057-9811-4cdd-8552-6ae0b8a7753d" providerId="ADAL" clId="{ECDFB03D-1764-5B4F-B940-9C9F945837E9}" dt="2024-05-09T15:00:43.432" v="3398" actId="20577"/>
+        <pc:sldMkLst>
+          <pc:docMk/>
+          <pc:sldMk cId="4282326366" sldId="259"/>
+        </pc:sldMkLst>
+        <pc:spChg chg="mod">
+          <ac:chgData name="Trüeb Guillaume" userId="cdddf057-9811-4cdd-8552-6ae0b8a7753d" providerId="ADAL" clId="{ECDFB03D-1764-5B4F-B940-9C9F945837E9}" dt="2024-05-09T13:55:39.873" v="426" actId="2711"/>
+          <ac:spMkLst>
+            <pc:docMk/>
+            <pc:sldMk cId="4282326366" sldId="259"/>
+            <ac:spMk id="2" creationId="{263ACE9E-309A-E09F-75F7-AABC61DAE275}"/>
+          </ac:spMkLst>
+        </pc:spChg>
+        <pc:spChg chg="mod">
+          <ac:chgData name="Trüeb Guillaume" userId="cdddf057-9811-4cdd-8552-6ae0b8a7753d" providerId="ADAL" clId="{ECDFB03D-1764-5B4F-B940-9C9F945837E9}" dt="2024-05-09T14:01:11.326" v="818" actId="20577"/>
+          <ac:spMkLst>
+            <pc:docMk/>
+            <pc:sldMk cId="4282326366" sldId="259"/>
+            <ac:spMk id="3" creationId="{9400B42F-E437-C7AD-9F36-6C8331434BA5}"/>
+          </ac:spMkLst>
+        </pc:spChg>
+        <pc:spChg chg="add mod">
+          <ac:chgData name="Trüeb Guillaume" userId="cdddf057-9811-4cdd-8552-6ae0b8a7753d" providerId="ADAL" clId="{ECDFB03D-1764-5B4F-B940-9C9F945837E9}" dt="2024-05-09T14:55:35.130" v="3143" actId="113"/>
+          <ac:spMkLst>
+            <pc:docMk/>
+            <pc:sldMk cId="4282326366" sldId="259"/>
+            <ac:spMk id="4" creationId="{CBD98510-1BFB-E8AA-3F34-55A0877FE96E}"/>
+          </ac:spMkLst>
+        </pc:spChg>
+      </pc:sldChg>
+      <pc:sldChg chg="addSp delSp modSp new mod setBg">
+        <pc:chgData name="Trüeb Guillaume" userId="cdddf057-9811-4cdd-8552-6ae0b8a7753d" providerId="ADAL" clId="{ECDFB03D-1764-5B4F-B940-9C9F945837E9}" dt="2024-05-09T15:29:47.722" v="3415" actId="20577"/>
+        <pc:sldMkLst>
+          <pc:docMk/>
+          <pc:sldMk cId="2145472797" sldId="260"/>
+        </pc:sldMkLst>
+        <pc:spChg chg="mod">
+          <ac:chgData name="Trüeb Guillaume" userId="cdddf057-9811-4cdd-8552-6ae0b8a7753d" providerId="ADAL" clId="{ECDFB03D-1764-5B4F-B940-9C9F945837E9}" dt="2024-05-09T14:11:09.475" v="989" actId="2711"/>
+          <ac:spMkLst>
+            <pc:docMk/>
+            <pc:sldMk cId="2145472797" sldId="260"/>
+            <ac:spMk id="2" creationId="{F848B694-19D9-6C6D-0A76-4FDAD8D2CEFA}"/>
+          </ac:spMkLst>
+        </pc:spChg>
+        <pc:spChg chg="mod">
+          <ac:chgData name="Trüeb Guillaume" userId="cdddf057-9811-4cdd-8552-6ae0b8a7753d" providerId="ADAL" clId="{ECDFB03D-1764-5B4F-B940-9C9F945837E9}" dt="2024-05-09T15:29:47.722" v="3415" actId="20577"/>
+          <ac:spMkLst>
+            <pc:docMk/>
+            <pc:sldMk cId="2145472797" sldId="260"/>
+            <ac:spMk id="3" creationId="{45B3DDF6-4FFB-672F-3F81-B8CA6F8F5CF8}"/>
+          </ac:spMkLst>
+        </pc:spChg>
+        <pc:spChg chg="add del mod">
+          <ac:chgData name="Trüeb Guillaume" userId="cdddf057-9811-4cdd-8552-6ae0b8a7753d" providerId="ADAL" clId="{ECDFB03D-1764-5B4F-B940-9C9F945837E9}" dt="2024-05-09T14:37:26.855" v="1872" actId="478"/>
+          <ac:spMkLst>
+            <pc:docMk/>
+            <pc:sldMk cId="2145472797" sldId="260"/>
+            <ac:spMk id="4" creationId="{F020537C-CFB1-E2DD-8B43-53BEF452A3D1}"/>
+          </ac:spMkLst>
+        </pc:spChg>
+      </pc:sldChg>
+      <pc:sldChg chg="addSp delSp modSp add mod setBg modNotesTx">
+        <pc:chgData name="Trüeb Guillaume" userId="cdddf057-9811-4cdd-8552-6ae0b8a7753d" providerId="ADAL" clId="{ECDFB03D-1764-5B4F-B940-9C9F945837E9}" dt="2024-05-09T14:58:43.127" v="3252"/>
+        <pc:sldMkLst>
+          <pc:docMk/>
+          <pc:sldMk cId="1876721931" sldId="261"/>
+        </pc:sldMkLst>
+        <pc:spChg chg="mod">
+          <ac:chgData name="Trüeb Guillaume" userId="cdddf057-9811-4cdd-8552-6ae0b8a7753d" providerId="ADAL" clId="{ECDFB03D-1764-5B4F-B940-9C9F945837E9}" dt="2024-05-09T14:44:14.464" v="2002" actId="1076"/>
+          <ac:spMkLst>
+            <pc:docMk/>
+            <pc:sldMk cId="1876721931" sldId="261"/>
+            <ac:spMk id="3" creationId="{45B3DDF6-4FFB-672F-3F81-B8CA6F8F5CF8}"/>
+          </ac:spMkLst>
+        </pc:spChg>
+        <pc:spChg chg="del mod">
+          <ac:chgData name="Trüeb Guillaume" userId="cdddf057-9811-4cdd-8552-6ae0b8a7753d" providerId="ADAL" clId="{ECDFB03D-1764-5B4F-B940-9C9F945837E9}" dt="2024-05-09T14:35:11.584" v="1838" actId="478"/>
+          <ac:spMkLst>
+            <pc:docMk/>
+            <pc:sldMk cId="1876721931" sldId="261"/>
+            <ac:spMk id="4" creationId="{F020537C-CFB1-E2DD-8B43-53BEF452A3D1}"/>
+          </ac:spMkLst>
+        </pc:spChg>
+        <pc:spChg chg="add del mod">
+          <ac:chgData name="Trüeb Guillaume" userId="cdddf057-9811-4cdd-8552-6ae0b8a7753d" providerId="ADAL" clId="{ECDFB03D-1764-5B4F-B940-9C9F945837E9}" dt="2024-05-09T14:35:04.616" v="1836" actId="478"/>
+          <ac:spMkLst>
+            <pc:docMk/>
+            <pc:sldMk cId="1876721931" sldId="261"/>
+            <ac:spMk id="5" creationId="{66159BCB-3EEA-1781-4CCC-FFDA7FEC89E3}"/>
+          </ac:spMkLst>
+        </pc:spChg>
+        <pc:picChg chg="add mod">
+          <ac:chgData name="Trüeb Guillaume" userId="cdddf057-9811-4cdd-8552-6ae0b8a7753d" providerId="ADAL" clId="{ECDFB03D-1764-5B4F-B940-9C9F945837E9}" dt="2024-05-09T14:44:08.913" v="2001" actId="1076"/>
+          <ac:picMkLst>
+            <pc:docMk/>
+            <pc:sldMk cId="1876721931" sldId="261"/>
+            <ac:picMk id="1026" creationId="{D22F999D-A437-757A-54E8-D8473FECE860}"/>
+          </ac:picMkLst>
+        </pc:picChg>
+      </pc:sldChg>
+      <pc:sldChg chg="modSp add mod setBg">
+        <pc:chgData name="Trüeb Guillaume" userId="cdddf057-9811-4cdd-8552-6ae0b8a7753d" providerId="ADAL" clId="{ECDFB03D-1764-5B4F-B940-9C9F945837E9}" dt="2024-05-10T07:07:24.493" v="3713" actId="20577"/>
+        <pc:sldMkLst>
+          <pc:docMk/>
+          <pc:sldMk cId="1763687260" sldId="262"/>
+        </pc:sldMkLst>
+        <pc:spChg chg="mod">
+          <ac:chgData name="Trüeb Guillaume" userId="cdddf057-9811-4cdd-8552-6ae0b8a7753d" providerId="ADAL" clId="{ECDFB03D-1764-5B4F-B940-9C9F945837E9}" dt="2024-05-10T07:07:24.493" v="3713" actId="20577"/>
+          <ac:spMkLst>
+            <pc:docMk/>
+            <pc:sldMk cId="1763687260" sldId="262"/>
+            <ac:spMk id="2" creationId="{86B61A9F-2F2B-04C4-CBC7-30F7120107AF}"/>
+          </ac:spMkLst>
+        </pc:spChg>
+      </pc:sldChg>
+      <pc:sldChg chg="new del">
+        <pc:chgData name="Trüeb Guillaume" userId="cdddf057-9811-4cdd-8552-6ae0b8a7753d" providerId="ADAL" clId="{ECDFB03D-1764-5B4F-B940-9C9F945837E9}" dt="2024-05-09T15:30:52.942" v="3459" actId="2696"/>
+        <pc:sldMkLst>
+          <pc:docMk/>
+          <pc:sldMk cId="780435796" sldId="263"/>
+        </pc:sldMkLst>
+      </pc:sldChg>
+      <pc:sldChg chg="modSp add del mod setBg">
+        <pc:chgData name="Trüeb Guillaume" userId="cdddf057-9811-4cdd-8552-6ae0b8a7753d" providerId="ADAL" clId="{ECDFB03D-1764-5B4F-B940-9C9F945837E9}" dt="2024-05-09T15:30:35.963" v="3456" actId="2696"/>
+        <pc:sldMkLst>
+          <pc:docMk/>
+          <pc:sldMk cId="1507923698" sldId="263"/>
+        </pc:sldMkLst>
+        <pc:spChg chg="mod">
+          <ac:chgData name="Trüeb Guillaume" userId="cdddf057-9811-4cdd-8552-6ae0b8a7753d" providerId="ADAL" clId="{ECDFB03D-1764-5B4F-B940-9C9F945837E9}" dt="2024-05-09T15:30:31.148" v="3454" actId="20577"/>
+          <ac:spMkLst>
+            <pc:docMk/>
+            <pc:sldMk cId="1507923698" sldId="263"/>
+            <ac:spMk id="2" creationId="{86B61A9F-2F2B-04C4-CBC7-30F7120107AF}"/>
+          </ac:spMkLst>
+        </pc:spChg>
+      </pc:sldChg>
+      <pc:sldChg chg="modSp add mod setBg">
+        <pc:chgData name="Trüeb Guillaume" userId="cdddf057-9811-4cdd-8552-6ae0b8a7753d" providerId="ADAL" clId="{ECDFB03D-1764-5B4F-B940-9C9F945837E9}" dt="2024-05-09T15:31:49.366" v="3554" actId="20577"/>
+        <pc:sldMkLst>
+          <pc:docMk/>
+          <pc:sldMk cId="850454818" sldId="264"/>
+        </pc:sldMkLst>
+        <pc:spChg chg="mod">
+          <ac:chgData name="Trüeb Guillaume" userId="cdddf057-9811-4cdd-8552-6ae0b8a7753d" providerId="ADAL" clId="{ECDFB03D-1764-5B4F-B940-9C9F945837E9}" dt="2024-05-09T15:31:01.246" v="3482" actId="20577"/>
+          <ac:spMkLst>
+            <pc:docMk/>
+            <pc:sldMk cId="850454818" sldId="264"/>
+            <ac:spMk id="2" creationId="{BB81C4E9-D116-9039-9821-C867B37DB1CA}"/>
+          </ac:spMkLst>
+        </pc:spChg>
+        <pc:spChg chg="mod">
+          <ac:chgData name="Trüeb Guillaume" userId="cdddf057-9811-4cdd-8552-6ae0b8a7753d" providerId="ADAL" clId="{ECDFB03D-1764-5B4F-B940-9C9F945837E9}" dt="2024-05-09T15:31:49.366" v="3554" actId="20577"/>
+          <ac:spMkLst>
+            <pc:docMk/>
+            <pc:sldMk cId="850454818" sldId="264"/>
+            <ac:spMk id="3" creationId="{F937CF57-DD8D-CC1A-0349-65589F61BAAE}"/>
+          </ac:spMkLst>
+        </pc:spChg>
+      </pc:sldChg>
+      <pc:sldChg chg="addSp delSp modSp add mod setBg">
+        <pc:chgData name="Trüeb Guillaume" userId="cdddf057-9811-4cdd-8552-6ae0b8a7753d" providerId="ADAL" clId="{ECDFB03D-1764-5B4F-B940-9C9F945837E9}" dt="2024-05-10T07:11:54.887" v="3744" actId="20577"/>
+        <pc:sldMkLst>
+          <pc:docMk/>
+          <pc:sldMk cId="1740961636" sldId="265"/>
+        </pc:sldMkLst>
+        <pc:spChg chg="mod">
+          <ac:chgData name="Trüeb Guillaume" userId="cdddf057-9811-4cdd-8552-6ae0b8a7753d" providerId="ADAL" clId="{ECDFB03D-1764-5B4F-B940-9C9F945837E9}" dt="2024-05-09T15:36:15.441" v="3566" actId="20577"/>
+          <ac:spMkLst>
+            <pc:docMk/>
+            <pc:sldMk cId="1740961636" sldId="265"/>
+            <ac:spMk id="2" creationId="{F848B694-19D9-6C6D-0A76-4FDAD8D2CEFA}"/>
+          </ac:spMkLst>
+        </pc:spChg>
+        <pc:spChg chg="mod">
+          <ac:chgData name="Trüeb Guillaume" userId="cdddf057-9811-4cdd-8552-6ae0b8a7753d" providerId="ADAL" clId="{ECDFB03D-1764-5B4F-B940-9C9F945837E9}" dt="2024-05-10T07:11:54.887" v="3744" actId="20577"/>
+          <ac:spMkLst>
+            <pc:docMk/>
+            <pc:sldMk cId="1740961636" sldId="265"/>
+            <ac:spMk id="3" creationId="{45B3DDF6-4FFB-672F-3F81-B8CA6F8F5CF8}"/>
+          </ac:spMkLst>
+        </pc:spChg>
+        <pc:spChg chg="add del mod">
+          <ac:chgData name="Trüeb Guillaume" userId="cdddf057-9811-4cdd-8552-6ae0b8a7753d" providerId="ADAL" clId="{ECDFB03D-1764-5B4F-B940-9C9F945837E9}" dt="2024-05-09T15:40:14.878" v="3663" actId="478"/>
+          <ac:spMkLst>
+            <pc:docMk/>
+            <pc:sldMk cId="1740961636" sldId="265"/>
+            <ac:spMk id="4" creationId="{1DE8D765-D305-A851-EFDD-6FCF79AF29B3}"/>
+          </ac:spMkLst>
+        </pc:spChg>
+      </pc:sldChg>
+      <pc:sldChg chg="addSp delSp modSp add mod modTransition setBg modAnim">
+        <pc:chgData name="Trüeb Guillaume" userId="cdddf057-9811-4cdd-8552-6ae0b8a7753d" providerId="ADAL" clId="{ECDFB03D-1764-5B4F-B940-9C9F945837E9}" dt="2024-05-10T09:32:14.428" v="3952" actId="1076"/>
+        <pc:sldMkLst>
+          <pc:docMk/>
+          <pc:sldMk cId="3828157365" sldId="266"/>
+        </pc:sldMkLst>
+        <pc:spChg chg="mod">
+          <ac:chgData name="Trüeb Guillaume" userId="cdddf057-9811-4cdd-8552-6ae0b8a7753d" providerId="ADAL" clId="{ECDFB03D-1764-5B4F-B940-9C9F945837E9}" dt="2024-05-10T09:32:11.516" v="3951" actId="20577"/>
+          <ac:spMkLst>
+            <pc:docMk/>
+            <pc:sldMk cId="3828157365" sldId="266"/>
+            <ac:spMk id="2" creationId="{152F259D-3A69-D721-DC9E-6385C0E87EB4}"/>
+          </ac:spMkLst>
+        </pc:spChg>
+        <pc:picChg chg="add del">
+          <ac:chgData name="Trüeb Guillaume" userId="cdddf057-9811-4cdd-8552-6ae0b8a7753d" providerId="ADAL" clId="{ECDFB03D-1764-5B4F-B940-9C9F945837E9}" dt="2024-05-10T08:25:25.339" v="3765" actId="478"/>
+          <ac:picMkLst>
+            <pc:docMk/>
+            <pc:sldMk cId="3828157365" sldId="266"/>
+            <ac:picMk id="3" creationId="{3E0EE9FA-0C5D-A223-C0E1-D2915DCCFF64}"/>
+          </ac:picMkLst>
+        </pc:picChg>
+        <pc:picChg chg="add mod">
+          <ac:chgData name="Trüeb Guillaume" userId="cdddf057-9811-4cdd-8552-6ae0b8a7753d" providerId="ADAL" clId="{ECDFB03D-1764-5B4F-B940-9C9F945837E9}" dt="2024-05-10T08:26:14.944" v="3778" actId="18131"/>
+          <ac:picMkLst>
+            <pc:docMk/>
+            <pc:sldMk cId="3828157365" sldId="266"/>
+            <ac:picMk id="4" creationId="{75781E28-499E-AE75-C058-AC3CE8B00C41}"/>
+          </ac:picMkLst>
+        </pc:picChg>
+        <pc:picChg chg="add del">
+          <ac:chgData name="Trüeb Guillaume" userId="cdddf057-9811-4cdd-8552-6ae0b8a7753d" providerId="ADAL" clId="{ECDFB03D-1764-5B4F-B940-9C9F945837E9}" dt="2024-05-10T08:25:27.547" v="3766" actId="478"/>
+          <ac:picMkLst>
+            <pc:docMk/>
+            <pc:sldMk cId="3828157365" sldId="266"/>
+            <ac:picMk id="1026" creationId="{72C1EE31-CFA3-9665-D12F-31DB00D4C8FE}"/>
+          </ac:picMkLst>
+        </pc:picChg>
+        <pc:picChg chg="del">
+          <ac:chgData name="Trüeb Guillaume" userId="cdddf057-9811-4cdd-8552-6ae0b8a7753d" providerId="ADAL" clId="{ECDFB03D-1764-5B4F-B940-9C9F945837E9}" dt="2024-05-10T08:24:23.027" v="3762" actId="478"/>
+          <ac:picMkLst>
+            <pc:docMk/>
+            <pc:sldMk cId="3828157365" sldId="266"/>
+            <ac:picMk id="1028" creationId="{2A7D6FF5-2BF4-4801-CB5A-A425FBE2B002}"/>
+          </ac:picMkLst>
+        </pc:picChg>
+        <pc:picChg chg="add del">
+          <ac:chgData name="Trüeb Guillaume" userId="cdddf057-9811-4cdd-8552-6ae0b8a7753d" providerId="ADAL" clId="{ECDFB03D-1764-5B4F-B940-9C9F945837E9}" dt="2024-05-10T08:33:11.406" v="3835" actId="478"/>
+          <ac:picMkLst>
+            <pc:docMk/>
+            <pc:sldMk cId="3828157365" sldId="266"/>
+            <ac:picMk id="1030" creationId="{DDCB997F-48FE-DB20-2AA6-C9574099A0F9}"/>
+          </ac:picMkLst>
+        </pc:picChg>
+        <pc:picChg chg="add">
+          <ac:chgData name="Trüeb Guillaume" userId="cdddf057-9811-4cdd-8552-6ae0b8a7753d" providerId="ADAL" clId="{ECDFB03D-1764-5B4F-B940-9C9F945837E9}" dt="2024-05-10T09:24:31.449" v="3922"/>
+          <ac:picMkLst>
+            <pc:docMk/>
+            <pc:sldMk cId="3828157365" sldId="266"/>
+            <ac:picMk id="1032" creationId="{1FF36CF2-F02D-6DC5-3E81-F506A94F0372}"/>
+          </ac:picMkLst>
+        </pc:picChg>
+        <pc:picChg chg="add del mod">
+          <ac:chgData name="Trüeb Guillaume" userId="cdddf057-9811-4cdd-8552-6ae0b8a7753d" providerId="ADAL" clId="{ECDFB03D-1764-5B4F-B940-9C9F945837E9}" dt="2024-05-10T09:31:12.124" v="3938" actId="478"/>
+          <ac:picMkLst>
+            <pc:docMk/>
+            <pc:sldMk cId="3828157365" sldId="266"/>
+            <ac:picMk id="1034" creationId="{D401D750-F17D-386A-5419-B42289C01568}"/>
+          </ac:picMkLst>
+        </pc:picChg>
+        <pc:picChg chg="add mod">
+          <ac:chgData name="Trüeb Guillaume" userId="cdddf057-9811-4cdd-8552-6ae0b8a7753d" providerId="ADAL" clId="{ECDFB03D-1764-5B4F-B940-9C9F945837E9}" dt="2024-05-10T09:32:14.428" v="3952" actId="1076"/>
+          <ac:picMkLst>
+            <pc:docMk/>
+            <pc:sldMk cId="3828157365" sldId="266"/>
+            <ac:picMk id="1036" creationId="{A09EA611-EB0D-2DE7-3BA5-791058826AFD}"/>
+          </ac:picMkLst>
+        </pc:picChg>
       </pc:sldChg>
     </pc:docChg>
   </pc:docChgLst>
@@ -311,7 +596,7 @@
           </a:lstStyle>
           <a:p>
             <a:fld id="{E2C0E638-932B-6049-A64B-454D3CE5F309}" type="datetimeFigureOut">
-              <a:t>08/05/2024</a:t>
+              <a:t>10/05/2024</a:t>
             </a:fld>
             <a:endParaRPr lang="fr-FR"/>
           </a:p>
@@ -689,6 +974,894 @@
 </p:notes>
 </file>
 
+<file path=ppt/notesSlides/notesSlide2.xml><?xml version="1.0" encoding="utf-8"?>
+<p:notes xmlns:a="http://schemas.openxmlformats.org/drawingml/2006/main" xmlns:r="http://schemas.openxmlformats.org/officeDocument/2006/relationships" xmlns:p="http://schemas.openxmlformats.org/presentationml/2006/main">
+  <p:cSld>
+    <p:spTree>
+      <p:nvGrpSpPr>
+        <p:cNvPr id="1" name=""/>
+        <p:cNvGrpSpPr/>
+        <p:nvPr/>
+      </p:nvGrpSpPr>
+      <p:grpSpPr>
+        <a:xfrm>
+          <a:off x="0" y="0"/>
+          <a:ext cx="0" cy="0"/>
+          <a:chOff x="0" y="0"/>
+          <a:chExt cx="0" cy="0"/>
+        </a:xfrm>
+      </p:grpSpPr>
+      <p:sp>
+        <p:nvSpPr>
+          <p:cNvPr id="2" name="Espace réservé de l'image des diapositives 1"/>
+          <p:cNvSpPr>
+            <a:spLocks noGrp="1" noRot="1" noChangeAspect="1"/>
+          </p:cNvSpPr>
+          <p:nvPr>
+            <p:ph type="sldImg"/>
+          </p:nvPr>
+        </p:nvSpPr>
+        <p:spPr/>
+      </p:sp>
+      <p:sp>
+        <p:nvSpPr>
+          <p:cNvPr id="3" name="Espace réservé des notes 2"/>
+          <p:cNvSpPr>
+            <a:spLocks noGrp="1"/>
+          </p:cNvSpPr>
+          <p:nvPr>
+            <p:ph type="body" idx="1"/>
+          </p:nvPr>
+        </p:nvSpPr>
+        <p:spPr/>
+        <p:txBody>
+          <a:bodyPr/>
+          <a:lstStyle/>
+          <a:p>
+            <a:endParaRPr lang="fr-FR"/>
+          </a:p>
+        </p:txBody>
+      </p:sp>
+      <p:sp>
+        <p:nvSpPr>
+          <p:cNvPr id="4" name="Espace réservé du numéro de diapositive 3"/>
+          <p:cNvSpPr>
+            <a:spLocks noGrp="1"/>
+          </p:cNvSpPr>
+          <p:nvPr>
+            <p:ph type="sldNum" sz="quarter" idx="5"/>
+          </p:nvPr>
+        </p:nvSpPr>
+        <p:spPr/>
+        <p:txBody>
+          <a:bodyPr/>
+          <a:lstStyle/>
+          <a:p>
+            <a:fld id="{441A04F3-E4AD-AF49-AAD8-1609614BC998}" type="slidenum">
+              <a:rPr lang="fr-CH"/>
+              <a:t>3</a:t>
+            </a:fld>
+            <a:endParaRPr lang="fr-CH"/>
+          </a:p>
+        </p:txBody>
+      </p:sp>
+    </p:spTree>
+    <p:extLst>
+      <p:ext uri="{BB962C8B-B14F-4D97-AF65-F5344CB8AC3E}">
+        <p14:creationId xmlns:p14="http://schemas.microsoft.com/office/powerpoint/2010/main" val="1559332868"/>
+      </p:ext>
+    </p:extLst>
+  </p:cSld>
+  <p:clrMapOvr>
+    <a:masterClrMapping/>
+  </p:clrMapOvr>
+</p:notes>
+</file>
+
+<file path=ppt/notesSlides/notesSlide3.xml><?xml version="1.0" encoding="utf-8"?>
+<p:notes xmlns:a="http://schemas.openxmlformats.org/drawingml/2006/main" xmlns:r="http://schemas.openxmlformats.org/officeDocument/2006/relationships" xmlns:p="http://schemas.openxmlformats.org/presentationml/2006/main">
+  <p:cSld>
+    <p:spTree>
+      <p:nvGrpSpPr>
+        <p:cNvPr id="1" name=""/>
+        <p:cNvGrpSpPr/>
+        <p:nvPr/>
+      </p:nvGrpSpPr>
+      <p:grpSpPr>
+        <a:xfrm>
+          <a:off x="0" y="0"/>
+          <a:ext cx="0" cy="0"/>
+          <a:chOff x="0" y="0"/>
+          <a:chExt cx="0" cy="0"/>
+        </a:xfrm>
+      </p:grpSpPr>
+      <p:sp>
+        <p:nvSpPr>
+          <p:cNvPr id="2" name="Espace réservé de l'image des diapositives 1"/>
+          <p:cNvSpPr>
+            <a:spLocks noGrp="1" noRot="1" noChangeAspect="1"/>
+          </p:cNvSpPr>
+          <p:nvPr>
+            <p:ph type="sldImg"/>
+          </p:nvPr>
+        </p:nvSpPr>
+        <p:spPr/>
+      </p:sp>
+      <p:sp>
+        <p:nvSpPr>
+          <p:cNvPr id="3" name="Espace réservé des notes 2"/>
+          <p:cNvSpPr>
+            <a:spLocks noGrp="1"/>
+          </p:cNvSpPr>
+          <p:nvPr>
+            <p:ph type="body" idx="1"/>
+          </p:nvPr>
+        </p:nvSpPr>
+        <p:spPr/>
+        <p:txBody>
+          <a:bodyPr/>
+          <a:lstStyle/>
+          <a:p>
+            <a:r>
+              <a:rPr lang="fr-FR"/>
+              <a:t>Approche actuelle énormément basée sur la résolution technique du problème et encore trop peu de réfléxion sur le système.</a:t>
+            </a:r>
+          </a:p>
+        </p:txBody>
+      </p:sp>
+      <p:sp>
+        <p:nvSpPr>
+          <p:cNvPr id="4" name="Espace réservé du numéro de diapositive 3"/>
+          <p:cNvSpPr>
+            <a:spLocks noGrp="1"/>
+          </p:cNvSpPr>
+          <p:nvPr>
+            <p:ph type="sldNum" sz="quarter" idx="5"/>
+          </p:nvPr>
+        </p:nvSpPr>
+        <p:spPr/>
+        <p:txBody>
+          <a:bodyPr/>
+          <a:lstStyle/>
+          <a:p>
+            <a:fld id="{441A04F3-E4AD-AF49-AAD8-1609614BC998}" type="slidenum">
+              <a:rPr lang="fr-CH"/>
+              <a:t>4</a:t>
+            </a:fld>
+            <a:endParaRPr lang="fr-CH"/>
+          </a:p>
+        </p:txBody>
+      </p:sp>
+    </p:spTree>
+    <p:extLst>
+      <p:ext uri="{BB962C8B-B14F-4D97-AF65-F5344CB8AC3E}">
+        <p14:creationId xmlns:p14="http://schemas.microsoft.com/office/powerpoint/2010/main" val="2401750436"/>
+      </p:ext>
+    </p:extLst>
+  </p:cSld>
+  <p:clrMapOvr>
+    <a:masterClrMapping/>
+  </p:clrMapOvr>
+</p:notes>
+</file>
+
+<file path=ppt/notesSlides/notesSlide4.xml><?xml version="1.0" encoding="utf-8"?>
+<p:notes xmlns:a="http://schemas.openxmlformats.org/drawingml/2006/main" xmlns:r="http://schemas.openxmlformats.org/officeDocument/2006/relationships" xmlns:p="http://schemas.openxmlformats.org/presentationml/2006/main">
+  <p:cSld>
+    <p:spTree>
+      <p:nvGrpSpPr>
+        <p:cNvPr id="1" name=""/>
+        <p:cNvGrpSpPr/>
+        <p:nvPr/>
+      </p:nvGrpSpPr>
+      <p:grpSpPr>
+        <a:xfrm>
+          <a:off x="0" y="0"/>
+          <a:ext cx="0" cy="0"/>
+          <a:chOff x="0" y="0"/>
+          <a:chExt cx="0" cy="0"/>
+        </a:xfrm>
+      </p:grpSpPr>
+      <p:sp>
+        <p:nvSpPr>
+          <p:cNvPr id="2" name="Espace réservé de l'image des diapositives 1"/>
+          <p:cNvSpPr>
+            <a:spLocks noGrp="1" noRot="1" noChangeAspect="1"/>
+          </p:cNvSpPr>
+          <p:nvPr>
+            <p:ph type="sldImg"/>
+          </p:nvPr>
+        </p:nvSpPr>
+        <p:spPr/>
+      </p:sp>
+      <p:sp>
+        <p:nvSpPr>
+          <p:cNvPr id="3" name="Espace réservé des notes 2"/>
+          <p:cNvSpPr>
+            <a:spLocks noGrp="1"/>
+          </p:cNvSpPr>
+          <p:nvPr>
+            <p:ph type="body" idx="1"/>
+          </p:nvPr>
+        </p:nvSpPr>
+        <p:spPr/>
+        <p:txBody>
+          <a:bodyPr/>
+          <a:lstStyle/>
+          <a:p>
+            <a:endParaRPr lang="fr-FR"/>
+          </a:p>
+        </p:txBody>
+      </p:sp>
+      <p:sp>
+        <p:nvSpPr>
+          <p:cNvPr id="4" name="Espace réservé du numéro de diapositive 3"/>
+          <p:cNvSpPr>
+            <a:spLocks noGrp="1"/>
+          </p:cNvSpPr>
+          <p:nvPr>
+            <p:ph type="sldNum" sz="quarter" idx="5"/>
+          </p:nvPr>
+        </p:nvSpPr>
+        <p:spPr/>
+        <p:txBody>
+          <a:bodyPr/>
+          <a:lstStyle/>
+          <a:p>
+            <a:fld id="{441A04F3-E4AD-AF49-AAD8-1609614BC998}" type="slidenum">
+              <a:rPr lang="fr-CH"/>
+              <a:t>5</a:t>
+            </a:fld>
+            <a:endParaRPr lang="fr-CH"/>
+          </a:p>
+        </p:txBody>
+      </p:sp>
+    </p:spTree>
+    <p:extLst>
+      <p:ext uri="{BB962C8B-B14F-4D97-AF65-F5344CB8AC3E}">
+        <p14:creationId xmlns:p14="http://schemas.microsoft.com/office/powerpoint/2010/main" val="2871976654"/>
+      </p:ext>
+    </p:extLst>
+  </p:cSld>
+  <p:clrMapOvr>
+    <a:masterClrMapping/>
+  </p:clrMapOvr>
+</p:notes>
+</file>
+
+<file path=ppt/notesSlides/notesSlide5.xml><?xml version="1.0" encoding="utf-8"?>
+<p:notes xmlns:a="http://schemas.openxmlformats.org/drawingml/2006/main" xmlns:r="http://schemas.openxmlformats.org/officeDocument/2006/relationships" xmlns:p="http://schemas.openxmlformats.org/presentationml/2006/main">
+  <p:cSld>
+    <p:spTree>
+      <p:nvGrpSpPr>
+        <p:cNvPr id="1" name=""/>
+        <p:cNvGrpSpPr/>
+        <p:nvPr/>
+      </p:nvGrpSpPr>
+      <p:grpSpPr>
+        <a:xfrm>
+          <a:off x="0" y="0"/>
+          <a:ext cx="0" cy="0"/>
+          <a:chOff x="0" y="0"/>
+          <a:chExt cx="0" cy="0"/>
+        </a:xfrm>
+      </p:grpSpPr>
+      <p:sp>
+        <p:nvSpPr>
+          <p:cNvPr id="2" name="Espace réservé de l'image des diapositives 1"/>
+          <p:cNvSpPr>
+            <a:spLocks noGrp="1" noRot="1" noChangeAspect="1"/>
+          </p:cNvSpPr>
+          <p:nvPr>
+            <p:ph type="sldImg"/>
+          </p:nvPr>
+        </p:nvSpPr>
+        <p:spPr/>
+      </p:sp>
+      <p:sp>
+        <p:nvSpPr>
+          <p:cNvPr id="3" name="Espace réservé des notes 2"/>
+          <p:cNvSpPr>
+            <a:spLocks noGrp="1"/>
+          </p:cNvSpPr>
+          <p:nvPr>
+            <p:ph type="body" idx="1"/>
+          </p:nvPr>
+        </p:nvSpPr>
+        <p:spPr/>
+        <p:txBody>
+          <a:bodyPr/>
+          <a:lstStyle/>
+          <a:p>
+            <a:pPr marL="0" marR="0" lvl="0" indent="0" algn="l" defTabSz="914400" rtl="0" eaLnBrk="1" fontAlgn="auto" latinLnBrk="0" hangingPunct="1">
+              <a:lnSpc>
+                <a:spcPct val="100000"/>
+              </a:lnSpc>
+              <a:spcBef>
+                <a:spcPts val="0"/>
+              </a:spcBef>
+              <a:spcAft>
+                <a:spcPts val="0"/>
+              </a:spcAft>
+              <a:buClrTx/>
+              <a:buSzTx/>
+              <a:buFontTx/>
+              <a:buNone/>
+              <a:tabLst/>
+              <a:defRPr/>
+            </a:pPr>
+            <a:r>
+              <a:rPr lang="fr-FR" b="1">
+                <a:latin typeface="Roboto" panose="02000000000000000000" pitchFamily="2" charset="0"/>
+                <a:ea typeface="Roboto" panose="02000000000000000000" pitchFamily="2" charset="0"/>
+                <a:cs typeface="Roboto" panose="02000000000000000000" pitchFamily="2" charset="0"/>
+              </a:rPr>
+              <a:t>12. Constantes, paramètres et nombres</a:t>
+            </a:r>
+          </a:p>
+          <a:p>
+            <a:pPr marL="171450" marR="0" lvl="0" indent="-171450" algn="l" defTabSz="914400" rtl="0" eaLnBrk="1" fontAlgn="auto" latinLnBrk="0" hangingPunct="1">
+              <a:lnSpc>
+                <a:spcPct val="100000"/>
+              </a:lnSpc>
+              <a:spcBef>
+                <a:spcPts val="0"/>
+              </a:spcBef>
+              <a:spcAft>
+                <a:spcPts val="0"/>
+              </a:spcAft>
+              <a:buClrTx/>
+              <a:buSzTx/>
+              <a:buFontTx/>
+              <a:buChar char="-"/>
+              <a:tabLst/>
+              <a:defRPr/>
+            </a:pPr>
+            <a:r>
+              <a:rPr lang="fr-FR" b="0">
+                <a:latin typeface="Roboto" panose="02000000000000000000" pitchFamily="2" charset="0"/>
+                <a:ea typeface="Roboto" panose="02000000000000000000" pitchFamily="2" charset="0"/>
+                <a:cs typeface="Roboto" panose="02000000000000000000" pitchFamily="2" charset="0"/>
+              </a:rPr>
+              <a:t>Point d’appui offrant le levier le plus faible alors que souvent pensé comme le plus important (représente la majorité de nos efforts)</a:t>
+            </a:r>
+          </a:p>
+          <a:p>
+            <a:pPr marL="171450" marR="0" lvl="0" indent="-171450" algn="l" defTabSz="914400" rtl="0" eaLnBrk="1" fontAlgn="auto" latinLnBrk="0" hangingPunct="1">
+              <a:lnSpc>
+                <a:spcPct val="100000"/>
+              </a:lnSpc>
+              <a:spcBef>
+                <a:spcPts val="0"/>
+              </a:spcBef>
+              <a:spcAft>
+                <a:spcPts val="0"/>
+              </a:spcAft>
+              <a:buClrTx/>
+              <a:buSzTx/>
+              <a:buFontTx/>
+              <a:buChar char="-"/>
+              <a:tabLst/>
+              <a:defRPr/>
+            </a:pPr>
+            <a:r>
+              <a:rPr lang="fr-FR" b="0">
+                <a:latin typeface="Roboto" panose="02000000000000000000" pitchFamily="2" charset="0"/>
+                <a:ea typeface="Roboto" panose="02000000000000000000" pitchFamily="2" charset="0"/>
+                <a:cs typeface="Roboto" panose="02000000000000000000" pitchFamily="2" charset="0"/>
+              </a:rPr>
+              <a:t>Exemple d’un lac, les paramètres tel que hauteur des précipitations, temperature de l’eau ne modifie que peu le comportement général du lac</a:t>
+            </a:r>
+          </a:p>
+          <a:p>
+            <a:pPr marL="0" marR="0" lvl="0" indent="0" algn="l" defTabSz="914400" rtl="0" eaLnBrk="1" fontAlgn="auto" latinLnBrk="0" hangingPunct="1">
+              <a:lnSpc>
+                <a:spcPct val="100000"/>
+              </a:lnSpc>
+              <a:spcBef>
+                <a:spcPts val="0"/>
+              </a:spcBef>
+              <a:spcAft>
+                <a:spcPts val="0"/>
+              </a:spcAft>
+              <a:buClrTx/>
+              <a:buSzTx/>
+              <a:buFontTx/>
+              <a:buNone/>
+              <a:tabLst/>
+              <a:defRPr/>
+            </a:pPr>
+            <a:endParaRPr lang="fr-FR" b="1">
+              <a:latin typeface="Roboto" panose="02000000000000000000" pitchFamily="2" charset="0"/>
+              <a:ea typeface="Roboto" panose="02000000000000000000" pitchFamily="2" charset="0"/>
+              <a:cs typeface="Roboto" panose="02000000000000000000" pitchFamily="2" charset="0"/>
+            </a:endParaRPr>
+          </a:p>
+          <a:p>
+            <a:pPr marL="0" marR="0" lvl="0" indent="0" algn="l" defTabSz="914400" rtl="0" eaLnBrk="1" fontAlgn="auto" latinLnBrk="0" hangingPunct="1">
+              <a:lnSpc>
+                <a:spcPct val="100000"/>
+              </a:lnSpc>
+              <a:spcBef>
+                <a:spcPts val="0"/>
+              </a:spcBef>
+              <a:spcAft>
+                <a:spcPts val="0"/>
+              </a:spcAft>
+              <a:buClrTx/>
+              <a:buSzTx/>
+              <a:buFontTx/>
+              <a:buNone/>
+              <a:tabLst/>
+              <a:defRPr/>
+            </a:pPr>
+            <a:r>
+              <a:rPr lang="fr-FR" b="1">
+                <a:latin typeface="Roboto" panose="02000000000000000000" pitchFamily="2" charset="0"/>
+                <a:ea typeface="Roboto" panose="02000000000000000000" pitchFamily="2" charset="0"/>
+                <a:cs typeface="Roboto" panose="02000000000000000000" pitchFamily="2" charset="0"/>
+              </a:rPr>
+              <a:t>3. Objectif du système</a:t>
+            </a:r>
+            <a:br>
+              <a:rPr lang="fr-FR" b="1">
+                <a:latin typeface="Roboto" panose="02000000000000000000" pitchFamily="2" charset="0"/>
+                <a:ea typeface="Roboto" panose="02000000000000000000" pitchFamily="2" charset="0"/>
+                <a:cs typeface="Roboto" panose="02000000000000000000" pitchFamily="2" charset="0"/>
+              </a:rPr>
+            </a:br>
+            <a:r>
+              <a:rPr lang="fr-FR" b="0">
+                <a:latin typeface="Roboto" panose="02000000000000000000" pitchFamily="2" charset="0"/>
+                <a:ea typeface="Roboto" panose="02000000000000000000" pitchFamily="2" charset="0"/>
+                <a:cs typeface="Roboto" panose="02000000000000000000" pitchFamily="2" charset="0"/>
+              </a:rPr>
+              <a:t>- Point sur lequel nous ingénieurs n’ont pas trop notre mot à dire de base mais ce sur quoi il serait important d’agir</a:t>
+            </a:r>
+          </a:p>
+          <a:p>
+            <a:pPr marL="171450" marR="0" lvl="0" indent="-171450" algn="l" defTabSz="914400" rtl="0" eaLnBrk="1" fontAlgn="auto" latinLnBrk="0" hangingPunct="1">
+              <a:lnSpc>
+                <a:spcPct val="100000"/>
+              </a:lnSpc>
+              <a:spcBef>
+                <a:spcPts val="0"/>
+              </a:spcBef>
+              <a:spcAft>
+                <a:spcPts val="0"/>
+              </a:spcAft>
+              <a:buClrTx/>
+              <a:buSzTx/>
+              <a:buFontTx/>
+              <a:buChar char="-"/>
+              <a:tabLst/>
+              <a:defRPr/>
+            </a:pPr>
+            <a:r>
+              <a:rPr lang="fr-FR" b="0">
+                <a:latin typeface="Roboto" panose="02000000000000000000" pitchFamily="2" charset="0"/>
+                <a:ea typeface="Roboto" panose="02000000000000000000" pitchFamily="2" charset="0"/>
+                <a:cs typeface="Roboto" panose="02000000000000000000" pitchFamily="2" charset="0"/>
+              </a:rPr>
+              <a:t>Modifier l’objectif du lac en le transformant en une zone naturelle protégée qu’il est interdit d’exploiter dans le sens monétaire du terme</a:t>
+            </a:r>
+            <a:endParaRPr lang="fr-FR" b="1">
+              <a:latin typeface="Roboto" panose="02000000000000000000" pitchFamily="2" charset="0"/>
+              <a:ea typeface="Roboto" panose="02000000000000000000" pitchFamily="2" charset="0"/>
+              <a:cs typeface="Roboto" panose="02000000000000000000" pitchFamily="2" charset="0"/>
+            </a:endParaRPr>
+          </a:p>
+          <a:p>
+            <a:pPr marL="0" marR="0" lvl="0" indent="0" algn="l" defTabSz="914400" rtl="0" eaLnBrk="1" fontAlgn="auto" latinLnBrk="0" hangingPunct="1">
+              <a:lnSpc>
+                <a:spcPct val="100000"/>
+              </a:lnSpc>
+              <a:spcBef>
+                <a:spcPts val="0"/>
+              </a:spcBef>
+              <a:spcAft>
+                <a:spcPts val="0"/>
+              </a:spcAft>
+              <a:buClrTx/>
+              <a:buSzTx/>
+              <a:buFontTx/>
+              <a:buNone/>
+              <a:tabLst/>
+              <a:defRPr/>
+            </a:pPr>
+            <a:endParaRPr lang="fr-FR" b="1">
+              <a:latin typeface="Roboto" panose="02000000000000000000" pitchFamily="2" charset="0"/>
+              <a:ea typeface="Roboto" panose="02000000000000000000" pitchFamily="2" charset="0"/>
+              <a:cs typeface="Roboto" panose="02000000000000000000" pitchFamily="2" charset="0"/>
+            </a:endParaRPr>
+          </a:p>
+          <a:p>
+            <a:pPr marL="0" marR="0" lvl="0" indent="0" algn="l" defTabSz="914400" rtl="0" eaLnBrk="1" fontAlgn="auto" latinLnBrk="0" hangingPunct="1">
+              <a:lnSpc>
+                <a:spcPct val="100000"/>
+              </a:lnSpc>
+              <a:spcBef>
+                <a:spcPts val="0"/>
+              </a:spcBef>
+              <a:spcAft>
+                <a:spcPts val="0"/>
+              </a:spcAft>
+              <a:buClrTx/>
+              <a:buSzTx/>
+              <a:buFontTx/>
+              <a:buNone/>
+              <a:tabLst/>
+              <a:defRPr/>
+            </a:pPr>
+            <a:r>
+              <a:rPr lang="fr-FR" b="1">
+                <a:latin typeface="Roboto" panose="02000000000000000000" pitchFamily="2" charset="0"/>
+                <a:ea typeface="Roboto" panose="02000000000000000000" pitchFamily="2" charset="0"/>
+                <a:cs typeface="Roboto" panose="02000000000000000000" pitchFamily="2" charset="0"/>
+              </a:rPr>
+              <a:t>1. Transcender les paradigmes</a:t>
+            </a:r>
+            <a:br>
+              <a:rPr lang="fr-FR" b="1">
+                <a:latin typeface="Roboto" panose="02000000000000000000" pitchFamily="2" charset="0"/>
+                <a:ea typeface="Roboto" panose="02000000000000000000" pitchFamily="2" charset="0"/>
+                <a:cs typeface="Roboto" panose="02000000000000000000" pitchFamily="2" charset="0"/>
+              </a:rPr>
+            </a:br>
+            <a:r>
+              <a:rPr lang="fr-FR" b="0">
+                <a:latin typeface="Roboto" panose="02000000000000000000" pitchFamily="2" charset="0"/>
+                <a:ea typeface="Roboto" panose="02000000000000000000" pitchFamily="2" charset="0"/>
+                <a:cs typeface="Roboto" panose="02000000000000000000" pitchFamily="2" charset="0"/>
+              </a:rPr>
+              <a:t>- Revoir notre modèle symbolique et nos indicateur de réussite</a:t>
+            </a:r>
+          </a:p>
+          <a:p>
+            <a:pPr marL="0" marR="0" lvl="0" indent="0" algn="l" defTabSz="914400" rtl="0" eaLnBrk="1" fontAlgn="auto" latinLnBrk="0" hangingPunct="1">
+              <a:lnSpc>
+                <a:spcPct val="100000"/>
+              </a:lnSpc>
+              <a:spcBef>
+                <a:spcPts val="0"/>
+              </a:spcBef>
+              <a:spcAft>
+                <a:spcPts val="0"/>
+              </a:spcAft>
+              <a:buClrTx/>
+              <a:buSzTx/>
+              <a:buFontTx/>
+              <a:buNone/>
+              <a:tabLst/>
+              <a:defRPr/>
+            </a:pPr>
+            <a:r>
+              <a:rPr lang="fr-FR" b="0">
+                <a:latin typeface="Roboto" panose="02000000000000000000" pitchFamily="2" charset="0"/>
+                <a:ea typeface="Roboto" panose="02000000000000000000" pitchFamily="2" charset="0"/>
+                <a:cs typeface="Roboto" panose="02000000000000000000" pitchFamily="2" charset="0"/>
+              </a:rPr>
+              <a:t>- Ne plus voir la nature comme un stock de ressources à transformer pour nos besoins</a:t>
+            </a:r>
+          </a:p>
+        </p:txBody>
+      </p:sp>
+      <p:sp>
+        <p:nvSpPr>
+          <p:cNvPr id="4" name="Espace réservé du numéro de diapositive 3"/>
+          <p:cNvSpPr>
+            <a:spLocks noGrp="1"/>
+          </p:cNvSpPr>
+          <p:nvPr>
+            <p:ph type="sldNum" sz="quarter" idx="5"/>
+          </p:nvPr>
+        </p:nvSpPr>
+        <p:spPr/>
+        <p:txBody>
+          <a:bodyPr/>
+          <a:lstStyle/>
+          <a:p>
+            <a:fld id="{441A04F3-E4AD-AF49-AAD8-1609614BC998}" type="slidenum">
+              <a:rPr lang="fr-CH"/>
+              <a:t>6</a:t>
+            </a:fld>
+            <a:endParaRPr lang="fr-CH"/>
+          </a:p>
+        </p:txBody>
+      </p:sp>
+    </p:spTree>
+    <p:extLst>
+      <p:ext uri="{BB962C8B-B14F-4D97-AF65-F5344CB8AC3E}">
+        <p14:creationId xmlns:p14="http://schemas.microsoft.com/office/powerpoint/2010/main" val="1632803851"/>
+      </p:ext>
+    </p:extLst>
+  </p:cSld>
+  <p:clrMapOvr>
+    <a:masterClrMapping/>
+  </p:clrMapOvr>
+</p:notes>
+</file>
+
+<file path=ppt/notesSlides/notesSlide6.xml><?xml version="1.0" encoding="utf-8"?>
+<p:notes xmlns:a="http://schemas.openxmlformats.org/drawingml/2006/main" xmlns:r="http://schemas.openxmlformats.org/officeDocument/2006/relationships" xmlns:p="http://schemas.openxmlformats.org/presentationml/2006/main">
+  <p:cSld>
+    <p:spTree>
+      <p:nvGrpSpPr>
+        <p:cNvPr id="1" name=""/>
+        <p:cNvGrpSpPr/>
+        <p:nvPr/>
+      </p:nvGrpSpPr>
+      <p:grpSpPr>
+        <a:xfrm>
+          <a:off x="0" y="0"/>
+          <a:ext cx="0" cy="0"/>
+          <a:chOff x="0" y="0"/>
+          <a:chExt cx="0" cy="0"/>
+        </a:xfrm>
+      </p:grpSpPr>
+      <p:sp>
+        <p:nvSpPr>
+          <p:cNvPr id="2" name="Espace réservé de l'image des diapositives 1"/>
+          <p:cNvSpPr>
+            <a:spLocks noGrp="1" noRot="1" noChangeAspect="1"/>
+          </p:cNvSpPr>
+          <p:nvPr>
+            <p:ph type="sldImg"/>
+          </p:nvPr>
+        </p:nvSpPr>
+        <p:spPr/>
+      </p:sp>
+      <p:sp>
+        <p:nvSpPr>
+          <p:cNvPr id="3" name="Espace réservé des notes 2"/>
+          <p:cNvSpPr>
+            <a:spLocks noGrp="1"/>
+          </p:cNvSpPr>
+          <p:nvPr>
+            <p:ph type="body" idx="1"/>
+          </p:nvPr>
+        </p:nvSpPr>
+        <p:spPr/>
+        <p:txBody>
+          <a:bodyPr/>
+          <a:lstStyle/>
+          <a:p>
+            <a:endParaRPr lang="fr-FR"/>
+          </a:p>
+        </p:txBody>
+      </p:sp>
+      <p:sp>
+        <p:nvSpPr>
+          <p:cNvPr id="4" name="Espace réservé du numéro de diapositive 3"/>
+          <p:cNvSpPr>
+            <a:spLocks noGrp="1"/>
+          </p:cNvSpPr>
+          <p:nvPr>
+            <p:ph type="sldNum" sz="quarter" idx="5"/>
+          </p:nvPr>
+        </p:nvSpPr>
+        <p:spPr/>
+        <p:txBody>
+          <a:bodyPr/>
+          <a:lstStyle/>
+          <a:p>
+            <a:fld id="{441A04F3-E4AD-AF49-AAD8-1609614BC998}" type="slidenum">
+              <a:rPr lang="fr-CH"/>
+              <a:t>7</a:t>
+            </a:fld>
+            <a:endParaRPr lang="fr-CH"/>
+          </a:p>
+        </p:txBody>
+      </p:sp>
+    </p:spTree>
+    <p:extLst>
+      <p:ext uri="{BB962C8B-B14F-4D97-AF65-F5344CB8AC3E}">
+        <p14:creationId xmlns:p14="http://schemas.microsoft.com/office/powerpoint/2010/main" val="4138845218"/>
+      </p:ext>
+    </p:extLst>
+  </p:cSld>
+  <p:clrMapOvr>
+    <a:masterClrMapping/>
+  </p:clrMapOvr>
+</p:notes>
+</file>
+
+<file path=ppt/notesSlides/notesSlide7.xml><?xml version="1.0" encoding="utf-8"?>
+<p:notes xmlns:a="http://schemas.openxmlformats.org/drawingml/2006/main" xmlns:r="http://schemas.openxmlformats.org/officeDocument/2006/relationships" xmlns:p="http://schemas.openxmlformats.org/presentationml/2006/main">
+  <p:cSld>
+    <p:spTree>
+      <p:nvGrpSpPr>
+        <p:cNvPr id="1" name=""/>
+        <p:cNvGrpSpPr/>
+        <p:nvPr/>
+      </p:nvGrpSpPr>
+      <p:grpSpPr>
+        <a:xfrm>
+          <a:off x="0" y="0"/>
+          <a:ext cx="0" cy="0"/>
+          <a:chOff x="0" y="0"/>
+          <a:chExt cx="0" cy="0"/>
+        </a:xfrm>
+      </p:grpSpPr>
+      <p:sp>
+        <p:nvSpPr>
+          <p:cNvPr id="2" name="Espace réservé de l'image des diapositives 1"/>
+          <p:cNvSpPr>
+            <a:spLocks noGrp="1" noRot="1" noChangeAspect="1"/>
+          </p:cNvSpPr>
+          <p:nvPr>
+            <p:ph type="sldImg"/>
+          </p:nvPr>
+        </p:nvSpPr>
+        <p:spPr/>
+      </p:sp>
+      <p:sp>
+        <p:nvSpPr>
+          <p:cNvPr id="3" name="Espace réservé des notes 2"/>
+          <p:cNvSpPr>
+            <a:spLocks noGrp="1"/>
+          </p:cNvSpPr>
+          <p:nvPr>
+            <p:ph type="body" idx="1"/>
+          </p:nvPr>
+        </p:nvSpPr>
+        <p:spPr/>
+        <p:txBody>
+          <a:bodyPr/>
+          <a:lstStyle/>
+          <a:p>
+            <a:pPr marL="0" marR="0" lvl="0" indent="0" algn="l" defTabSz="914400" rtl="0" eaLnBrk="1" fontAlgn="auto" latinLnBrk="0" hangingPunct="1">
+              <a:lnSpc>
+                <a:spcPct val="100000"/>
+              </a:lnSpc>
+              <a:spcBef>
+                <a:spcPts val="0"/>
+              </a:spcBef>
+              <a:spcAft>
+                <a:spcPts val="0"/>
+              </a:spcAft>
+              <a:buClrTx/>
+              <a:buSzTx/>
+              <a:buFontTx/>
+              <a:buNone/>
+              <a:tabLst/>
+              <a:defRPr/>
+            </a:pPr>
+            <a:r>
+              <a:rPr lang="fr-CH" b="0">
+                <a:solidFill>
+                  <a:srgbClr val="CCCCCC"/>
+                </a:solidFill>
+                <a:effectLst/>
+                <a:highlight>
+                  <a:srgbClr val="1F1F1F"/>
+                </a:highlight>
+                <a:latin typeface="Menlo" panose="020B0609030804020204" pitchFamily="49" charset="0"/>
+              </a:rPr>
+              <a:t>Aurélien Barrau : astrophisicien et philosophe, directeur du Centre de physique théorique de Grenoble-Alpes.</a:t>
+            </a:r>
+          </a:p>
+        </p:txBody>
+      </p:sp>
+      <p:sp>
+        <p:nvSpPr>
+          <p:cNvPr id="4" name="Espace réservé du numéro de diapositive 3"/>
+          <p:cNvSpPr>
+            <a:spLocks noGrp="1"/>
+          </p:cNvSpPr>
+          <p:nvPr>
+            <p:ph type="sldNum" sz="quarter" idx="5"/>
+          </p:nvPr>
+        </p:nvSpPr>
+        <p:spPr/>
+        <p:txBody>
+          <a:bodyPr/>
+          <a:lstStyle/>
+          <a:p>
+            <a:fld id="{441A04F3-E4AD-AF49-AAD8-1609614BC998}" type="slidenum">
+              <a:t>9</a:t>
+            </a:fld>
+            <a:endParaRPr lang="fr-FR"/>
+          </a:p>
+        </p:txBody>
+      </p:sp>
+    </p:spTree>
+    <p:extLst>
+      <p:ext uri="{BB962C8B-B14F-4D97-AF65-F5344CB8AC3E}">
+        <p14:creationId xmlns:p14="http://schemas.microsoft.com/office/powerpoint/2010/main" val="4236870584"/>
+      </p:ext>
+    </p:extLst>
+  </p:cSld>
+  <p:clrMapOvr>
+    <a:masterClrMapping/>
+  </p:clrMapOvr>
+</p:notes>
+</file>
+
+<file path=ppt/notesSlides/notesSlide8.xml><?xml version="1.0" encoding="utf-8"?>
+<p:notes xmlns:a="http://schemas.openxmlformats.org/drawingml/2006/main" xmlns:r="http://schemas.openxmlformats.org/officeDocument/2006/relationships" xmlns:p="http://schemas.openxmlformats.org/presentationml/2006/main">
+  <p:cSld>
+    <p:spTree>
+      <p:nvGrpSpPr>
+        <p:cNvPr id="1" name=""/>
+        <p:cNvGrpSpPr/>
+        <p:nvPr/>
+      </p:nvGrpSpPr>
+      <p:grpSpPr>
+        <a:xfrm>
+          <a:off x="0" y="0"/>
+          <a:ext cx="0" cy="0"/>
+          <a:chOff x="0" y="0"/>
+          <a:chExt cx="0" cy="0"/>
+        </a:xfrm>
+      </p:grpSpPr>
+      <p:sp>
+        <p:nvSpPr>
+          <p:cNvPr id="2" name="Espace réservé de l'image des diapositives 1"/>
+          <p:cNvSpPr>
+            <a:spLocks noGrp="1" noRot="1" noChangeAspect="1"/>
+          </p:cNvSpPr>
+          <p:nvPr>
+            <p:ph type="sldImg"/>
+          </p:nvPr>
+        </p:nvSpPr>
+        <p:spPr/>
+      </p:sp>
+      <p:sp>
+        <p:nvSpPr>
+          <p:cNvPr id="3" name="Espace réservé des notes 2"/>
+          <p:cNvSpPr>
+            <a:spLocks noGrp="1"/>
+          </p:cNvSpPr>
+          <p:nvPr>
+            <p:ph type="body" idx="1"/>
+          </p:nvPr>
+        </p:nvSpPr>
+        <p:spPr/>
+        <p:txBody>
+          <a:bodyPr/>
+          <a:lstStyle/>
+          <a:p>
+            <a:endParaRPr lang="fr-FR"/>
+          </a:p>
+        </p:txBody>
+      </p:sp>
+      <p:sp>
+        <p:nvSpPr>
+          <p:cNvPr id="4" name="Espace réservé du numéro de diapositive 3"/>
+          <p:cNvSpPr>
+            <a:spLocks noGrp="1"/>
+          </p:cNvSpPr>
+          <p:nvPr>
+            <p:ph type="sldNum" sz="quarter" idx="5"/>
+          </p:nvPr>
+        </p:nvSpPr>
+        <p:spPr/>
+        <p:txBody>
+          <a:bodyPr/>
+          <a:lstStyle/>
+          <a:p>
+            <a:fld id="{441A04F3-E4AD-AF49-AAD8-1609614BC998}" type="slidenum">
+              <a:rPr lang="fr-CH"/>
+              <a:t>10</a:t>
+            </a:fld>
+            <a:endParaRPr lang="fr-CH"/>
+          </a:p>
+        </p:txBody>
+      </p:sp>
+    </p:spTree>
+    <p:extLst>
+      <p:ext uri="{BB962C8B-B14F-4D97-AF65-F5344CB8AC3E}">
+        <p14:creationId xmlns:p14="http://schemas.microsoft.com/office/powerpoint/2010/main" val="1605006855"/>
+      </p:ext>
+    </p:extLst>
+  </p:cSld>
+  <p:clrMapOvr>
+    <a:masterClrMapping/>
+  </p:clrMapOvr>
+</p:notes>
+</file>
+
 <file path=ppt/slideLayouts/slideLayout1.xml><?xml version="1.0" encoding="utf-8"?>
 <p:sldLayout xmlns:a="http://schemas.openxmlformats.org/drawingml/2006/main" xmlns:r="http://schemas.openxmlformats.org/officeDocument/2006/relationships" xmlns:p="http://schemas.openxmlformats.org/presentationml/2006/main" type="title" preserve="1">
   <p:cSld name="Diapositive de titre">
@@ -835,7 +2008,7 @@
           <a:lstStyle/>
           <a:p>
             <a:fld id="{E58754B6-4E19-8F42-807C-F64A7D215DCD}" type="datetimeFigureOut">
-              <a:t>08/05/2024</a:t>
+              <a:t>10/05/2024</a:t>
             </a:fld>
             <a:endParaRPr lang="fr-FR"/>
           </a:p>
@@ -1031,7 +2204,7 @@
           <a:lstStyle/>
           <a:p>
             <a:fld id="{E58754B6-4E19-8F42-807C-F64A7D215DCD}" type="datetimeFigureOut">
-              <a:t>08/05/2024</a:t>
+              <a:t>10/05/2024</a:t>
             </a:fld>
             <a:endParaRPr lang="fr-FR"/>
           </a:p>
@@ -1237,7 +2410,7 @@
           <a:lstStyle/>
           <a:p>
             <a:fld id="{E58754B6-4E19-8F42-807C-F64A7D215DCD}" type="datetimeFigureOut">
-              <a:t>08/05/2024</a:t>
+              <a:t>10/05/2024</a:t>
             </a:fld>
             <a:endParaRPr lang="fr-FR"/>
           </a:p>
@@ -1433,7 +2606,7 @@
           <a:lstStyle/>
           <a:p>
             <a:fld id="{E58754B6-4E19-8F42-807C-F64A7D215DCD}" type="datetimeFigureOut">
-              <a:t>08/05/2024</a:t>
+              <a:t>10/05/2024</a:t>
             </a:fld>
             <a:endParaRPr lang="fr-FR"/>
           </a:p>
@@ -1706,7 +2879,7 @@
           <a:lstStyle/>
           <a:p>
             <a:fld id="{E58754B6-4E19-8F42-807C-F64A7D215DCD}" type="datetimeFigureOut">
-              <a:t>08/05/2024</a:t>
+              <a:t>10/05/2024</a:t>
             </a:fld>
             <a:endParaRPr lang="fr-FR"/>
           </a:p>
@@ -1969,7 +3142,7 @@
           <a:lstStyle/>
           <a:p>
             <a:fld id="{E58754B6-4E19-8F42-807C-F64A7D215DCD}" type="datetimeFigureOut">
-              <a:t>08/05/2024</a:t>
+              <a:t>10/05/2024</a:t>
             </a:fld>
             <a:endParaRPr lang="fr-FR"/>
           </a:p>
@@ -2379,7 +3552,7 @@
           <a:lstStyle/>
           <a:p>
             <a:fld id="{E58754B6-4E19-8F42-807C-F64A7D215DCD}" type="datetimeFigureOut">
-              <a:t>08/05/2024</a:t>
+              <a:t>10/05/2024</a:t>
             </a:fld>
             <a:endParaRPr lang="fr-FR"/>
           </a:p>
@@ -2518,7 +3691,7 @@
           <a:lstStyle/>
           <a:p>
             <a:fld id="{E58754B6-4E19-8F42-807C-F64A7D215DCD}" type="datetimeFigureOut">
-              <a:t>08/05/2024</a:t>
+              <a:t>10/05/2024</a:t>
             </a:fld>
             <a:endParaRPr lang="fr-FR"/>
           </a:p>
@@ -2629,7 +3802,7 @@
           <a:lstStyle/>
           <a:p>
             <a:fld id="{E58754B6-4E19-8F42-807C-F64A7D215DCD}" type="datetimeFigureOut">
-              <a:t>08/05/2024</a:t>
+              <a:t>10/05/2024</a:t>
             </a:fld>
             <a:endParaRPr lang="fr-FR"/>
           </a:p>
@@ -2938,7 +4111,7 @@
           <a:lstStyle/>
           <a:p>
             <a:fld id="{E58754B6-4E19-8F42-807C-F64A7D215DCD}" type="datetimeFigureOut">
-              <a:t>08/05/2024</a:t>
+              <a:t>10/05/2024</a:t>
             </a:fld>
             <a:endParaRPr lang="fr-FR"/>
           </a:p>
@@ -3224,7 +4397,7 @@
           <a:lstStyle/>
           <a:p>
             <a:fld id="{E58754B6-4E19-8F42-807C-F64A7D215DCD}" type="datetimeFigureOut">
-              <a:t>08/05/2024</a:t>
+              <a:t>10/05/2024</a:t>
             </a:fld>
             <a:endParaRPr lang="fr-FR"/>
           </a:p>
@@ -3463,7 +4636,7 @@
           </a:lstStyle>
           <a:p>
             <a:fld id="{E58754B6-4E19-8F42-807C-F64A7D215DCD}" type="datetimeFigureOut">
-              <a:t>08/05/2024</a:t>
+              <a:t>10/05/2024</a:t>
             </a:fld>
             <a:endParaRPr lang="fr-FR"/>
           </a:p>
@@ -3865,6 +5038,19 @@
 <file path=ppt/slides/slide1.xml><?xml version="1.0" encoding="utf-8"?>
 <p:sld xmlns:a="http://schemas.openxmlformats.org/drawingml/2006/main" xmlns:r="http://schemas.openxmlformats.org/officeDocument/2006/relationships" xmlns:p="http://schemas.openxmlformats.org/presentationml/2006/main">
   <p:cSld>
+    <p:bg>
+      <p:bgPr>
+        <a:pattFill prst="pct20">
+          <a:fgClr>
+            <a:schemeClr val="accent1"/>
+          </a:fgClr>
+          <a:bgClr>
+            <a:schemeClr val="bg1"/>
+          </a:bgClr>
+        </a:pattFill>
+        <a:effectLst/>
+      </p:bgPr>
+    </p:bg>
     <p:spTree>
       <p:nvGrpSpPr>
         <p:cNvPr id="1" name=""/>
@@ -3901,12 +5087,20 @@
           <a:lstStyle/>
           <a:p>
             <a:r>
-              <a:rPr lang="fr-FR"/>
-              <a:t>Avons-nous encore besoin </a:t>
-            </a:r>
-            <a:r>
-              <a:rPr lang="fr-FR" b="1"/>
-              <a:t>d’ingénieur-e-s</a:t>
+              <a:rPr lang="fr-FR">
+                <a:latin typeface="Roboto" panose="02000000000000000000" pitchFamily="2" charset="0"/>
+                <a:ea typeface="Roboto" panose="02000000000000000000" pitchFamily="2" charset="0"/>
+                <a:cs typeface="Roboto" panose="02000000000000000000" pitchFamily="2" charset="0"/>
+              </a:rPr>
+              <a:t>Avons-nous encore besoin d’</a:t>
+            </a:r>
+            <a:r>
+              <a:rPr lang="fr-FR" b="1">
+                <a:latin typeface="Roboto" panose="02000000000000000000" pitchFamily="2" charset="0"/>
+                <a:ea typeface="Roboto" panose="02000000000000000000" pitchFamily="2" charset="0"/>
+                <a:cs typeface="Roboto" panose="02000000000000000000" pitchFamily="2" charset="0"/>
+              </a:rPr>
+              <a:t>ingénieur-e-s</a:t>
             </a:r>
           </a:p>
         </p:txBody>
@@ -3927,19 +5121,32 @@
             <p:ph type="subTitle" idx="1"/>
           </p:nvPr>
         </p:nvSpPr>
-        <p:spPr/>
+        <p:spPr>
+          <a:xfrm>
+            <a:off x="1337982" y="3628932"/>
+            <a:ext cx="9516035" cy="1655762"/>
+          </a:xfrm>
+        </p:spPr>
         <p:txBody>
           <a:bodyPr anchor="ctr"/>
           <a:lstStyle/>
           <a:p>
             <a:r>
-              <a:rPr lang="fr-FR"/>
+              <a:rPr lang="fr-FR">
+                <a:latin typeface="Roboto" panose="02000000000000000000" pitchFamily="2" charset="0"/>
+                <a:ea typeface="Roboto" panose="02000000000000000000" pitchFamily="2" charset="0"/>
+                <a:cs typeface="Roboto" panose="02000000000000000000" pitchFamily="2" charset="0"/>
+              </a:rPr>
               <a:t>Conférence donnée à l’Ecole CentraleSupelec en novembre 2022 par</a:t>
             </a:r>
           </a:p>
           <a:p>
             <a:r>
-              <a:rPr lang="fr-FR" b="1"/>
+              <a:rPr lang="fr-FR" b="1">
+                <a:latin typeface="Roboto" panose="02000000000000000000" pitchFamily="2" charset="0"/>
+                <a:ea typeface="Roboto" panose="02000000000000000000" pitchFamily="2" charset="0"/>
+                <a:cs typeface="Roboto" panose="02000000000000000000" pitchFamily="2" charset="0"/>
+              </a:rPr>
               <a:t>Aurélien Barrau</a:t>
             </a:r>
           </a:p>
@@ -3958,9 +5165,22 @@
 </p:sld>
 </file>
 
-<file path=ppt/slides/slide2.xml><?xml version="1.0" encoding="utf-8"?>
+<file path=ppt/slides/slide10.xml><?xml version="1.0" encoding="utf-8"?>
 <p:sld xmlns:a="http://schemas.openxmlformats.org/drawingml/2006/main" xmlns:r="http://schemas.openxmlformats.org/officeDocument/2006/relationships" xmlns:p="http://schemas.openxmlformats.org/presentationml/2006/main">
   <p:cSld>
+    <p:bg>
+      <p:bgPr>
+        <a:pattFill prst="pct20">
+          <a:fgClr>
+            <a:schemeClr val="accent1"/>
+          </a:fgClr>
+          <a:bgClr>
+            <a:schemeClr val="bg1"/>
+          </a:bgClr>
+        </a:pattFill>
+        <a:effectLst/>
+      </p:bgPr>
+    </p:bg>
     <p:spTree>
       <p:nvGrpSpPr>
         <p:cNvPr id="1" name=""/>
@@ -3980,6 +5200,241 @@
           <p:cNvPr id="2" name="Titre 1">
             <a:extLst>
               <a:ext uri="{FF2B5EF4-FFF2-40B4-BE49-F238E27FC236}">
+                <a16:creationId xmlns:a16="http://schemas.microsoft.com/office/drawing/2014/main" id="{F848B694-19D9-6C6D-0A76-4FDAD8D2CEFA}"/>
+              </a:ext>
+            </a:extLst>
+          </p:cNvPr>
+          <p:cNvSpPr>
+            <a:spLocks noGrp="1"/>
+          </p:cNvSpPr>
+          <p:nvPr>
+            <p:ph type="title"/>
+          </p:nvPr>
+        </p:nvSpPr>
+        <p:spPr/>
+        <p:txBody>
+          <a:bodyPr/>
+          <a:lstStyle/>
+          <a:p>
+            <a:r>
+              <a:rPr lang="fr-FR">
+                <a:latin typeface="Roboto" panose="02000000000000000000" pitchFamily="2" charset="0"/>
+                <a:ea typeface="Roboto" panose="02000000000000000000" pitchFamily="2" charset="0"/>
+                <a:cs typeface="Roboto" panose="02000000000000000000" pitchFamily="2" charset="0"/>
+              </a:rPr>
+              <a:t>Sources</a:t>
+            </a:r>
+          </a:p>
+        </p:txBody>
+      </p:sp>
+      <p:sp>
+        <p:nvSpPr>
+          <p:cNvPr id="3" name="Espace réservé du contenu 2">
+            <a:extLst>
+              <a:ext uri="{FF2B5EF4-FFF2-40B4-BE49-F238E27FC236}">
+                <a16:creationId xmlns:a16="http://schemas.microsoft.com/office/drawing/2014/main" id="{45B3DDF6-4FFB-672F-3F81-B8CA6F8F5CF8}"/>
+              </a:ext>
+            </a:extLst>
+          </p:cNvPr>
+          <p:cNvSpPr>
+            <a:spLocks noGrp="1"/>
+          </p:cNvSpPr>
+          <p:nvPr>
+            <p:ph idx="1"/>
+          </p:nvPr>
+        </p:nvSpPr>
+        <p:spPr>
+          <a:xfrm>
+            <a:off x="838200" y="1727388"/>
+            <a:ext cx="10515600" cy="4802187"/>
+          </a:xfrm>
+        </p:spPr>
+        <p:txBody>
+          <a:bodyPr numCol="1">
+            <a:noAutofit/>
+          </a:bodyPr>
+          <a:lstStyle/>
+          <a:p>
+            <a:pPr marL="0" indent="0">
+              <a:lnSpc>
+                <a:spcPct val="100000"/>
+              </a:lnSpc>
+              <a:buNone/>
+            </a:pPr>
+            <a:r>
+              <a:rPr lang="fr-FR" sz="2400">
+                <a:latin typeface="Roboto" panose="02000000000000000000" pitchFamily="2" charset="0"/>
+                <a:ea typeface="Roboto" panose="02000000000000000000" pitchFamily="2" charset="0"/>
+                <a:cs typeface="Roboto" panose="02000000000000000000" pitchFamily="2" charset="0"/>
+              </a:rPr>
+              <a:t>A-t’on encore besoin d’ingénieurs ? Par Aurélien Barrau</a:t>
+            </a:r>
+          </a:p>
+          <a:p>
+            <a:pPr marL="0" indent="0">
+              <a:lnSpc>
+                <a:spcPct val="100000"/>
+              </a:lnSpc>
+              <a:buNone/>
+            </a:pPr>
+            <a:r>
+              <a:rPr lang="fr-FR" sz="2400">
+                <a:latin typeface="Roboto" panose="02000000000000000000" pitchFamily="2" charset="0"/>
+                <a:ea typeface="Roboto" panose="02000000000000000000" pitchFamily="2" charset="0"/>
+                <a:cs typeface="Roboto" panose="02000000000000000000" pitchFamily="2" charset="0"/>
+                <a:hlinkClick r:id="rId3"/>
+              </a:rPr>
+              <a:t>https://www.youtube.com/watch?v=r9vrU9g893o&amp;t=2929s</a:t>
+            </a:r>
+            <a:endParaRPr lang="fr-FR" sz="2400">
+              <a:latin typeface="Roboto" panose="02000000000000000000" pitchFamily="2" charset="0"/>
+              <a:ea typeface="Roboto" panose="02000000000000000000" pitchFamily="2" charset="0"/>
+              <a:cs typeface="Roboto" panose="02000000000000000000" pitchFamily="2" charset="0"/>
+            </a:endParaRPr>
+          </a:p>
+          <a:p>
+            <a:pPr marL="0" indent="0">
+              <a:lnSpc>
+                <a:spcPct val="100000"/>
+              </a:lnSpc>
+              <a:buNone/>
+            </a:pPr>
+            <a:r>
+              <a:rPr lang="fr-FR" sz="2400">
+                <a:latin typeface="Roboto" panose="02000000000000000000" pitchFamily="2" charset="0"/>
+                <a:ea typeface="Roboto" panose="02000000000000000000" pitchFamily="2" charset="0"/>
+                <a:cs typeface="Roboto" panose="02000000000000000000" pitchFamily="2" charset="0"/>
+                <a:hlinkClick r:id="rId4"/>
+              </a:rPr>
+              <a:t>https://leonard.perso.math.cnrs.fr/teaching/23-climat/barrau_centrale.pdf</a:t>
+            </a:r>
+            <a:r>
+              <a:rPr lang="fr-FR" sz="2400">
+                <a:latin typeface="Roboto" panose="02000000000000000000" pitchFamily="2" charset="0"/>
+                <a:ea typeface="Roboto" panose="02000000000000000000" pitchFamily="2" charset="0"/>
+                <a:cs typeface="Roboto" panose="02000000000000000000" pitchFamily="2" charset="0"/>
+              </a:rPr>
+              <a:t> (retranscription du talk)</a:t>
+            </a:r>
+          </a:p>
+          <a:p>
+            <a:pPr marL="0" indent="0">
+              <a:lnSpc>
+                <a:spcPct val="100000"/>
+              </a:lnSpc>
+              <a:buNone/>
+            </a:pPr>
+            <a:endParaRPr lang="fr-FR" sz="2400">
+              <a:latin typeface="Roboto" panose="02000000000000000000" pitchFamily="2" charset="0"/>
+              <a:ea typeface="Roboto" panose="02000000000000000000" pitchFamily="2" charset="0"/>
+              <a:cs typeface="Roboto" panose="02000000000000000000" pitchFamily="2" charset="0"/>
+            </a:endParaRPr>
+          </a:p>
+          <a:p>
+            <a:pPr marL="0" indent="0">
+              <a:lnSpc>
+                <a:spcPct val="100000"/>
+              </a:lnSpc>
+              <a:buNone/>
+            </a:pPr>
+            <a:r>
+              <a:rPr lang="fr-FR" sz="2400">
+                <a:latin typeface="Roboto" panose="02000000000000000000" pitchFamily="2" charset="0"/>
+                <a:ea typeface="Roboto" panose="02000000000000000000" pitchFamily="2" charset="0"/>
+                <a:cs typeface="Roboto" panose="02000000000000000000" pitchFamily="2" charset="0"/>
+              </a:rPr>
+              <a:t>Leverage Points « Places to Intervene in a system » by Donella Meadows </a:t>
+            </a:r>
+            <a:r>
+              <a:rPr lang="fr-FR" sz="2400">
+                <a:latin typeface="Roboto" panose="02000000000000000000" pitchFamily="2" charset="0"/>
+                <a:ea typeface="Roboto" panose="02000000000000000000" pitchFamily="2" charset="0"/>
+                <a:cs typeface="Roboto" panose="02000000000000000000" pitchFamily="2" charset="0"/>
+                <a:hlinkClick r:id="rId5"/>
+              </a:rPr>
+              <a:t>https://donellameadows.org/wp-content/userfiles/Leverage_Points.pdf</a:t>
+            </a:r>
+            <a:endParaRPr lang="fr-FR" sz="2400">
+              <a:latin typeface="Roboto" panose="02000000000000000000" pitchFamily="2" charset="0"/>
+              <a:ea typeface="Roboto" panose="02000000000000000000" pitchFamily="2" charset="0"/>
+              <a:cs typeface="Roboto" panose="02000000000000000000" pitchFamily="2" charset="0"/>
+            </a:endParaRPr>
+          </a:p>
+          <a:p>
+            <a:pPr marL="0" indent="0">
+              <a:lnSpc>
+                <a:spcPct val="100000"/>
+              </a:lnSpc>
+              <a:buNone/>
+            </a:pPr>
+            <a:r>
+              <a:rPr lang="fr-FR" sz="2400">
+                <a:latin typeface="Roboto" panose="02000000000000000000" pitchFamily="2" charset="0"/>
+                <a:ea typeface="Roboto" panose="02000000000000000000" pitchFamily="2" charset="0"/>
+                <a:cs typeface="Roboto" panose="02000000000000000000" pitchFamily="2" charset="0"/>
+                <a:hlinkClick r:id="rId6"/>
+              </a:rPr>
+              <a:t>https://fr.wikipedia.org/wiki/Douze_leviers_pour_intervenir_dans_un_syst%C3%A8me</a:t>
+            </a:r>
+            <a:r>
+              <a:rPr lang="fr-FR" sz="2400">
+                <a:latin typeface="Roboto" panose="02000000000000000000" pitchFamily="2" charset="0"/>
+                <a:ea typeface="Roboto" panose="02000000000000000000" pitchFamily="2" charset="0"/>
+                <a:cs typeface="Roboto" panose="02000000000000000000" pitchFamily="2" charset="0"/>
+              </a:rPr>
+              <a:t> (utilisation des exemples)</a:t>
+            </a:r>
+          </a:p>
+        </p:txBody>
+      </p:sp>
+    </p:spTree>
+    <p:extLst>
+      <p:ext uri="{BB962C8B-B14F-4D97-AF65-F5344CB8AC3E}">
+        <p14:creationId xmlns:p14="http://schemas.microsoft.com/office/powerpoint/2010/main" val="1740961636"/>
+      </p:ext>
+    </p:extLst>
+  </p:cSld>
+  <p:clrMapOvr>
+    <a:masterClrMapping/>
+  </p:clrMapOvr>
+</p:sld>
+</file>
+
+<file path=ppt/slides/slide2.xml><?xml version="1.0" encoding="utf-8"?>
+<p:sld xmlns:a="http://schemas.openxmlformats.org/drawingml/2006/main" xmlns:r="http://schemas.openxmlformats.org/officeDocument/2006/relationships" xmlns:p="http://schemas.openxmlformats.org/presentationml/2006/main">
+  <p:cSld>
+    <p:bg>
+      <p:bgPr>
+        <a:pattFill prst="pct20">
+          <a:fgClr>
+            <a:schemeClr val="accent1"/>
+          </a:fgClr>
+          <a:bgClr>
+            <a:schemeClr val="bg1"/>
+          </a:bgClr>
+        </a:pattFill>
+        <a:effectLst/>
+      </p:bgPr>
+    </p:bg>
+    <p:spTree>
+      <p:nvGrpSpPr>
+        <p:cNvPr id="1" name=""/>
+        <p:cNvGrpSpPr/>
+        <p:nvPr/>
+      </p:nvGrpSpPr>
+      <p:grpSpPr>
+        <a:xfrm>
+          <a:off x="0" y="0"/>
+          <a:ext cx="0" cy="0"/>
+          <a:chOff x="0" y="0"/>
+          <a:chExt cx="0" cy="0"/>
+        </a:xfrm>
+      </p:grpSpPr>
+      <p:sp>
+        <p:nvSpPr>
+          <p:cNvPr id="2" name="Titre 1">
+            <a:extLst>
+              <a:ext uri="{FF2B5EF4-FFF2-40B4-BE49-F238E27FC236}">
                 <a16:creationId xmlns:a16="http://schemas.microsoft.com/office/drawing/2014/main" id="{86B61A9F-2F2B-04C4-CBC7-30F7120107AF}"/>
               </a:ext>
             </a:extLst>
@@ -3999,7 +5454,11 @@
           <a:lstStyle/>
           <a:p>
             <a:r>
-              <a:rPr lang="fr-FR"/>
+              <a:rPr lang="fr-FR">
+                <a:latin typeface="Roboto" panose="02000000000000000000" pitchFamily="2" charset="0"/>
+                <a:ea typeface="Roboto" panose="02000000000000000000" pitchFamily="2" charset="0"/>
+                <a:cs typeface="Roboto" panose="02000000000000000000" pitchFamily="2" charset="0"/>
+              </a:rPr>
               <a:t>Est-ce que la technologie peut nous sauver de la catastrophe environementale ?</a:t>
             </a:r>
           </a:p>
@@ -4021,6 +5480,19 @@
 <file path=ppt/slides/slide3.xml><?xml version="1.0" encoding="utf-8"?>
 <p:sld xmlns:a="http://schemas.openxmlformats.org/drawingml/2006/main" xmlns:r="http://schemas.openxmlformats.org/officeDocument/2006/relationships" xmlns:p="http://schemas.openxmlformats.org/presentationml/2006/main">
   <p:cSld>
+    <p:bg>
+      <p:bgPr>
+        <a:pattFill prst="pct20">
+          <a:fgClr>
+            <a:schemeClr val="accent1"/>
+          </a:fgClr>
+          <a:bgClr>
+            <a:schemeClr val="bg1"/>
+          </a:bgClr>
+        </a:pattFill>
+        <a:effectLst/>
+      </p:bgPr>
+    </p:bg>
     <p:spTree>
       <p:nvGrpSpPr>
         <p:cNvPr id="1" name=""/>
@@ -4050,7 +5522,7 @@
           <p:nvPr/>
         </p:nvPicPr>
         <p:blipFill rotWithShape="1">
-          <a:blip r:embed="rId2">
+          <a:blip r:embed="rId3">
             <a:extLst>
               <a:ext uri="{28A0092B-C50C-407E-A947-70E740481C1C}">
                 <a14:useLocalDpi xmlns:a14="http://schemas.microsoft.com/office/drawing/2010/main" val="0"/>
@@ -4128,12 +5600,20 @@
           </a:lstStyle>
           <a:p>
             <a:r>
-              <a:rPr lang="fr-FR"/>
+              <a:rPr lang="fr-FR" b="1">
+                <a:latin typeface="Roboto" panose="02000000000000000000" pitchFamily="2" charset="0"/>
+                <a:ea typeface="Roboto" panose="02000000000000000000" pitchFamily="2" charset="0"/>
+                <a:cs typeface="Roboto" panose="02000000000000000000" pitchFamily="2" charset="0"/>
+              </a:rPr>
               <a:t>Projet FAIRY</a:t>
             </a:r>
           </a:p>
           <a:p>
-            <a:endParaRPr lang="fr-FR"/>
+            <a:endParaRPr lang="fr-FR">
+              <a:latin typeface="Roboto" panose="02000000000000000000" pitchFamily="2" charset="0"/>
+              <a:ea typeface="Roboto" panose="02000000000000000000" pitchFamily="2" charset="0"/>
+              <a:cs typeface="Roboto" panose="02000000000000000000" pitchFamily="2" charset="0"/>
+            </a:endParaRPr>
           </a:p>
           <a:p>
             <a:r>
@@ -4142,14 +5622,17 @@
                   <a:srgbClr val="333333"/>
                 </a:solidFill>
                 <a:effectLst/>
-                <a:highlight>
-                  <a:srgbClr val="FFFFFF"/>
-                </a:highlight>
                 <a:latin typeface="Roboto" panose="02000000000000000000" pitchFamily="2" charset="0"/>
+                <a:ea typeface="Roboto" panose="02000000000000000000" pitchFamily="2" charset="0"/>
+                <a:cs typeface="Roboto" panose="02000000000000000000" pitchFamily="2" charset="0"/>
               </a:rPr>
               <a:t>Flying Aero-robots based on Light Responsive Materials Assembly</a:t>
             </a:r>
-            <a:endParaRPr lang="fr-FR"/>
+            <a:endParaRPr lang="fr-FR">
+              <a:latin typeface="Roboto" panose="02000000000000000000" pitchFamily="2" charset="0"/>
+              <a:ea typeface="Roboto" panose="02000000000000000000" pitchFamily="2" charset="0"/>
+              <a:cs typeface="Roboto" panose="02000000000000000000" pitchFamily="2" charset="0"/>
+            </a:endParaRPr>
           </a:p>
         </p:txBody>
       </p:sp>
@@ -4168,20 +5651,20 @@
           <p:nvPr/>
         </p:nvPicPr>
         <p:blipFill rotWithShape="1">
-          <a:blip r:embed="rId3">
+          <a:blip r:embed="rId4">
             <a:extLst>
               <a:ext uri="{28A0092B-C50C-407E-A947-70E740481C1C}">
                 <a14:useLocalDpi xmlns:a14="http://schemas.microsoft.com/office/drawing/2010/main" val="0"/>
               </a:ext>
             </a:extLst>
           </a:blip>
-          <a:srcRect l="23718" r="26330"/>
+          <a:srcRect l="-68" r="-130"/>
           <a:stretch/>
         </p:blipFill>
         <p:spPr bwMode="auto">
           <a:xfrm>
-            <a:off x="6096000" y="0"/>
-            <a:ext cx="6096000" cy="6858000"/>
+            <a:off x="0" y="0"/>
+            <a:ext cx="12227859" cy="6858000"/>
           </a:xfrm>
           <a:prstGeom prst="rect">
             <a:avLst/>
@@ -4229,16 +5712,24 @@
                             </p:stCondLst>
                             <p:childTnLst>
                               <p:par>
-                                <p:cTn id="5" presetID="9" presetClass="entr" presetSubtype="0" fill="hold" nodeType="clickEffect">
+                                <p:cTn id="5" presetID="9" presetClass="exit" presetSubtype="0" fill="hold" nodeType="clickEffect">
                                   <p:stCondLst>
                                     <p:cond delay="0"/>
                                   </p:stCondLst>
                                   <p:childTnLst>
+                                    <p:animEffect transition="out" filter="dissolve">
+                                      <p:cBhvr>
+                                        <p:cTn id="6" dur="500"/>
+                                        <p:tgtEl>
+                                          <p:spTgt spid="1028"/>
+                                        </p:tgtEl>
+                                      </p:cBhvr>
+                                    </p:animEffect>
                                     <p:set>
                                       <p:cBhvr>
-                                        <p:cTn id="6" dur="1" fill="hold">
+                                        <p:cTn id="7" dur="1" fill="hold">
                                           <p:stCondLst>
-                                            <p:cond delay="0"/>
+                                            <p:cond delay="499"/>
                                           </p:stCondLst>
                                         </p:cTn>
                                         <p:tgtEl>
@@ -4249,17 +5740,9 @@
                                         </p:attrNameLst>
                                       </p:cBhvr>
                                       <p:to>
-                                        <p:strVal val="visible"/>
+                                        <p:strVal val="hidden"/>
                                       </p:to>
                                     </p:set>
-                                    <p:animEffect transition="in" filter="dissolve">
-                                      <p:cBhvr>
-                                        <p:cTn id="7" dur="500"/>
-                                        <p:tgtEl>
-                                          <p:spTgt spid="1028"/>
-                                        </p:tgtEl>
-                                      </p:cBhvr>
-                                    </p:animEffect>
                                   </p:childTnLst>
                                 </p:cTn>
                               </p:par>
@@ -4297,6 +5780,19 @@
 <file path=ppt/slides/slide4.xml><?xml version="1.0" encoding="utf-8"?>
 <p:sld xmlns:a="http://schemas.openxmlformats.org/drawingml/2006/main" xmlns:r="http://schemas.openxmlformats.org/officeDocument/2006/relationships" xmlns:p="http://schemas.openxmlformats.org/presentationml/2006/main">
   <p:cSld>
+    <p:bg>
+      <p:bgPr>
+        <a:pattFill prst="pct20">
+          <a:fgClr>
+            <a:schemeClr val="accent1"/>
+          </a:fgClr>
+          <a:bgClr>
+            <a:schemeClr val="bg1"/>
+          </a:bgClr>
+        </a:pattFill>
+        <a:effectLst/>
+      </p:bgPr>
+    </p:bg>
     <p:spTree>
       <p:nvGrpSpPr>
         <p:cNvPr id="1" name=""/>
@@ -4316,7 +5812,7 @@
           <p:cNvPr id="2" name="Titre 1">
             <a:extLst>
               <a:ext uri="{FF2B5EF4-FFF2-40B4-BE49-F238E27FC236}">
-                <a16:creationId xmlns:a16="http://schemas.microsoft.com/office/drawing/2014/main" id="{41DADD80-6819-EB74-EAB9-1321BF999C4F}"/>
+                <a16:creationId xmlns:a16="http://schemas.microsoft.com/office/drawing/2014/main" id="{263ACE9E-309A-E09F-75F7-AABC61DAE275}"/>
               </a:ext>
             </a:extLst>
           </p:cNvPr>
@@ -4332,114 +5828,1392 @@
           <a:bodyPr/>
           <a:lstStyle/>
           <a:p>
-            <a:endParaRPr lang="fr-FR"/>
-          </a:p>
-        </p:txBody>
-      </p:sp>
-      <p:sp>
-        <p:nvSpPr>
-          <p:cNvPr id="3" name="Espace réservé du texte 2">
-            <a:extLst>
-              <a:ext uri="{FF2B5EF4-FFF2-40B4-BE49-F238E27FC236}">
-                <a16:creationId xmlns:a16="http://schemas.microsoft.com/office/drawing/2014/main" id="{5B67B3A7-D99C-FA1E-948B-861A17D0D8ED}"/>
-              </a:ext>
-            </a:extLst>
-          </p:cNvPr>
-          <p:cNvSpPr>
-            <a:spLocks noGrp="1"/>
-          </p:cNvSpPr>
-          <p:nvPr>
-            <p:ph type="body" idx="1"/>
-          </p:nvPr>
-        </p:nvSpPr>
-        <p:spPr/>
-        <p:txBody>
-          <a:bodyPr/>
-          <a:lstStyle/>
-          <a:p>
-            <a:endParaRPr lang="fr-FR"/>
-          </a:p>
-        </p:txBody>
-      </p:sp>
-      <p:sp>
-        <p:nvSpPr>
-          <p:cNvPr id="4" name="Espace réservé du contenu 3">
-            <a:extLst>
-              <a:ext uri="{FF2B5EF4-FFF2-40B4-BE49-F238E27FC236}">
-                <a16:creationId xmlns:a16="http://schemas.microsoft.com/office/drawing/2014/main" id="{5796D96A-02D5-B9EA-7D97-5153FDF7B338}"/>
-              </a:ext>
-            </a:extLst>
-          </p:cNvPr>
-          <p:cNvSpPr>
-            <a:spLocks noGrp="1"/>
-          </p:cNvSpPr>
-          <p:nvPr>
-            <p:ph sz="half" idx="2"/>
-          </p:nvPr>
-        </p:nvSpPr>
-        <p:spPr/>
-        <p:txBody>
-          <a:bodyPr/>
-          <a:lstStyle/>
-          <a:p>
-            <a:endParaRPr lang="fr-FR"/>
-          </a:p>
-        </p:txBody>
-      </p:sp>
-      <p:sp>
-        <p:nvSpPr>
-          <p:cNvPr id="5" name="Espace réservé du texte 4">
-            <a:extLst>
-              <a:ext uri="{FF2B5EF4-FFF2-40B4-BE49-F238E27FC236}">
-                <a16:creationId xmlns:a16="http://schemas.microsoft.com/office/drawing/2014/main" id="{1A76461B-AE03-C5D1-B9AD-C495CA8F021C}"/>
-              </a:ext>
-            </a:extLst>
-          </p:cNvPr>
-          <p:cNvSpPr>
-            <a:spLocks noGrp="1"/>
-          </p:cNvSpPr>
-          <p:nvPr>
-            <p:ph type="body" sz="quarter" idx="3"/>
-          </p:nvPr>
-        </p:nvSpPr>
-        <p:spPr/>
-        <p:txBody>
-          <a:bodyPr/>
-          <a:lstStyle/>
-          <a:p>
-            <a:endParaRPr lang="fr-FR"/>
-          </a:p>
-        </p:txBody>
-      </p:sp>
-      <p:sp>
-        <p:nvSpPr>
-          <p:cNvPr id="6" name="Espace réservé du contenu 5">
-            <a:extLst>
-              <a:ext uri="{FF2B5EF4-FFF2-40B4-BE49-F238E27FC236}">
-                <a16:creationId xmlns:a16="http://schemas.microsoft.com/office/drawing/2014/main" id="{738B4069-C97B-3246-36D3-28C060879D3E}"/>
-              </a:ext>
-            </a:extLst>
-          </p:cNvPr>
-          <p:cNvSpPr>
-            <a:spLocks noGrp="1"/>
-          </p:cNvSpPr>
-          <p:nvPr>
-            <p:ph sz="quarter" idx="4"/>
-          </p:nvPr>
-        </p:nvSpPr>
-        <p:spPr/>
-        <p:txBody>
-          <a:bodyPr/>
-          <a:lstStyle/>
-          <a:p>
-            <a:endParaRPr lang="fr-FR"/>
+            <a:r>
+              <a:rPr lang="fr-FR">
+                <a:latin typeface="Roboto" panose="02000000000000000000" pitchFamily="2" charset="0"/>
+                <a:ea typeface="Roboto" panose="02000000000000000000" pitchFamily="2" charset="0"/>
+                <a:cs typeface="Roboto" panose="02000000000000000000" pitchFamily="2" charset="0"/>
+              </a:rPr>
+              <a:t>Environnement, technique ou sociétal?</a:t>
+            </a:r>
+          </a:p>
+        </p:txBody>
+      </p:sp>
+      <p:sp>
+        <p:nvSpPr>
+          <p:cNvPr id="3" name="Espace réservé du contenu 2">
+            <a:extLst>
+              <a:ext uri="{FF2B5EF4-FFF2-40B4-BE49-F238E27FC236}">
+                <a16:creationId xmlns:a16="http://schemas.microsoft.com/office/drawing/2014/main" id="{9400B42F-E437-C7AD-9F36-6C8331434BA5}"/>
+              </a:ext>
+            </a:extLst>
+          </p:cNvPr>
+          <p:cNvSpPr>
+            <a:spLocks noGrp="1"/>
+          </p:cNvSpPr>
+          <p:nvPr>
+            <p:ph idx="1"/>
+          </p:nvPr>
+        </p:nvSpPr>
+        <p:spPr>
+          <a:xfrm>
+            <a:off x="838200" y="1825625"/>
+            <a:ext cx="10515600" cy="1912657"/>
+          </a:xfrm>
+        </p:spPr>
+        <p:txBody>
+          <a:bodyPr>
+            <a:normAutofit lnSpcReduction="10000"/>
+          </a:bodyPr>
+          <a:lstStyle/>
+          <a:p>
+            <a:r>
+              <a:rPr lang="fr-FR">
+                <a:latin typeface="Roboto" panose="02000000000000000000" pitchFamily="2" charset="0"/>
+                <a:ea typeface="Roboto" panose="02000000000000000000" pitchFamily="2" charset="0"/>
+                <a:cs typeface="Roboto" panose="02000000000000000000" pitchFamily="2" charset="0"/>
+              </a:rPr>
+              <a:t>Technique</a:t>
+            </a:r>
+          </a:p>
+          <a:p>
+            <a:pPr lvl="1"/>
+            <a:r>
+              <a:rPr lang="fr-FR">
+                <a:latin typeface="Roboto" panose="02000000000000000000" pitchFamily="2" charset="0"/>
+                <a:ea typeface="Roboto" panose="02000000000000000000" pitchFamily="2" charset="0"/>
+                <a:cs typeface="Roboto" panose="02000000000000000000" pitchFamily="2" charset="0"/>
+              </a:rPr>
+              <a:t>Energie</a:t>
+            </a:r>
+          </a:p>
+          <a:p>
+            <a:pPr lvl="1"/>
+            <a:r>
+              <a:rPr lang="fr-FR">
+                <a:latin typeface="Roboto" panose="02000000000000000000" pitchFamily="2" charset="0"/>
+                <a:ea typeface="Roboto" panose="02000000000000000000" pitchFamily="2" charset="0"/>
+                <a:cs typeface="Roboto" panose="02000000000000000000" pitchFamily="2" charset="0"/>
+              </a:rPr>
+              <a:t>Transport en commun</a:t>
+            </a:r>
+          </a:p>
+          <a:p>
+            <a:pPr lvl="1"/>
+            <a:r>
+              <a:rPr lang="fr-FR">
+                <a:latin typeface="Roboto" panose="02000000000000000000" pitchFamily="2" charset="0"/>
+                <a:ea typeface="Roboto" panose="02000000000000000000" pitchFamily="2" charset="0"/>
+                <a:cs typeface="Roboto" panose="02000000000000000000" pitchFamily="2" charset="0"/>
+              </a:rPr>
+              <a:t>Agriculture</a:t>
+            </a:r>
+          </a:p>
+          <a:p>
+            <a:pPr lvl="1"/>
+            <a:r>
+              <a:rPr lang="fr-FR">
+                <a:latin typeface="Roboto" panose="02000000000000000000" pitchFamily="2" charset="0"/>
+                <a:ea typeface="Roboto" panose="02000000000000000000" pitchFamily="2" charset="0"/>
+                <a:cs typeface="Roboto" panose="02000000000000000000" pitchFamily="2" charset="0"/>
+              </a:rPr>
+              <a:t>Méthodes de production</a:t>
+            </a:r>
+          </a:p>
+        </p:txBody>
+      </p:sp>
+      <p:sp>
+        <p:nvSpPr>
+          <p:cNvPr id="4" name="Espace réservé du contenu 2">
+            <a:extLst>
+              <a:ext uri="{FF2B5EF4-FFF2-40B4-BE49-F238E27FC236}">
+                <a16:creationId xmlns:a16="http://schemas.microsoft.com/office/drawing/2014/main" id="{CBD98510-1BFB-E8AA-3F34-55A0877FE96E}"/>
+              </a:ext>
+            </a:extLst>
+          </p:cNvPr>
+          <p:cNvSpPr txBox="1">
+            <a:spLocks/>
+          </p:cNvSpPr>
+          <p:nvPr/>
+        </p:nvSpPr>
+        <p:spPr>
+          <a:xfrm>
+            <a:off x="838200" y="3873219"/>
+            <a:ext cx="10515600" cy="1912657"/>
+          </a:xfrm>
+          <a:prstGeom prst="rect">
+            <a:avLst/>
+          </a:prstGeom>
+        </p:spPr>
+        <p:txBody>
+          <a:bodyPr vert="horz" lIns="91440" tIns="45720" rIns="91440" bIns="45720" rtlCol="0">
+            <a:normAutofit/>
+          </a:bodyPr>
+          <a:lstStyle>
+            <a:lvl1pPr marL="228600" indent="-228600" algn="l" defTabSz="914400" rtl="0" eaLnBrk="1" latinLnBrk="0" hangingPunct="1">
+              <a:lnSpc>
+                <a:spcPct val="90000"/>
+              </a:lnSpc>
+              <a:spcBef>
+                <a:spcPts val="1000"/>
+              </a:spcBef>
+              <a:buFont typeface="Arial" panose="020B0604020202020204" pitchFamily="34" charset="0"/>
+              <a:buChar char="•"/>
+              <a:defRPr sz="2800" kern="1200">
+                <a:solidFill>
+                  <a:schemeClr val="tx1"/>
+                </a:solidFill>
+                <a:latin typeface="+mn-lt"/>
+                <a:ea typeface="+mn-ea"/>
+                <a:cs typeface="+mn-cs"/>
+              </a:defRPr>
+            </a:lvl1pPr>
+            <a:lvl2pPr marL="685800" indent="-228600" algn="l" defTabSz="914400" rtl="0" eaLnBrk="1" latinLnBrk="0" hangingPunct="1">
+              <a:lnSpc>
+                <a:spcPct val="90000"/>
+              </a:lnSpc>
+              <a:spcBef>
+                <a:spcPts val="500"/>
+              </a:spcBef>
+              <a:buFont typeface="Arial" panose="020B0604020202020204" pitchFamily="34" charset="0"/>
+              <a:buChar char="•"/>
+              <a:defRPr sz="2400" kern="1200">
+                <a:solidFill>
+                  <a:schemeClr val="tx1"/>
+                </a:solidFill>
+                <a:latin typeface="+mn-lt"/>
+                <a:ea typeface="+mn-ea"/>
+                <a:cs typeface="+mn-cs"/>
+              </a:defRPr>
+            </a:lvl2pPr>
+            <a:lvl3pPr marL="1143000" indent="-228600" algn="l" defTabSz="914400" rtl="0" eaLnBrk="1" latinLnBrk="0" hangingPunct="1">
+              <a:lnSpc>
+                <a:spcPct val="90000"/>
+              </a:lnSpc>
+              <a:spcBef>
+                <a:spcPts val="500"/>
+              </a:spcBef>
+              <a:buFont typeface="Arial" panose="020B0604020202020204" pitchFamily="34" charset="0"/>
+              <a:buChar char="•"/>
+              <a:defRPr sz="2000" kern="1200">
+                <a:solidFill>
+                  <a:schemeClr val="tx1"/>
+                </a:solidFill>
+                <a:latin typeface="+mn-lt"/>
+                <a:ea typeface="+mn-ea"/>
+                <a:cs typeface="+mn-cs"/>
+              </a:defRPr>
+            </a:lvl3pPr>
+            <a:lvl4pPr marL="1600200" indent="-228600" algn="l" defTabSz="914400" rtl="0" eaLnBrk="1" latinLnBrk="0" hangingPunct="1">
+              <a:lnSpc>
+                <a:spcPct val="90000"/>
+              </a:lnSpc>
+              <a:spcBef>
+                <a:spcPts val="500"/>
+              </a:spcBef>
+              <a:buFont typeface="Arial" panose="020B0604020202020204" pitchFamily="34" charset="0"/>
+              <a:buChar char="•"/>
+              <a:defRPr sz="1800" kern="1200">
+                <a:solidFill>
+                  <a:schemeClr val="tx1"/>
+                </a:solidFill>
+                <a:latin typeface="+mn-lt"/>
+                <a:ea typeface="+mn-ea"/>
+                <a:cs typeface="+mn-cs"/>
+              </a:defRPr>
+            </a:lvl4pPr>
+            <a:lvl5pPr marL="2057400" indent="-228600" algn="l" defTabSz="914400" rtl="0" eaLnBrk="1" latinLnBrk="0" hangingPunct="1">
+              <a:lnSpc>
+                <a:spcPct val="90000"/>
+              </a:lnSpc>
+              <a:spcBef>
+                <a:spcPts val="500"/>
+              </a:spcBef>
+              <a:buFont typeface="Arial" panose="020B0604020202020204" pitchFamily="34" charset="0"/>
+              <a:buChar char="•"/>
+              <a:defRPr sz="1800" kern="1200">
+                <a:solidFill>
+                  <a:schemeClr val="tx1"/>
+                </a:solidFill>
+                <a:latin typeface="+mn-lt"/>
+                <a:ea typeface="+mn-ea"/>
+                <a:cs typeface="+mn-cs"/>
+              </a:defRPr>
+            </a:lvl5pPr>
+            <a:lvl6pPr marL="2514600" indent="-228600" algn="l" defTabSz="914400" rtl="0" eaLnBrk="1" latinLnBrk="0" hangingPunct="1">
+              <a:lnSpc>
+                <a:spcPct val="90000"/>
+              </a:lnSpc>
+              <a:spcBef>
+                <a:spcPts val="500"/>
+              </a:spcBef>
+              <a:buFont typeface="Arial" panose="020B0604020202020204" pitchFamily="34" charset="0"/>
+              <a:buChar char="•"/>
+              <a:defRPr sz="1800" kern="1200">
+                <a:solidFill>
+                  <a:schemeClr val="tx1"/>
+                </a:solidFill>
+                <a:latin typeface="+mn-lt"/>
+                <a:ea typeface="+mn-ea"/>
+                <a:cs typeface="+mn-cs"/>
+              </a:defRPr>
+            </a:lvl6pPr>
+            <a:lvl7pPr marL="2971800" indent="-228600" algn="l" defTabSz="914400" rtl="0" eaLnBrk="1" latinLnBrk="0" hangingPunct="1">
+              <a:lnSpc>
+                <a:spcPct val="90000"/>
+              </a:lnSpc>
+              <a:spcBef>
+                <a:spcPts val="500"/>
+              </a:spcBef>
+              <a:buFont typeface="Arial" panose="020B0604020202020204" pitchFamily="34" charset="0"/>
+              <a:buChar char="•"/>
+              <a:defRPr sz="1800" kern="1200">
+                <a:solidFill>
+                  <a:schemeClr val="tx1"/>
+                </a:solidFill>
+                <a:latin typeface="+mn-lt"/>
+                <a:ea typeface="+mn-ea"/>
+                <a:cs typeface="+mn-cs"/>
+              </a:defRPr>
+            </a:lvl7pPr>
+            <a:lvl8pPr marL="3429000" indent="-228600" algn="l" defTabSz="914400" rtl="0" eaLnBrk="1" latinLnBrk="0" hangingPunct="1">
+              <a:lnSpc>
+                <a:spcPct val="90000"/>
+              </a:lnSpc>
+              <a:spcBef>
+                <a:spcPts val="500"/>
+              </a:spcBef>
+              <a:buFont typeface="Arial" panose="020B0604020202020204" pitchFamily="34" charset="0"/>
+              <a:buChar char="•"/>
+              <a:defRPr sz="1800" kern="1200">
+                <a:solidFill>
+                  <a:schemeClr val="tx1"/>
+                </a:solidFill>
+                <a:latin typeface="+mn-lt"/>
+                <a:ea typeface="+mn-ea"/>
+                <a:cs typeface="+mn-cs"/>
+              </a:defRPr>
+            </a:lvl8pPr>
+            <a:lvl9pPr marL="3886200" indent="-228600" algn="l" defTabSz="914400" rtl="0" eaLnBrk="1" latinLnBrk="0" hangingPunct="1">
+              <a:lnSpc>
+                <a:spcPct val="90000"/>
+              </a:lnSpc>
+              <a:spcBef>
+                <a:spcPts val="500"/>
+              </a:spcBef>
+              <a:buFont typeface="Arial" panose="020B0604020202020204" pitchFamily="34" charset="0"/>
+              <a:buChar char="•"/>
+              <a:defRPr sz="1800" kern="1200">
+                <a:solidFill>
+                  <a:schemeClr val="tx1"/>
+                </a:solidFill>
+                <a:latin typeface="+mn-lt"/>
+                <a:ea typeface="+mn-ea"/>
+                <a:cs typeface="+mn-cs"/>
+              </a:defRPr>
+            </a:lvl9pPr>
+          </a:lstStyle>
+          <a:p>
+            <a:r>
+              <a:rPr lang="fr-FR">
+                <a:latin typeface="Roboto" panose="02000000000000000000" pitchFamily="2" charset="0"/>
+                <a:ea typeface="Roboto" panose="02000000000000000000" pitchFamily="2" charset="0"/>
+                <a:cs typeface="Roboto" panose="02000000000000000000" pitchFamily="2" charset="0"/>
+              </a:rPr>
+              <a:t>Sociétal</a:t>
+            </a:r>
+          </a:p>
+          <a:p>
+            <a:pPr lvl="1"/>
+            <a:r>
+              <a:rPr lang="fr-FR">
+                <a:latin typeface="Roboto" panose="02000000000000000000" pitchFamily="2" charset="0"/>
+                <a:ea typeface="Roboto" panose="02000000000000000000" pitchFamily="2" charset="0"/>
+                <a:cs typeface="Roboto" panose="02000000000000000000" pitchFamily="2" charset="0"/>
+              </a:rPr>
+              <a:t>Questionner et </a:t>
+            </a:r>
+            <a:r>
+              <a:rPr lang="fr-FR" b="1">
+                <a:latin typeface="Roboto" panose="02000000000000000000" pitchFamily="2" charset="0"/>
+                <a:ea typeface="Roboto" panose="02000000000000000000" pitchFamily="2" charset="0"/>
+                <a:cs typeface="Roboto" panose="02000000000000000000" pitchFamily="2" charset="0"/>
+              </a:rPr>
+              <a:t>modifier</a:t>
+            </a:r>
+            <a:r>
+              <a:rPr lang="fr-FR">
+                <a:latin typeface="Roboto" panose="02000000000000000000" pitchFamily="2" charset="0"/>
+                <a:ea typeface="Roboto" panose="02000000000000000000" pitchFamily="2" charset="0"/>
+                <a:cs typeface="Roboto" panose="02000000000000000000" pitchFamily="2" charset="0"/>
+              </a:rPr>
+              <a:t> le système</a:t>
+            </a:r>
+          </a:p>
+          <a:p>
+            <a:pPr lvl="1"/>
+            <a:r>
+              <a:rPr lang="fr-FR">
+                <a:latin typeface="Roboto" panose="02000000000000000000" pitchFamily="2" charset="0"/>
+                <a:ea typeface="Roboto" panose="02000000000000000000" pitchFamily="2" charset="0"/>
+                <a:cs typeface="Roboto" panose="02000000000000000000" pitchFamily="2" charset="0"/>
+              </a:rPr>
+              <a:t>Les valeurs et indicateurs</a:t>
+            </a:r>
+          </a:p>
+          <a:p>
+            <a:pPr lvl="1"/>
+            <a:r>
+              <a:rPr lang="fr-FR">
+                <a:latin typeface="Roboto" panose="02000000000000000000" pitchFamily="2" charset="0"/>
+                <a:ea typeface="Roboto" panose="02000000000000000000" pitchFamily="2" charset="0"/>
+                <a:cs typeface="Roboto" panose="02000000000000000000" pitchFamily="2" charset="0"/>
+              </a:rPr>
+              <a:t>Repenser la réussite</a:t>
+            </a:r>
           </a:p>
         </p:txBody>
       </p:sp>
     </p:spTree>
     <p:extLst>
       <p:ext uri="{BB962C8B-B14F-4D97-AF65-F5344CB8AC3E}">
-        <p14:creationId xmlns:p14="http://schemas.microsoft.com/office/powerpoint/2010/main" val="907941206"/>
+        <p14:creationId xmlns:p14="http://schemas.microsoft.com/office/powerpoint/2010/main" val="4282326366"/>
+      </p:ext>
+    </p:extLst>
+  </p:cSld>
+  <p:clrMapOvr>
+    <a:masterClrMapping/>
+  </p:clrMapOvr>
+</p:sld>
+</file>
+
+<file path=ppt/slides/slide5.xml><?xml version="1.0" encoding="utf-8"?>
+<p:sld xmlns:a="http://schemas.openxmlformats.org/drawingml/2006/main" xmlns:r="http://schemas.openxmlformats.org/officeDocument/2006/relationships" xmlns:p="http://schemas.openxmlformats.org/presentationml/2006/main">
+  <p:cSld>
+    <p:bg>
+      <p:bgPr>
+        <a:pattFill prst="pct20">
+          <a:fgClr>
+            <a:schemeClr val="accent1"/>
+          </a:fgClr>
+          <a:bgClr>
+            <a:schemeClr val="bg1"/>
+          </a:bgClr>
+        </a:pattFill>
+        <a:effectLst/>
+      </p:bgPr>
+    </p:bg>
+    <p:spTree>
+      <p:nvGrpSpPr>
+        <p:cNvPr id="1" name=""/>
+        <p:cNvGrpSpPr/>
+        <p:nvPr/>
+      </p:nvGrpSpPr>
+      <p:grpSpPr>
+        <a:xfrm>
+          <a:off x="0" y="0"/>
+          <a:ext cx="0" cy="0"/>
+          <a:chOff x="0" y="0"/>
+          <a:chExt cx="0" cy="0"/>
+        </a:xfrm>
+      </p:grpSpPr>
+      <p:sp>
+        <p:nvSpPr>
+          <p:cNvPr id="2" name="Titre 1">
+            <a:extLst>
+              <a:ext uri="{FF2B5EF4-FFF2-40B4-BE49-F238E27FC236}">
+                <a16:creationId xmlns:a16="http://schemas.microsoft.com/office/drawing/2014/main" id="{F848B694-19D9-6C6D-0A76-4FDAD8D2CEFA}"/>
+              </a:ext>
+            </a:extLst>
+          </p:cNvPr>
+          <p:cNvSpPr>
+            <a:spLocks noGrp="1"/>
+          </p:cNvSpPr>
+          <p:nvPr>
+            <p:ph type="title"/>
+          </p:nvPr>
+        </p:nvSpPr>
+        <p:spPr/>
+        <p:txBody>
+          <a:bodyPr/>
+          <a:lstStyle/>
+          <a:p>
+            <a:r>
+              <a:rPr lang="fr-FR">
+                <a:latin typeface="Roboto" panose="02000000000000000000" pitchFamily="2" charset="0"/>
+                <a:ea typeface="Roboto" panose="02000000000000000000" pitchFamily="2" charset="0"/>
+                <a:cs typeface="Roboto" panose="02000000000000000000" pitchFamily="2" charset="0"/>
+              </a:rPr>
+              <a:t>Douze levier pour intervenir dans un système</a:t>
+            </a:r>
+          </a:p>
+        </p:txBody>
+      </p:sp>
+      <p:sp>
+        <p:nvSpPr>
+          <p:cNvPr id="3" name="Espace réservé du contenu 2">
+            <a:extLst>
+              <a:ext uri="{FF2B5EF4-FFF2-40B4-BE49-F238E27FC236}">
+                <a16:creationId xmlns:a16="http://schemas.microsoft.com/office/drawing/2014/main" id="{45B3DDF6-4FFB-672F-3F81-B8CA6F8F5CF8}"/>
+              </a:ext>
+            </a:extLst>
+          </p:cNvPr>
+          <p:cNvSpPr>
+            <a:spLocks noGrp="1"/>
+          </p:cNvSpPr>
+          <p:nvPr>
+            <p:ph idx="1"/>
+          </p:nvPr>
+        </p:nvSpPr>
+        <p:spPr>
+          <a:xfrm>
+            <a:off x="838200" y="1727388"/>
+            <a:ext cx="10515600" cy="4802187"/>
+          </a:xfrm>
+        </p:spPr>
+        <p:txBody>
+          <a:bodyPr numCol="2">
+            <a:noAutofit/>
+          </a:bodyPr>
+          <a:lstStyle/>
+          <a:p>
+            <a:pPr marL="0" indent="0">
+              <a:lnSpc>
+                <a:spcPct val="100000"/>
+              </a:lnSpc>
+              <a:buNone/>
+            </a:pPr>
+            <a:r>
+              <a:rPr lang="fr-FR" sz="2400">
+                <a:latin typeface="Roboto" panose="02000000000000000000" pitchFamily="2" charset="0"/>
+                <a:ea typeface="Roboto" panose="02000000000000000000" pitchFamily="2" charset="0"/>
+                <a:cs typeface="Roboto" panose="02000000000000000000" pitchFamily="2" charset="0"/>
+              </a:rPr>
+              <a:t>12. Constantes, paramètres et nombres</a:t>
+            </a:r>
+          </a:p>
+          <a:p>
+            <a:pPr marL="0" indent="0">
+              <a:lnSpc>
+                <a:spcPct val="100000"/>
+              </a:lnSpc>
+              <a:buNone/>
+            </a:pPr>
+            <a:r>
+              <a:rPr lang="fr-FR" sz="2400">
+                <a:latin typeface="Roboto" panose="02000000000000000000" pitchFamily="2" charset="0"/>
+                <a:ea typeface="Roboto" panose="02000000000000000000" pitchFamily="2" charset="0"/>
+                <a:cs typeface="Roboto" panose="02000000000000000000" pitchFamily="2" charset="0"/>
+              </a:rPr>
+              <a:t>11. La taille des tampons et autres stocks de staibilisation</a:t>
+            </a:r>
+          </a:p>
+          <a:p>
+            <a:pPr marL="0" indent="0">
+              <a:lnSpc>
+                <a:spcPct val="100000"/>
+              </a:lnSpc>
+              <a:buNone/>
+            </a:pPr>
+            <a:r>
+              <a:rPr lang="fr-FR" sz="2400">
+                <a:latin typeface="Roboto" panose="02000000000000000000" pitchFamily="2" charset="0"/>
+                <a:ea typeface="Roboto" panose="02000000000000000000" pitchFamily="2" charset="0"/>
+                <a:cs typeface="Roboto" panose="02000000000000000000" pitchFamily="2" charset="0"/>
+              </a:rPr>
+              <a:t>10. Structure des stocks et flux de matière</a:t>
+            </a:r>
+          </a:p>
+          <a:p>
+            <a:pPr marL="0" indent="0">
+              <a:lnSpc>
+                <a:spcPct val="100000"/>
+              </a:lnSpc>
+              <a:buNone/>
+            </a:pPr>
+            <a:r>
+              <a:rPr lang="fr-FR" sz="2400">
+                <a:latin typeface="Roboto" panose="02000000000000000000" pitchFamily="2" charset="0"/>
+                <a:ea typeface="Roboto" panose="02000000000000000000" pitchFamily="2" charset="0"/>
+                <a:cs typeface="Roboto" panose="02000000000000000000" pitchFamily="2" charset="0"/>
+              </a:rPr>
+              <a:t>9. Durée des retards, comparée au rythme d’évolution du système</a:t>
+            </a:r>
+          </a:p>
+          <a:p>
+            <a:pPr marL="0" indent="0">
+              <a:lnSpc>
+                <a:spcPct val="100000"/>
+              </a:lnSpc>
+              <a:buNone/>
+            </a:pPr>
+            <a:r>
+              <a:rPr lang="fr-FR" sz="2400">
+                <a:latin typeface="Roboto" panose="02000000000000000000" pitchFamily="2" charset="0"/>
+                <a:ea typeface="Roboto" panose="02000000000000000000" pitchFamily="2" charset="0"/>
+                <a:cs typeface="Roboto" panose="02000000000000000000" pitchFamily="2" charset="0"/>
+              </a:rPr>
+              <a:t>8. Boucle de rétroaction négative</a:t>
+            </a:r>
+          </a:p>
+          <a:p>
+            <a:pPr marL="0" indent="0">
+              <a:lnSpc>
+                <a:spcPct val="100000"/>
+              </a:lnSpc>
+              <a:buNone/>
+            </a:pPr>
+            <a:r>
+              <a:rPr lang="fr-FR" sz="2400">
+                <a:latin typeface="Roboto" panose="02000000000000000000" pitchFamily="2" charset="0"/>
+                <a:ea typeface="Roboto" panose="02000000000000000000" pitchFamily="2" charset="0"/>
+                <a:cs typeface="Roboto" panose="02000000000000000000" pitchFamily="2" charset="0"/>
+              </a:rPr>
+              <a:t>7. Canaliser les boucles rétroaction positive</a:t>
+            </a:r>
+          </a:p>
+          <a:p>
+            <a:pPr marL="0" indent="0">
+              <a:buFont typeface="Arial" panose="020B0604020202020204" pitchFamily="34" charset="0"/>
+              <a:buNone/>
+            </a:pPr>
+            <a:r>
+              <a:rPr lang="fr-FR" sz="2400">
+                <a:latin typeface="Roboto" panose="02000000000000000000" pitchFamily="2" charset="0"/>
+                <a:ea typeface="Roboto" panose="02000000000000000000" pitchFamily="2" charset="0"/>
+                <a:cs typeface="Roboto" panose="02000000000000000000" pitchFamily="2" charset="0"/>
+              </a:rPr>
+              <a:t>6. Structure des flux d’informations</a:t>
+            </a:r>
+          </a:p>
+          <a:p>
+            <a:pPr marL="0" indent="0">
+              <a:buFont typeface="Arial" panose="020B0604020202020204" pitchFamily="34" charset="0"/>
+              <a:buNone/>
+            </a:pPr>
+            <a:r>
+              <a:rPr lang="fr-FR" sz="2400">
+                <a:latin typeface="Roboto" panose="02000000000000000000" pitchFamily="2" charset="0"/>
+                <a:ea typeface="Roboto" panose="02000000000000000000" pitchFamily="2" charset="0"/>
+                <a:cs typeface="Roboto" panose="02000000000000000000" pitchFamily="2" charset="0"/>
+              </a:rPr>
+              <a:t>5. Règles du système</a:t>
+            </a:r>
+          </a:p>
+          <a:p>
+            <a:pPr marL="0" indent="0">
+              <a:buFont typeface="Arial" panose="020B0604020202020204" pitchFamily="34" charset="0"/>
+              <a:buNone/>
+            </a:pPr>
+            <a:r>
+              <a:rPr lang="fr-FR" sz="2400">
+                <a:latin typeface="Roboto" panose="02000000000000000000" pitchFamily="2" charset="0"/>
+                <a:ea typeface="Roboto" panose="02000000000000000000" pitchFamily="2" charset="0"/>
+                <a:cs typeface="Roboto" panose="02000000000000000000" pitchFamily="2" charset="0"/>
+              </a:rPr>
+              <a:t>4. Le pouvoir d’ajouter, de modifier, de faire évoluer ou d’auto-organiser la structure du système</a:t>
+            </a:r>
+          </a:p>
+          <a:p>
+            <a:pPr marL="0" indent="0">
+              <a:buFont typeface="Arial" panose="020B0604020202020204" pitchFamily="34" charset="0"/>
+              <a:buNone/>
+            </a:pPr>
+            <a:r>
+              <a:rPr lang="fr-FR" sz="2400">
+                <a:latin typeface="Roboto" panose="02000000000000000000" pitchFamily="2" charset="0"/>
+                <a:ea typeface="Roboto" panose="02000000000000000000" pitchFamily="2" charset="0"/>
+                <a:cs typeface="Roboto" panose="02000000000000000000" pitchFamily="2" charset="0"/>
+              </a:rPr>
+              <a:t>3. L’objectif du système</a:t>
+            </a:r>
+          </a:p>
+          <a:p>
+            <a:pPr marL="0" indent="0">
+              <a:buFont typeface="Arial" panose="020B0604020202020204" pitchFamily="34" charset="0"/>
+              <a:buNone/>
+            </a:pPr>
+            <a:r>
+              <a:rPr lang="fr-FR" sz="2400">
+                <a:latin typeface="Roboto" panose="02000000000000000000" pitchFamily="2" charset="0"/>
+                <a:ea typeface="Roboto" panose="02000000000000000000" pitchFamily="2" charset="0"/>
+                <a:cs typeface="Roboto" panose="02000000000000000000" pitchFamily="2" charset="0"/>
+              </a:rPr>
+              <a:t>2. La mentalité ou le paradigme dont est issu le système</a:t>
+            </a:r>
+          </a:p>
+          <a:p>
+            <a:pPr marL="0" indent="0">
+              <a:buFont typeface="Arial" panose="020B0604020202020204" pitchFamily="34" charset="0"/>
+              <a:buNone/>
+            </a:pPr>
+            <a:r>
+              <a:rPr lang="fr-FR" sz="2400">
+                <a:latin typeface="Roboto" panose="02000000000000000000" pitchFamily="2" charset="0"/>
+                <a:ea typeface="Roboto" panose="02000000000000000000" pitchFamily="2" charset="0"/>
+                <a:cs typeface="Roboto" panose="02000000000000000000" pitchFamily="2" charset="0"/>
+              </a:rPr>
+              <a:t>1. Transcender les paradigmes</a:t>
+            </a:r>
+          </a:p>
+          <a:p>
+            <a:pPr marL="0" indent="0">
+              <a:lnSpc>
+                <a:spcPct val="100000"/>
+              </a:lnSpc>
+              <a:buNone/>
+            </a:pPr>
+            <a:endParaRPr lang="fr-FR" sz="2400">
+              <a:latin typeface="Roboto" panose="02000000000000000000" pitchFamily="2" charset="0"/>
+              <a:ea typeface="Roboto" panose="02000000000000000000" pitchFamily="2" charset="0"/>
+              <a:cs typeface="Roboto" panose="02000000000000000000" pitchFamily="2" charset="0"/>
+            </a:endParaRPr>
+          </a:p>
+          <a:p>
+            <a:pPr marL="0" indent="0" algn="r">
+              <a:lnSpc>
+                <a:spcPct val="100000"/>
+              </a:lnSpc>
+              <a:buNone/>
+            </a:pPr>
+            <a:r>
+              <a:rPr lang="fr-FR" sz="2400">
+                <a:latin typeface="Roboto" panose="02000000000000000000" pitchFamily="2" charset="0"/>
+                <a:ea typeface="Roboto" panose="02000000000000000000" pitchFamily="2" charset="0"/>
+                <a:cs typeface="Roboto" panose="02000000000000000000" pitchFamily="2" charset="0"/>
+              </a:rPr>
+              <a:t>Donella Meadows</a:t>
+            </a:r>
+          </a:p>
+        </p:txBody>
+      </p:sp>
+    </p:spTree>
+    <p:extLst>
+      <p:ext uri="{BB962C8B-B14F-4D97-AF65-F5344CB8AC3E}">
+        <p14:creationId xmlns:p14="http://schemas.microsoft.com/office/powerpoint/2010/main" val="2145472797"/>
+      </p:ext>
+    </p:extLst>
+  </p:cSld>
+  <p:clrMapOvr>
+    <a:masterClrMapping/>
+  </p:clrMapOvr>
+</p:sld>
+</file>
+
+<file path=ppt/slides/slide6.xml><?xml version="1.0" encoding="utf-8"?>
+<p:sld xmlns:a="http://schemas.openxmlformats.org/drawingml/2006/main" xmlns:r="http://schemas.openxmlformats.org/officeDocument/2006/relationships" xmlns:p="http://schemas.openxmlformats.org/presentationml/2006/main">
+  <p:cSld>
+    <p:bg>
+      <p:bgPr>
+        <a:pattFill prst="pct20">
+          <a:fgClr>
+            <a:schemeClr val="accent1"/>
+          </a:fgClr>
+          <a:bgClr>
+            <a:schemeClr val="bg1"/>
+          </a:bgClr>
+        </a:pattFill>
+        <a:effectLst/>
+      </p:bgPr>
+    </p:bg>
+    <p:spTree>
+      <p:nvGrpSpPr>
+        <p:cNvPr id="1" name=""/>
+        <p:cNvGrpSpPr/>
+        <p:nvPr/>
+      </p:nvGrpSpPr>
+      <p:grpSpPr>
+        <a:xfrm>
+          <a:off x="0" y="0"/>
+          <a:ext cx="0" cy="0"/>
+          <a:chOff x="0" y="0"/>
+          <a:chExt cx="0" cy="0"/>
+        </a:xfrm>
+      </p:grpSpPr>
+      <p:sp>
+        <p:nvSpPr>
+          <p:cNvPr id="2" name="Titre 1">
+            <a:extLst>
+              <a:ext uri="{FF2B5EF4-FFF2-40B4-BE49-F238E27FC236}">
+                <a16:creationId xmlns:a16="http://schemas.microsoft.com/office/drawing/2014/main" id="{F848B694-19D9-6C6D-0A76-4FDAD8D2CEFA}"/>
+              </a:ext>
+            </a:extLst>
+          </p:cNvPr>
+          <p:cNvSpPr>
+            <a:spLocks noGrp="1"/>
+          </p:cNvSpPr>
+          <p:nvPr>
+            <p:ph type="title"/>
+          </p:nvPr>
+        </p:nvSpPr>
+        <p:spPr/>
+        <p:txBody>
+          <a:bodyPr/>
+          <a:lstStyle/>
+          <a:p>
+            <a:r>
+              <a:rPr lang="fr-FR">
+                <a:latin typeface="Roboto" panose="02000000000000000000" pitchFamily="2" charset="0"/>
+                <a:ea typeface="Roboto" panose="02000000000000000000" pitchFamily="2" charset="0"/>
+                <a:cs typeface="Roboto" panose="02000000000000000000" pitchFamily="2" charset="0"/>
+              </a:rPr>
+              <a:t>Douze levier pour intervenir dans un système</a:t>
+            </a:r>
+          </a:p>
+        </p:txBody>
+      </p:sp>
+      <p:sp>
+        <p:nvSpPr>
+          <p:cNvPr id="3" name="Espace réservé du contenu 2">
+            <a:extLst>
+              <a:ext uri="{FF2B5EF4-FFF2-40B4-BE49-F238E27FC236}">
+                <a16:creationId xmlns:a16="http://schemas.microsoft.com/office/drawing/2014/main" id="{45B3DDF6-4FFB-672F-3F81-B8CA6F8F5CF8}"/>
+              </a:ext>
+            </a:extLst>
+          </p:cNvPr>
+          <p:cNvSpPr>
+            <a:spLocks noGrp="1"/>
+          </p:cNvSpPr>
+          <p:nvPr>
+            <p:ph idx="1"/>
+          </p:nvPr>
+        </p:nvSpPr>
+        <p:spPr>
+          <a:xfrm>
+            <a:off x="838200" y="2496812"/>
+            <a:ext cx="5696712" cy="2770094"/>
+          </a:xfrm>
+        </p:spPr>
+        <p:txBody>
+          <a:bodyPr>
+            <a:normAutofit/>
+          </a:bodyPr>
+          <a:lstStyle/>
+          <a:p>
+            <a:pPr marL="0" indent="0">
+              <a:buNone/>
+            </a:pPr>
+            <a:r>
+              <a:rPr lang="fr-FR" sz="2400" b="1">
+                <a:latin typeface="Roboto" panose="02000000000000000000" pitchFamily="2" charset="0"/>
+                <a:ea typeface="Roboto" panose="02000000000000000000" pitchFamily="2" charset="0"/>
+                <a:cs typeface="Roboto" panose="02000000000000000000" pitchFamily="2" charset="0"/>
+              </a:rPr>
+              <a:t>12. Constantes, paramètres et nombres</a:t>
+            </a:r>
+          </a:p>
+          <a:p>
+            <a:pPr marL="0" indent="0">
+              <a:buNone/>
+            </a:pPr>
+            <a:endParaRPr lang="fr-FR" sz="2400" b="1">
+              <a:latin typeface="Roboto" panose="02000000000000000000" pitchFamily="2" charset="0"/>
+              <a:ea typeface="Roboto" panose="02000000000000000000" pitchFamily="2" charset="0"/>
+              <a:cs typeface="Roboto" panose="02000000000000000000" pitchFamily="2" charset="0"/>
+            </a:endParaRPr>
+          </a:p>
+          <a:p>
+            <a:pPr marL="0" indent="0">
+              <a:buFont typeface="Arial" panose="020B0604020202020204" pitchFamily="34" charset="0"/>
+              <a:buNone/>
+            </a:pPr>
+            <a:r>
+              <a:rPr lang="fr-FR" sz="2400" b="1">
+                <a:latin typeface="Roboto" panose="02000000000000000000" pitchFamily="2" charset="0"/>
+                <a:ea typeface="Roboto" panose="02000000000000000000" pitchFamily="2" charset="0"/>
+                <a:cs typeface="Roboto" panose="02000000000000000000" pitchFamily="2" charset="0"/>
+              </a:rPr>
+              <a:t>3. L’objectif du système</a:t>
+            </a:r>
+          </a:p>
+          <a:p>
+            <a:pPr marL="0" indent="0">
+              <a:buFont typeface="Arial" panose="020B0604020202020204" pitchFamily="34" charset="0"/>
+              <a:buNone/>
+            </a:pPr>
+            <a:endParaRPr lang="fr-FR" sz="2400" b="1">
+              <a:latin typeface="Roboto" panose="02000000000000000000" pitchFamily="2" charset="0"/>
+              <a:ea typeface="Roboto" panose="02000000000000000000" pitchFamily="2" charset="0"/>
+              <a:cs typeface="Roboto" panose="02000000000000000000" pitchFamily="2" charset="0"/>
+            </a:endParaRPr>
+          </a:p>
+          <a:p>
+            <a:pPr marL="0" indent="0">
+              <a:buFont typeface="Arial" panose="020B0604020202020204" pitchFamily="34" charset="0"/>
+              <a:buNone/>
+            </a:pPr>
+            <a:r>
+              <a:rPr lang="fr-FR" sz="2400" b="1">
+                <a:latin typeface="Roboto" panose="02000000000000000000" pitchFamily="2" charset="0"/>
+                <a:ea typeface="Roboto" panose="02000000000000000000" pitchFamily="2" charset="0"/>
+                <a:cs typeface="Roboto" panose="02000000000000000000" pitchFamily="2" charset="0"/>
+              </a:rPr>
+              <a:t>1. Transcender les paradigmes</a:t>
+            </a:r>
+          </a:p>
+        </p:txBody>
+      </p:sp>
+      <p:pic>
+        <p:nvPicPr>
+          <p:cNvPr id="1026" name="Picture 2" descr="Lac Léman tourisme">
+            <a:extLst>
+              <a:ext uri="{FF2B5EF4-FFF2-40B4-BE49-F238E27FC236}">
+                <a16:creationId xmlns:a16="http://schemas.microsoft.com/office/drawing/2014/main" id="{D22F999D-A437-757A-54E8-D8473FECE860}"/>
+              </a:ext>
+            </a:extLst>
+          </p:cNvPr>
+          <p:cNvPicPr>
+            <a:picLocks noChangeAspect="1" noChangeArrowheads="1"/>
+          </p:cNvPicPr>
+          <p:nvPr/>
+        </p:nvPicPr>
+        <p:blipFill>
+          <a:blip r:embed="rId3">
+            <a:extLst>
+              <a:ext uri="{28A0092B-C50C-407E-A947-70E740481C1C}">
+                <a14:useLocalDpi xmlns:a14="http://schemas.microsoft.com/office/drawing/2010/main" val="0"/>
+              </a:ext>
+            </a:extLst>
+          </a:blip>
+          <a:srcRect/>
+          <a:stretch>
+            <a:fillRect/>
+          </a:stretch>
+        </p:blipFill>
+        <p:spPr bwMode="auto">
+          <a:xfrm>
+            <a:off x="6534912" y="2191871"/>
+            <a:ext cx="5067617" cy="3379976"/>
+          </a:xfrm>
+          <a:prstGeom prst="rect">
+            <a:avLst/>
+          </a:prstGeom>
+          <a:noFill/>
+          <a:extLst>
+            <a:ext uri="{909E8E84-426E-40DD-AFC4-6F175D3DCCD1}">
+              <a14:hiddenFill xmlns:a14="http://schemas.microsoft.com/office/drawing/2010/main">
+                <a:solidFill>
+                  <a:srgbClr val="FFFFFF"/>
+                </a:solidFill>
+              </a14:hiddenFill>
+            </a:ext>
+          </a:extLst>
+        </p:spPr>
+      </p:pic>
+    </p:spTree>
+    <p:extLst>
+      <p:ext uri="{BB962C8B-B14F-4D97-AF65-F5344CB8AC3E}">
+        <p14:creationId xmlns:p14="http://schemas.microsoft.com/office/powerpoint/2010/main" val="1876721931"/>
+      </p:ext>
+    </p:extLst>
+  </p:cSld>
+  <p:clrMapOvr>
+    <a:masterClrMapping/>
+  </p:clrMapOvr>
+</p:sld>
+</file>
+
+<file path=ppt/slides/slide7.xml><?xml version="1.0" encoding="utf-8"?>
+<p:sld xmlns:a="http://schemas.openxmlformats.org/drawingml/2006/main" xmlns:r="http://schemas.openxmlformats.org/officeDocument/2006/relationships" xmlns:p="http://schemas.openxmlformats.org/presentationml/2006/main">
+  <p:cSld>
+    <p:spTree>
+      <p:nvGrpSpPr>
+        <p:cNvPr id="1" name=""/>
+        <p:cNvGrpSpPr/>
+        <p:nvPr/>
+      </p:nvGrpSpPr>
+      <p:grpSpPr>
+        <a:xfrm>
+          <a:off x="0" y="0"/>
+          <a:ext cx="0" cy="0"/>
+          <a:chOff x="0" y="0"/>
+          <a:chExt cx="0" cy="0"/>
+        </a:xfrm>
+      </p:grpSpPr>
+      <p:sp>
+        <p:nvSpPr>
+          <p:cNvPr id="2" name="Titre 1">
+            <a:extLst>
+              <a:ext uri="{FF2B5EF4-FFF2-40B4-BE49-F238E27FC236}">
+                <a16:creationId xmlns:a16="http://schemas.microsoft.com/office/drawing/2014/main" id="{152F259D-3A69-D721-DC9E-6385C0E87EB4}"/>
+              </a:ext>
+            </a:extLst>
+          </p:cNvPr>
+          <p:cNvSpPr txBox="1">
+            <a:spLocks/>
+          </p:cNvSpPr>
+          <p:nvPr/>
+        </p:nvSpPr>
+        <p:spPr>
+          <a:xfrm>
+            <a:off x="6936828" y="788276"/>
+            <a:ext cx="4410621" cy="5502165"/>
+          </a:xfrm>
+          <a:prstGeom prst="rect">
+            <a:avLst/>
+          </a:prstGeom>
+        </p:spPr>
+        <p:txBody>
+          <a:bodyPr>
+            <a:normAutofit/>
+          </a:bodyPr>
+          <a:lstStyle>
+            <a:lvl1pPr algn="l" defTabSz="914400" rtl="0" eaLnBrk="1" latinLnBrk="0" hangingPunct="1">
+              <a:lnSpc>
+                <a:spcPct val="90000"/>
+              </a:lnSpc>
+              <a:spcBef>
+                <a:spcPct val="0"/>
+              </a:spcBef>
+              <a:buNone/>
+              <a:defRPr sz="4400" kern="1200">
+                <a:solidFill>
+                  <a:schemeClr val="tx1"/>
+                </a:solidFill>
+                <a:latin typeface="+mj-lt"/>
+                <a:ea typeface="+mj-ea"/>
+                <a:cs typeface="+mj-cs"/>
+              </a:defRPr>
+            </a:lvl1pPr>
+          </a:lstStyle>
+          <a:p>
+            <a:r>
+              <a:rPr lang="fr-FR" b="1">
+                <a:latin typeface="Roboto" panose="02000000000000000000" pitchFamily="2" charset="0"/>
+                <a:ea typeface="Roboto" panose="02000000000000000000" pitchFamily="2" charset="0"/>
+                <a:cs typeface="Roboto" panose="02000000000000000000" pitchFamily="2" charset="0"/>
+              </a:rPr>
+              <a:t>Projet Horizon</a:t>
+            </a:r>
+          </a:p>
+          <a:p>
+            <a:endParaRPr lang="fr-FR">
+              <a:latin typeface="Roboto" panose="02000000000000000000" pitchFamily="2" charset="0"/>
+              <a:ea typeface="Roboto" panose="02000000000000000000" pitchFamily="2" charset="0"/>
+              <a:cs typeface="Roboto" panose="02000000000000000000" pitchFamily="2" charset="0"/>
+            </a:endParaRPr>
+          </a:p>
+          <a:p>
+            <a:r>
+              <a:rPr lang="fr-FR" i="1">
+                <a:latin typeface="Roboto" panose="02000000000000000000" pitchFamily="2" charset="0"/>
+                <a:ea typeface="Roboto" panose="02000000000000000000" pitchFamily="2" charset="0"/>
+                <a:cs typeface="Roboto" panose="02000000000000000000" pitchFamily="2" charset="0"/>
+              </a:rPr>
+              <a:t>Facebook annonce en 2019 un réseau social basé sur la réalité virtuelle</a:t>
+            </a:r>
+          </a:p>
+        </p:txBody>
+      </p:sp>
+      <p:pic>
+        <p:nvPicPr>
+          <p:cNvPr id="4" name="Picture 4">
+            <a:extLst>
+              <a:ext uri="{FF2B5EF4-FFF2-40B4-BE49-F238E27FC236}">
+                <a16:creationId xmlns:a16="http://schemas.microsoft.com/office/drawing/2014/main" id="{75781E28-499E-AE75-C058-AC3CE8B00C41}"/>
+              </a:ext>
+            </a:extLst>
+          </p:cNvPr>
+          <p:cNvPicPr>
+            <a:picLocks noChangeAspect="1" noChangeArrowheads="1"/>
+          </p:cNvPicPr>
+          <p:nvPr/>
+        </p:nvPicPr>
+        <p:blipFill rotWithShape="1">
+          <a:blip r:embed="rId3">
+            <a:extLst>
+              <a:ext uri="{28A0092B-C50C-407E-A947-70E740481C1C}">
+                <a14:useLocalDpi xmlns:a14="http://schemas.microsoft.com/office/drawing/2010/main" val="0"/>
+              </a:ext>
+            </a:extLst>
+          </a:blip>
+          <a:srcRect l="29150" r="26405"/>
+          <a:stretch/>
+        </p:blipFill>
+        <p:spPr bwMode="auto">
+          <a:xfrm>
+            <a:off x="0" y="0"/>
+            <a:ext cx="6096000" cy="6858000"/>
+          </a:xfrm>
+          <a:prstGeom prst="rect">
+            <a:avLst/>
+          </a:prstGeom>
+          <a:noFill/>
+          <a:extLst>
+            <a:ext uri="{909E8E84-426E-40DD-AFC4-6F175D3DCCD1}">
+              <a14:hiddenFill xmlns:a14="http://schemas.microsoft.com/office/drawing/2010/main">
+                <a:solidFill>
+                  <a:srgbClr val="FFFFFF"/>
+                </a:solidFill>
+              </a14:hiddenFill>
+            </a:ext>
+          </a:extLst>
+        </p:spPr>
+      </p:pic>
+      <p:pic>
+        <p:nvPicPr>
+          <p:cNvPr id="1036" name="Picture 12">
+            <a:extLst>
+              <a:ext uri="{FF2B5EF4-FFF2-40B4-BE49-F238E27FC236}">
+                <a16:creationId xmlns:a16="http://schemas.microsoft.com/office/drawing/2014/main" id="{A09EA611-EB0D-2DE7-3BA5-791058826AFD}"/>
+              </a:ext>
+            </a:extLst>
+          </p:cNvPr>
+          <p:cNvPicPr>
+            <a:picLocks noChangeAspect="1" noChangeArrowheads="1"/>
+          </p:cNvPicPr>
+          <p:nvPr/>
+        </p:nvPicPr>
+        <p:blipFill>
+          <a:blip r:embed="rId4">
+            <a:extLst>
+              <a:ext uri="{28A0092B-C50C-407E-A947-70E740481C1C}">
+                <a14:useLocalDpi xmlns:a14="http://schemas.microsoft.com/office/drawing/2010/main" val="0"/>
+              </a:ext>
+            </a:extLst>
+          </a:blip>
+          <a:srcRect/>
+          <a:stretch>
+            <a:fillRect/>
+          </a:stretch>
+        </p:blipFill>
+        <p:spPr bwMode="auto">
+          <a:xfrm>
+            <a:off x="0" y="0"/>
+            <a:ext cx="12192000" cy="6858000"/>
+          </a:xfrm>
+          <a:prstGeom prst="rect">
+            <a:avLst/>
+          </a:prstGeom>
+          <a:noFill/>
+          <a:extLst>
+            <a:ext uri="{909E8E84-426E-40DD-AFC4-6F175D3DCCD1}">
+              <a14:hiddenFill xmlns:a14="http://schemas.microsoft.com/office/drawing/2010/main">
+                <a:solidFill>
+                  <a:srgbClr val="FFFFFF"/>
+                </a:solidFill>
+              </a14:hiddenFill>
+            </a:ext>
+          </a:extLst>
+        </p:spPr>
+      </p:pic>
+    </p:spTree>
+    <p:extLst>
+      <p:ext uri="{BB962C8B-B14F-4D97-AF65-F5344CB8AC3E}">
+        <p14:creationId xmlns:p14="http://schemas.microsoft.com/office/powerpoint/2010/main" val="3828157365"/>
+      </p:ext>
+    </p:extLst>
+  </p:cSld>
+  <p:clrMapOvr>
+    <a:masterClrMapping/>
+  </p:clrMapOvr>
+  <p:timing>
+    <p:tnLst>
+      <p:par>
+        <p:cTn id="1" dur="indefinite" restart="never" nodeType="tmRoot">
+          <p:childTnLst>
+            <p:seq concurrent="1" nextAc="seek">
+              <p:cTn id="2" dur="indefinite" nodeType="mainSeq">
+                <p:childTnLst>
+                  <p:par>
+                    <p:cTn id="3" fill="hold">
+                      <p:stCondLst>
+                        <p:cond delay="indefinite"/>
+                      </p:stCondLst>
+                      <p:childTnLst>
+                        <p:par>
+                          <p:cTn id="4" fill="hold">
+                            <p:stCondLst>
+                              <p:cond delay="0"/>
+                            </p:stCondLst>
+                            <p:childTnLst>
+                              <p:par>
+                                <p:cTn id="5" presetID="9" presetClass="exit" presetSubtype="0" fill="hold" nodeType="clickEffect">
+                                  <p:stCondLst>
+                                    <p:cond delay="0"/>
+                                  </p:stCondLst>
+                                  <p:childTnLst>
+                                    <p:animEffect transition="out" filter="dissolve">
+                                      <p:cBhvr>
+                                        <p:cTn id="6" dur="500"/>
+                                        <p:tgtEl>
+                                          <p:spTgt spid="1036"/>
+                                        </p:tgtEl>
+                                      </p:cBhvr>
+                                    </p:animEffect>
+                                    <p:set>
+                                      <p:cBhvr>
+                                        <p:cTn id="7" dur="1" fill="hold">
+                                          <p:stCondLst>
+                                            <p:cond delay="499"/>
+                                          </p:stCondLst>
+                                        </p:cTn>
+                                        <p:tgtEl>
+                                          <p:spTgt spid="1036"/>
+                                        </p:tgtEl>
+                                        <p:attrNameLst>
+                                          <p:attrName>style.visibility</p:attrName>
+                                        </p:attrNameLst>
+                                      </p:cBhvr>
+                                      <p:to>
+                                        <p:strVal val="hidden"/>
+                                      </p:to>
+                                    </p:set>
+                                  </p:childTnLst>
+                                </p:cTn>
+                              </p:par>
+                            </p:childTnLst>
+                          </p:cTn>
+                        </p:par>
+                      </p:childTnLst>
+                    </p:cTn>
+                  </p:par>
+                </p:childTnLst>
+              </p:cTn>
+              <p:prevCondLst>
+                <p:cond evt="onPrev" delay="0">
+                  <p:tgtEl>
+                    <p:sldTgt/>
+                  </p:tgtEl>
+                </p:cond>
+              </p:prevCondLst>
+              <p:nextCondLst>
+                <p:cond evt="onNext" delay="0">
+                  <p:tgtEl>
+                    <p:sldTgt/>
+                  </p:tgtEl>
+                </p:cond>
+              </p:nextCondLst>
+            </p:seq>
+          </p:childTnLst>
+        </p:cTn>
+      </p:par>
+    </p:tnLst>
+  </p:timing>
+</p:sld>
+</file>
+
+<file path=ppt/slides/slide8.xml><?xml version="1.0" encoding="utf-8"?>
+<p:sld xmlns:a="http://schemas.openxmlformats.org/drawingml/2006/main" xmlns:r="http://schemas.openxmlformats.org/officeDocument/2006/relationships" xmlns:p="http://schemas.openxmlformats.org/presentationml/2006/main">
+  <p:cSld>
+    <p:bg>
+      <p:bgPr>
+        <a:pattFill prst="pct20">
+          <a:fgClr>
+            <a:schemeClr val="accent1"/>
+          </a:fgClr>
+          <a:bgClr>
+            <a:schemeClr val="bg1"/>
+          </a:bgClr>
+        </a:pattFill>
+        <a:effectLst/>
+      </p:bgPr>
+    </p:bg>
+    <p:spTree>
+      <p:nvGrpSpPr>
+        <p:cNvPr id="1" name=""/>
+        <p:cNvGrpSpPr/>
+        <p:nvPr/>
+      </p:nvGrpSpPr>
+      <p:grpSpPr>
+        <a:xfrm>
+          <a:off x="0" y="0"/>
+          <a:ext cx="0" cy="0"/>
+          <a:chOff x="0" y="0"/>
+          <a:chExt cx="0" cy="0"/>
+        </a:xfrm>
+      </p:grpSpPr>
+      <p:sp>
+        <p:nvSpPr>
+          <p:cNvPr id="2" name="Titre 1">
+            <a:extLst>
+              <a:ext uri="{FF2B5EF4-FFF2-40B4-BE49-F238E27FC236}">
+                <a16:creationId xmlns:a16="http://schemas.microsoft.com/office/drawing/2014/main" id="{86B61A9F-2F2B-04C4-CBC7-30F7120107AF}"/>
+              </a:ext>
+            </a:extLst>
+          </p:cNvPr>
+          <p:cNvSpPr>
+            <a:spLocks noGrp="1"/>
+          </p:cNvSpPr>
+          <p:nvPr>
+            <p:ph type="title"/>
+          </p:nvPr>
+        </p:nvSpPr>
+        <p:spPr/>
+        <p:txBody>
+          <a:bodyPr>
+            <a:normAutofit/>
+          </a:bodyPr>
+          <a:lstStyle/>
+          <a:p>
+            <a:r>
+              <a:rPr lang="fr-FR">
+                <a:latin typeface="Roboto" panose="02000000000000000000" pitchFamily="2" charset="0"/>
+                <a:ea typeface="Roboto" panose="02000000000000000000" pitchFamily="2" charset="0"/>
+                <a:cs typeface="Roboto" panose="02000000000000000000" pitchFamily="2" charset="0"/>
+              </a:rPr>
+              <a:t>Sortons des sentiers battus et voyons plus loins que ce qu’on nous apprend.</a:t>
+            </a:r>
+          </a:p>
+        </p:txBody>
+      </p:sp>
+    </p:spTree>
+    <p:extLst>
+      <p:ext uri="{BB962C8B-B14F-4D97-AF65-F5344CB8AC3E}">
+        <p14:creationId xmlns:p14="http://schemas.microsoft.com/office/powerpoint/2010/main" val="1763687260"/>
+      </p:ext>
+    </p:extLst>
+  </p:cSld>
+  <p:clrMapOvr>
+    <a:masterClrMapping/>
+  </p:clrMapOvr>
+</p:sld>
+</file>
+
+<file path=ppt/slides/slide9.xml><?xml version="1.0" encoding="utf-8"?>
+<p:sld xmlns:a="http://schemas.openxmlformats.org/drawingml/2006/main" xmlns:r="http://schemas.openxmlformats.org/officeDocument/2006/relationships" xmlns:p="http://schemas.openxmlformats.org/presentationml/2006/main">
+  <p:cSld>
+    <p:bg>
+      <p:bgPr>
+        <a:pattFill prst="pct20">
+          <a:fgClr>
+            <a:schemeClr val="accent1"/>
+          </a:fgClr>
+          <a:bgClr>
+            <a:schemeClr val="bg1"/>
+          </a:bgClr>
+        </a:pattFill>
+        <a:effectLst/>
+      </p:bgPr>
+    </p:bg>
+    <p:spTree>
+      <p:nvGrpSpPr>
+        <p:cNvPr id="1" name=""/>
+        <p:cNvGrpSpPr/>
+        <p:nvPr/>
+      </p:nvGrpSpPr>
+      <p:grpSpPr>
+        <a:xfrm>
+          <a:off x="0" y="0"/>
+          <a:ext cx="0" cy="0"/>
+          <a:chOff x="0" y="0"/>
+          <a:chExt cx="0" cy="0"/>
+        </a:xfrm>
+      </p:grpSpPr>
+      <p:sp>
+        <p:nvSpPr>
+          <p:cNvPr id="2" name="Titre 1">
+            <a:extLst>
+              <a:ext uri="{FF2B5EF4-FFF2-40B4-BE49-F238E27FC236}">
+                <a16:creationId xmlns:a16="http://schemas.microsoft.com/office/drawing/2014/main" id="{BB81C4E9-D116-9039-9821-C867B37DB1CA}"/>
+              </a:ext>
+            </a:extLst>
+          </p:cNvPr>
+          <p:cNvSpPr>
+            <a:spLocks noGrp="1"/>
+          </p:cNvSpPr>
+          <p:nvPr>
+            <p:ph type="ctrTitle"/>
+          </p:nvPr>
+        </p:nvSpPr>
+        <p:spPr/>
+        <p:txBody>
+          <a:bodyPr/>
+          <a:lstStyle/>
+          <a:p>
+            <a:r>
+              <a:rPr lang="fr-FR">
+                <a:latin typeface="Roboto" panose="02000000000000000000" pitchFamily="2" charset="0"/>
+                <a:ea typeface="Roboto" panose="02000000000000000000" pitchFamily="2" charset="0"/>
+                <a:cs typeface="Roboto" panose="02000000000000000000" pitchFamily="2" charset="0"/>
+              </a:rPr>
+              <a:t>Merci de votre écoute</a:t>
+            </a:r>
+            <a:endParaRPr lang="fr-FR" b="1">
+              <a:latin typeface="Roboto" panose="02000000000000000000" pitchFamily="2" charset="0"/>
+              <a:ea typeface="Roboto" panose="02000000000000000000" pitchFamily="2" charset="0"/>
+              <a:cs typeface="Roboto" panose="02000000000000000000" pitchFamily="2" charset="0"/>
+            </a:endParaRPr>
+          </a:p>
+        </p:txBody>
+      </p:sp>
+      <p:sp>
+        <p:nvSpPr>
+          <p:cNvPr id="3" name="Sous-titre 2">
+            <a:extLst>
+              <a:ext uri="{FF2B5EF4-FFF2-40B4-BE49-F238E27FC236}">
+                <a16:creationId xmlns:a16="http://schemas.microsoft.com/office/drawing/2014/main" id="{F937CF57-DD8D-CC1A-0349-65589F61BAAE}"/>
+              </a:ext>
+            </a:extLst>
+          </p:cNvPr>
+          <p:cNvSpPr>
+            <a:spLocks noGrp="1"/>
+          </p:cNvSpPr>
+          <p:nvPr>
+            <p:ph type="subTitle" idx="1"/>
+          </p:nvPr>
+        </p:nvSpPr>
+        <p:spPr>
+          <a:xfrm>
+            <a:off x="1337982" y="3628932"/>
+            <a:ext cx="9516035" cy="1655762"/>
+          </a:xfrm>
+        </p:spPr>
+        <p:txBody>
+          <a:bodyPr anchor="ctr"/>
+          <a:lstStyle/>
+          <a:p>
+            <a:r>
+              <a:rPr lang="fr-FR">
+                <a:latin typeface="Roboto" panose="02000000000000000000" pitchFamily="2" charset="0"/>
+                <a:ea typeface="Roboto" panose="02000000000000000000" pitchFamily="2" charset="0"/>
+                <a:cs typeface="Roboto" panose="02000000000000000000" pitchFamily="2" charset="0"/>
+              </a:rPr>
+              <a:t>Présentation et recherches réalisées </a:t>
+            </a:r>
+            <a:r>
+              <a:rPr lang="fr-FR" b="1">
+                <a:latin typeface="Roboto" panose="02000000000000000000" pitchFamily="2" charset="0"/>
+                <a:ea typeface="Roboto" panose="02000000000000000000" pitchFamily="2" charset="0"/>
+                <a:cs typeface="Roboto" panose="02000000000000000000" pitchFamily="2" charset="0"/>
+              </a:rPr>
+              <a:t>sans</a:t>
+            </a:r>
+            <a:r>
+              <a:rPr lang="fr-FR">
+                <a:latin typeface="Roboto" panose="02000000000000000000" pitchFamily="2" charset="0"/>
+                <a:ea typeface="Roboto" panose="02000000000000000000" pitchFamily="2" charset="0"/>
+                <a:cs typeface="Roboto" panose="02000000000000000000" pitchFamily="2" charset="0"/>
+              </a:rPr>
+              <a:t> ChatGPT</a:t>
+            </a:r>
+            <a:endParaRPr lang="fr-FR" b="1">
+              <a:latin typeface="Roboto" panose="02000000000000000000" pitchFamily="2" charset="0"/>
+              <a:ea typeface="Roboto" panose="02000000000000000000" pitchFamily="2" charset="0"/>
+              <a:cs typeface="Roboto" panose="02000000000000000000" pitchFamily="2" charset="0"/>
+            </a:endParaRPr>
+          </a:p>
+          <a:p>
+            <a:r>
+              <a:rPr lang="fr-FR" b="1">
+                <a:latin typeface="Roboto" panose="02000000000000000000" pitchFamily="2" charset="0"/>
+                <a:ea typeface="Roboto" panose="02000000000000000000" pitchFamily="2" charset="0"/>
+                <a:cs typeface="Roboto" panose="02000000000000000000" pitchFamily="2" charset="0"/>
+              </a:rPr>
+              <a:t>#GPTFree</a:t>
+            </a:r>
+            <a:endParaRPr lang="fr-FR">
+              <a:latin typeface="Roboto" panose="02000000000000000000" pitchFamily="2" charset="0"/>
+              <a:ea typeface="Roboto" panose="02000000000000000000" pitchFamily="2" charset="0"/>
+              <a:cs typeface="Roboto" panose="02000000000000000000" pitchFamily="2" charset="0"/>
+            </a:endParaRPr>
+          </a:p>
+        </p:txBody>
+      </p:sp>
+    </p:spTree>
+    <p:extLst>
+      <p:ext uri="{BB962C8B-B14F-4D97-AF65-F5344CB8AC3E}">
+        <p14:creationId xmlns:p14="http://schemas.microsoft.com/office/powerpoint/2010/main" val="850454818"/>
       </p:ext>
     </p:extLst>
   </p:cSld>

</xml_diff>

<commit_message>
docs: write ISI intrusion documentation
</commit_message>
<xml_diff>
--- a/S4/EXP/files/À-t-on encore besoin d'ingénieurs.pptx
+++ b/S4/EXP/files/À-t-on encore besoin d'ingénieurs.pptx
@@ -5,19 +5,20 @@
     <p:sldMasterId id="2147483648" r:id="rId1"/>
   </p:sldMasterIdLst>
   <p:notesMasterIdLst>
-    <p:notesMasterId r:id="rId12"/>
+    <p:notesMasterId r:id="rId13"/>
   </p:notesMasterIdLst>
   <p:sldIdLst>
     <p:sldId id="256" r:id="rId2"/>
-    <p:sldId id="257" r:id="rId3"/>
-    <p:sldId id="258" r:id="rId4"/>
-    <p:sldId id="259" r:id="rId5"/>
-    <p:sldId id="260" r:id="rId6"/>
-    <p:sldId id="261" r:id="rId7"/>
-    <p:sldId id="266" r:id="rId8"/>
-    <p:sldId id="262" r:id="rId9"/>
-    <p:sldId id="264" r:id="rId10"/>
-    <p:sldId id="265" r:id="rId11"/>
+    <p:sldId id="267" r:id="rId3"/>
+    <p:sldId id="257" r:id="rId4"/>
+    <p:sldId id="258" r:id="rId5"/>
+    <p:sldId id="259" r:id="rId6"/>
+    <p:sldId id="260" r:id="rId7"/>
+    <p:sldId id="261" r:id="rId8"/>
+    <p:sldId id="266" r:id="rId9"/>
+    <p:sldId id="262" r:id="rId10"/>
+    <p:sldId id="264" r:id="rId11"/>
+    <p:sldId id="265" r:id="rId12"/>
   </p:sldIdLst>
   <p:sldSz cx="12192000" cy="6858000"/>
   <p:notesSz cx="6858000" cy="9144000"/>
@@ -127,7 +128,7 @@
 <file path=ppt/revisionInfo.xml><?xml version="1.0" encoding="utf-8"?>
 <p1510:revInfo xmlns:a="http://schemas.openxmlformats.org/drawingml/2006/main" xmlns:r="http://schemas.openxmlformats.org/officeDocument/2006/relationships" xmlns:p1510="http://schemas.microsoft.com/office/powerpoint/2015/10/main">
   <p1510:revLst>
-    <p1510:client id="{ECDFB03D-1764-5B4F-B940-9C9F945837E9}" v="211" dt="2024-05-10T09:32:14.428"/>
+    <p1510:client id="{ECDFB03D-1764-5B4F-B940-9C9F945837E9}" v="212" dt="2024-05-11T09:06:17.957"/>
   </p1510:revLst>
 </p1510:revInfo>
 </file>
@@ -137,7 +138,7 @@
   <pc:docChgLst>
     <pc:chgData name="Trüeb Guillaume" userId="cdddf057-9811-4cdd-8552-6ae0b8a7753d" providerId="ADAL" clId="{ECDFB03D-1764-5B4F-B940-9C9F945837E9}"/>
     <pc:docChg chg="undo custSel addSld delSld modSld">
-      <pc:chgData name="Trüeb Guillaume" userId="cdddf057-9811-4cdd-8552-6ae0b8a7753d" providerId="ADAL" clId="{ECDFB03D-1764-5B4F-B940-9C9F945837E9}" dt="2024-05-10T09:32:14.428" v="3952" actId="1076"/>
+      <pc:chgData name="Trüeb Guillaume" userId="cdddf057-9811-4cdd-8552-6ae0b8a7753d" providerId="ADAL" clId="{ECDFB03D-1764-5B4F-B940-9C9F945837E9}" dt="2024-05-11T09:06:17.951" v="3953"/>
       <pc:docMkLst>
         <pc:docMk/>
       </pc:docMkLst>
@@ -510,6 +511,13 @@
           </ac:picMkLst>
         </pc:picChg>
       </pc:sldChg>
+      <pc:sldChg chg="add">
+        <pc:chgData name="Trüeb Guillaume" userId="cdddf057-9811-4cdd-8552-6ae0b8a7753d" providerId="ADAL" clId="{ECDFB03D-1764-5B4F-B940-9C9F945837E9}" dt="2024-05-11T09:06:17.951" v="3953"/>
+        <pc:sldMkLst>
+          <pc:docMk/>
+          <pc:sldMk cId="1913697684" sldId="267"/>
+        </pc:sldMkLst>
+      </pc:sldChg>
     </pc:docChg>
   </pc:docChgLst>
 </pc:chgInfo>
@@ -596,7 +604,7 @@
           </a:lstStyle>
           <a:p>
             <a:fld id="{E2C0E638-932B-6049-A64B-454D3CE5F309}" type="datetimeFigureOut">
-              <a:t>10/05/2024</a:t>
+              <a:t>11/05/2024</a:t>
             </a:fld>
             <a:endParaRPr lang="fr-FR"/>
           </a:p>
@@ -1039,7 +1047,7 @@
           <a:p>
             <a:fld id="{441A04F3-E4AD-AF49-AAD8-1609614BC998}" type="slidenum">
               <a:rPr lang="fr-CH"/>
-              <a:t>3</a:t>
+              <a:t>4</a:t>
             </a:fld>
             <a:endParaRPr lang="fr-CH"/>
           </a:p>
@@ -1126,7 +1134,7 @@
           <a:p>
             <a:fld id="{441A04F3-E4AD-AF49-AAD8-1609614BC998}" type="slidenum">
               <a:rPr lang="fr-CH"/>
-              <a:t>4</a:t>
+              <a:t>5</a:t>
             </a:fld>
             <a:endParaRPr lang="fr-CH"/>
           </a:p>
@@ -1210,7 +1218,7 @@
           <a:p>
             <a:fld id="{441A04F3-E4AD-AF49-AAD8-1609614BC998}" type="slidenum">
               <a:rPr lang="fr-CH"/>
-              <a:t>5</a:t>
+              <a:t>6</a:t>
             </a:fld>
             <a:endParaRPr lang="fr-CH"/>
           </a:p>
@@ -1563,7 +1571,7 @@
           <a:p>
             <a:fld id="{441A04F3-E4AD-AF49-AAD8-1609614BC998}" type="slidenum">
               <a:rPr lang="fr-CH"/>
-              <a:t>6</a:t>
+              <a:t>7</a:t>
             </a:fld>
             <a:endParaRPr lang="fr-CH"/>
           </a:p>
@@ -1647,7 +1655,7 @@
           <a:p>
             <a:fld id="{441A04F3-E4AD-AF49-AAD8-1609614BC998}" type="slidenum">
               <a:rPr lang="fr-CH"/>
-              <a:t>7</a:t>
+              <a:t>8</a:t>
             </a:fld>
             <a:endParaRPr lang="fr-CH"/>
           </a:p>
@@ -1759,7 +1767,7 @@
           <a:lstStyle/>
           <a:p>
             <a:fld id="{441A04F3-E4AD-AF49-AAD8-1609614BC998}" type="slidenum">
-              <a:t>9</a:t>
+              <a:t>10</a:t>
             </a:fld>
             <a:endParaRPr lang="fr-FR"/>
           </a:p>
@@ -1843,7 +1851,7 @@
           <a:p>
             <a:fld id="{441A04F3-E4AD-AF49-AAD8-1609614BC998}" type="slidenum">
               <a:rPr lang="fr-CH"/>
-              <a:t>10</a:t>
+              <a:t>11</a:t>
             </a:fld>
             <a:endParaRPr lang="fr-CH"/>
           </a:p>
@@ -2008,7 +2016,7 @@
           <a:lstStyle/>
           <a:p>
             <a:fld id="{E58754B6-4E19-8F42-807C-F64A7D215DCD}" type="datetimeFigureOut">
-              <a:t>10/05/2024</a:t>
+              <a:t>11/05/2024</a:t>
             </a:fld>
             <a:endParaRPr lang="fr-FR"/>
           </a:p>
@@ -2204,7 +2212,7 @@
           <a:lstStyle/>
           <a:p>
             <a:fld id="{E58754B6-4E19-8F42-807C-F64A7D215DCD}" type="datetimeFigureOut">
-              <a:t>10/05/2024</a:t>
+              <a:t>11/05/2024</a:t>
             </a:fld>
             <a:endParaRPr lang="fr-FR"/>
           </a:p>
@@ -2410,7 +2418,7 @@
           <a:lstStyle/>
           <a:p>
             <a:fld id="{E58754B6-4E19-8F42-807C-F64A7D215DCD}" type="datetimeFigureOut">
-              <a:t>10/05/2024</a:t>
+              <a:t>11/05/2024</a:t>
             </a:fld>
             <a:endParaRPr lang="fr-FR"/>
           </a:p>
@@ -2606,7 +2614,7 @@
           <a:lstStyle/>
           <a:p>
             <a:fld id="{E58754B6-4E19-8F42-807C-F64A7D215DCD}" type="datetimeFigureOut">
-              <a:t>10/05/2024</a:t>
+              <a:t>11/05/2024</a:t>
             </a:fld>
             <a:endParaRPr lang="fr-FR"/>
           </a:p>
@@ -2879,7 +2887,7 @@
           <a:lstStyle/>
           <a:p>
             <a:fld id="{E58754B6-4E19-8F42-807C-F64A7D215DCD}" type="datetimeFigureOut">
-              <a:t>10/05/2024</a:t>
+              <a:t>11/05/2024</a:t>
             </a:fld>
             <a:endParaRPr lang="fr-FR"/>
           </a:p>
@@ -3142,7 +3150,7 @@
           <a:lstStyle/>
           <a:p>
             <a:fld id="{E58754B6-4E19-8F42-807C-F64A7D215DCD}" type="datetimeFigureOut">
-              <a:t>10/05/2024</a:t>
+              <a:t>11/05/2024</a:t>
             </a:fld>
             <a:endParaRPr lang="fr-FR"/>
           </a:p>
@@ -3552,7 +3560,7 @@
           <a:lstStyle/>
           <a:p>
             <a:fld id="{E58754B6-4E19-8F42-807C-F64A7D215DCD}" type="datetimeFigureOut">
-              <a:t>10/05/2024</a:t>
+              <a:t>11/05/2024</a:t>
             </a:fld>
             <a:endParaRPr lang="fr-FR"/>
           </a:p>
@@ -3691,7 +3699,7 @@
           <a:lstStyle/>
           <a:p>
             <a:fld id="{E58754B6-4E19-8F42-807C-F64A7D215DCD}" type="datetimeFigureOut">
-              <a:t>10/05/2024</a:t>
+              <a:t>11/05/2024</a:t>
             </a:fld>
             <a:endParaRPr lang="fr-FR"/>
           </a:p>
@@ -3802,7 +3810,7 @@
           <a:lstStyle/>
           <a:p>
             <a:fld id="{E58754B6-4E19-8F42-807C-F64A7D215DCD}" type="datetimeFigureOut">
-              <a:t>10/05/2024</a:t>
+              <a:t>11/05/2024</a:t>
             </a:fld>
             <a:endParaRPr lang="fr-FR"/>
           </a:p>
@@ -4111,7 +4119,7 @@
           <a:lstStyle/>
           <a:p>
             <a:fld id="{E58754B6-4E19-8F42-807C-F64A7D215DCD}" type="datetimeFigureOut">
-              <a:t>10/05/2024</a:t>
+              <a:t>11/05/2024</a:t>
             </a:fld>
             <a:endParaRPr lang="fr-FR"/>
           </a:p>
@@ -4397,7 +4405,7 @@
           <a:lstStyle/>
           <a:p>
             <a:fld id="{E58754B6-4E19-8F42-807C-F64A7D215DCD}" type="datetimeFigureOut">
-              <a:t>10/05/2024</a:t>
+              <a:t>11/05/2024</a:t>
             </a:fld>
             <a:endParaRPr lang="fr-FR"/>
           </a:p>
@@ -4636,7 +4644,7 @@
           </a:lstStyle>
           <a:p>
             <a:fld id="{E58754B6-4E19-8F42-807C-F64A7D215DCD}" type="datetimeFigureOut">
-              <a:t>10/05/2024</a:t>
+              <a:t>11/05/2024</a:t>
             </a:fld>
             <a:endParaRPr lang="fr-FR"/>
           </a:p>
@@ -5200,6 +5208,159 @@
           <p:cNvPr id="2" name="Titre 1">
             <a:extLst>
               <a:ext uri="{FF2B5EF4-FFF2-40B4-BE49-F238E27FC236}">
+                <a16:creationId xmlns:a16="http://schemas.microsoft.com/office/drawing/2014/main" id="{BB81C4E9-D116-9039-9821-C867B37DB1CA}"/>
+              </a:ext>
+            </a:extLst>
+          </p:cNvPr>
+          <p:cNvSpPr>
+            <a:spLocks noGrp="1"/>
+          </p:cNvSpPr>
+          <p:nvPr>
+            <p:ph type="ctrTitle"/>
+          </p:nvPr>
+        </p:nvSpPr>
+        <p:spPr/>
+        <p:txBody>
+          <a:bodyPr/>
+          <a:lstStyle/>
+          <a:p>
+            <a:r>
+              <a:rPr lang="fr-FR">
+                <a:latin typeface="Roboto" panose="02000000000000000000" pitchFamily="2" charset="0"/>
+                <a:ea typeface="Roboto" panose="02000000000000000000" pitchFamily="2" charset="0"/>
+                <a:cs typeface="Roboto" panose="02000000000000000000" pitchFamily="2" charset="0"/>
+              </a:rPr>
+              <a:t>Merci de votre écoute</a:t>
+            </a:r>
+            <a:endParaRPr lang="fr-FR" b="1">
+              <a:latin typeface="Roboto" panose="02000000000000000000" pitchFamily="2" charset="0"/>
+              <a:ea typeface="Roboto" panose="02000000000000000000" pitchFamily="2" charset="0"/>
+              <a:cs typeface="Roboto" panose="02000000000000000000" pitchFamily="2" charset="0"/>
+            </a:endParaRPr>
+          </a:p>
+        </p:txBody>
+      </p:sp>
+      <p:sp>
+        <p:nvSpPr>
+          <p:cNvPr id="3" name="Sous-titre 2">
+            <a:extLst>
+              <a:ext uri="{FF2B5EF4-FFF2-40B4-BE49-F238E27FC236}">
+                <a16:creationId xmlns:a16="http://schemas.microsoft.com/office/drawing/2014/main" id="{F937CF57-DD8D-CC1A-0349-65589F61BAAE}"/>
+              </a:ext>
+            </a:extLst>
+          </p:cNvPr>
+          <p:cNvSpPr>
+            <a:spLocks noGrp="1"/>
+          </p:cNvSpPr>
+          <p:nvPr>
+            <p:ph type="subTitle" idx="1"/>
+          </p:nvPr>
+        </p:nvSpPr>
+        <p:spPr>
+          <a:xfrm>
+            <a:off x="1337982" y="3628932"/>
+            <a:ext cx="9516035" cy="1655762"/>
+          </a:xfrm>
+        </p:spPr>
+        <p:txBody>
+          <a:bodyPr anchor="ctr"/>
+          <a:lstStyle/>
+          <a:p>
+            <a:r>
+              <a:rPr lang="fr-FR">
+                <a:latin typeface="Roboto" panose="02000000000000000000" pitchFamily="2" charset="0"/>
+                <a:ea typeface="Roboto" panose="02000000000000000000" pitchFamily="2" charset="0"/>
+                <a:cs typeface="Roboto" panose="02000000000000000000" pitchFamily="2" charset="0"/>
+              </a:rPr>
+              <a:t>Présentation et recherches réalisées </a:t>
+            </a:r>
+            <a:r>
+              <a:rPr lang="fr-FR" b="1">
+                <a:latin typeface="Roboto" panose="02000000000000000000" pitchFamily="2" charset="0"/>
+                <a:ea typeface="Roboto" panose="02000000000000000000" pitchFamily="2" charset="0"/>
+                <a:cs typeface="Roboto" panose="02000000000000000000" pitchFamily="2" charset="0"/>
+              </a:rPr>
+              <a:t>sans</a:t>
+            </a:r>
+            <a:r>
+              <a:rPr lang="fr-FR">
+                <a:latin typeface="Roboto" panose="02000000000000000000" pitchFamily="2" charset="0"/>
+                <a:ea typeface="Roboto" panose="02000000000000000000" pitchFamily="2" charset="0"/>
+                <a:cs typeface="Roboto" panose="02000000000000000000" pitchFamily="2" charset="0"/>
+              </a:rPr>
+              <a:t> ChatGPT</a:t>
+            </a:r>
+            <a:endParaRPr lang="fr-FR" b="1">
+              <a:latin typeface="Roboto" panose="02000000000000000000" pitchFamily="2" charset="0"/>
+              <a:ea typeface="Roboto" panose="02000000000000000000" pitchFamily="2" charset="0"/>
+              <a:cs typeface="Roboto" panose="02000000000000000000" pitchFamily="2" charset="0"/>
+            </a:endParaRPr>
+          </a:p>
+          <a:p>
+            <a:r>
+              <a:rPr lang="fr-FR" b="1">
+                <a:latin typeface="Roboto" panose="02000000000000000000" pitchFamily="2" charset="0"/>
+                <a:ea typeface="Roboto" panose="02000000000000000000" pitchFamily="2" charset="0"/>
+                <a:cs typeface="Roboto" panose="02000000000000000000" pitchFamily="2" charset="0"/>
+              </a:rPr>
+              <a:t>#GPTFree</a:t>
+            </a:r>
+            <a:endParaRPr lang="fr-FR">
+              <a:latin typeface="Roboto" panose="02000000000000000000" pitchFamily="2" charset="0"/>
+              <a:ea typeface="Roboto" panose="02000000000000000000" pitchFamily="2" charset="0"/>
+              <a:cs typeface="Roboto" panose="02000000000000000000" pitchFamily="2" charset="0"/>
+            </a:endParaRPr>
+          </a:p>
+        </p:txBody>
+      </p:sp>
+    </p:spTree>
+    <p:extLst>
+      <p:ext uri="{BB962C8B-B14F-4D97-AF65-F5344CB8AC3E}">
+        <p14:creationId xmlns:p14="http://schemas.microsoft.com/office/powerpoint/2010/main" val="850454818"/>
+      </p:ext>
+    </p:extLst>
+  </p:cSld>
+  <p:clrMapOvr>
+    <a:masterClrMapping/>
+  </p:clrMapOvr>
+</p:sld>
+</file>
+
+<file path=ppt/slides/slide11.xml><?xml version="1.0" encoding="utf-8"?>
+<p:sld xmlns:a="http://schemas.openxmlformats.org/drawingml/2006/main" xmlns:r="http://schemas.openxmlformats.org/officeDocument/2006/relationships" xmlns:p="http://schemas.openxmlformats.org/presentationml/2006/main">
+  <p:cSld>
+    <p:bg>
+      <p:bgPr>
+        <a:pattFill prst="pct20">
+          <a:fgClr>
+            <a:schemeClr val="accent1"/>
+          </a:fgClr>
+          <a:bgClr>
+            <a:schemeClr val="bg1"/>
+          </a:bgClr>
+        </a:pattFill>
+        <a:effectLst/>
+      </p:bgPr>
+    </p:bg>
+    <p:spTree>
+      <p:nvGrpSpPr>
+        <p:cNvPr id="1" name=""/>
+        <p:cNvGrpSpPr/>
+        <p:nvPr/>
+      </p:nvGrpSpPr>
+      <p:grpSpPr>
+        <a:xfrm>
+          <a:off x="0" y="0"/>
+          <a:ext cx="0" cy="0"/>
+          <a:chOff x="0" y="0"/>
+          <a:chExt cx="0" cy="0"/>
+        </a:xfrm>
+      </p:grpSpPr>
+      <p:sp>
+        <p:nvSpPr>
+          <p:cNvPr id="2" name="Titre 1">
+            <a:extLst>
+              <a:ext uri="{FF2B5EF4-FFF2-40B4-BE49-F238E27FC236}">
                 <a16:creationId xmlns:a16="http://schemas.microsoft.com/office/drawing/2014/main" id="{F848B694-19D9-6C6D-0A76-4FDAD8D2CEFA}"/>
               </a:ext>
             </a:extLst>
@@ -5467,6 +5628,83 @@
     </p:spTree>
     <p:extLst>
       <p:ext uri="{BB962C8B-B14F-4D97-AF65-F5344CB8AC3E}">
+        <p14:creationId xmlns:p14="http://schemas.microsoft.com/office/powerpoint/2010/main" val="1913697684"/>
+      </p:ext>
+    </p:extLst>
+  </p:cSld>
+  <p:clrMapOvr>
+    <a:masterClrMapping/>
+  </p:clrMapOvr>
+</p:sld>
+</file>
+
+<file path=ppt/slides/slide3.xml><?xml version="1.0" encoding="utf-8"?>
+<p:sld xmlns:a="http://schemas.openxmlformats.org/drawingml/2006/main" xmlns:r="http://schemas.openxmlformats.org/officeDocument/2006/relationships" xmlns:p="http://schemas.openxmlformats.org/presentationml/2006/main">
+  <p:cSld>
+    <p:bg>
+      <p:bgPr>
+        <a:pattFill prst="pct20">
+          <a:fgClr>
+            <a:schemeClr val="accent1"/>
+          </a:fgClr>
+          <a:bgClr>
+            <a:schemeClr val="bg1"/>
+          </a:bgClr>
+        </a:pattFill>
+        <a:effectLst/>
+      </p:bgPr>
+    </p:bg>
+    <p:spTree>
+      <p:nvGrpSpPr>
+        <p:cNvPr id="1" name=""/>
+        <p:cNvGrpSpPr/>
+        <p:nvPr/>
+      </p:nvGrpSpPr>
+      <p:grpSpPr>
+        <a:xfrm>
+          <a:off x="0" y="0"/>
+          <a:ext cx="0" cy="0"/>
+          <a:chOff x="0" y="0"/>
+          <a:chExt cx="0" cy="0"/>
+        </a:xfrm>
+      </p:grpSpPr>
+      <p:sp>
+        <p:nvSpPr>
+          <p:cNvPr id="2" name="Titre 1">
+            <a:extLst>
+              <a:ext uri="{FF2B5EF4-FFF2-40B4-BE49-F238E27FC236}">
+                <a16:creationId xmlns:a16="http://schemas.microsoft.com/office/drawing/2014/main" id="{86B61A9F-2F2B-04C4-CBC7-30F7120107AF}"/>
+              </a:ext>
+            </a:extLst>
+          </p:cNvPr>
+          <p:cNvSpPr>
+            <a:spLocks noGrp="1"/>
+          </p:cNvSpPr>
+          <p:nvPr>
+            <p:ph type="title"/>
+          </p:nvPr>
+        </p:nvSpPr>
+        <p:spPr/>
+        <p:txBody>
+          <a:bodyPr>
+            <a:normAutofit/>
+          </a:bodyPr>
+          <a:lstStyle/>
+          <a:p>
+            <a:r>
+              <a:rPr lang="fr-FR">
+                <a:latin typeface="Roboto" panose="02000000000000000000" pitchFamily="2" charset="0"/>
+                <a:ea typeface="Roboto" panose="02000000000000000000" pitchFamily="2" charset="0"/>
+                <a:cs typeface="Roboto" panose="02000000000000000000" pitchFamily="2" charset="0"/>
+              </a:rPr>
+              <a:t>Est-ce que la technologie peut nous sauver de la catastrophe environementale ?</a:t>
+            </a:r>
+          </a:p>
+        </p:txBody>
+      </p:sp>
+    </p:spTree>
+    <p:extLst>
+      <p:ext uri="{BB962C8B-B14F-4D97-AF65-F5344CB8AC3E}">
         <p14:creationId xmlns:p14="http://schemas.microsoft.com/office/powerpoint/2010/main" val="3224372592"/>
       </p:ext>
     </p:extLst>
@@ -5477,7 +5715,7 @@
 </p:sld>
 </file>
 
-<file path=ppt/slides/slide3.xml><?xml version="1.0" encoding="utf-8"?>
+<file path=ppt/slides/slide4.xml><?xml version="1.0" encoding="utf-8"?>
 <p:sld xmlns:a="http://schemas.openxmlformats.org/drawingml/2006/main" xmlns:r="http://schemas.openxmlformats.org/officeDocument/2006/relationships" xmlns:p="http://schemas.openxmlformats.org/presentationml/2006/main">
   <p:cSld>
     <p:bg>
@@ -5777,7 +6015,7 @@
 </p:sld>
 </file>
 
-<file path=ppt/slides/slide4.xml><?xml version="1.0" encoding="utf-8"?>
+<file path=ppt/slides/slide5.xml><?xml version="1.0" encoding="utf-8"?>
 <p:sld xmlns:a="http://schemas.openxmlformats.org/drawingml/2006/main" xmlns:r="http://schemas.openxmlformats.org/officeDocument/2006/relationships" xmlns:p="http://schemas.openxmlformats.org/presentationml/2006/main">
   <p:cSld>
     <p:bg>
@@ -6187,7 +6425,7 @@
 </p:sld>
 </file>
 
-<file path=ppt/slides/slide5.xml><?xml version="1.0" encoding="utf-8"?>
+<file path=ppt/slides/slide6.xml><?xml version="1.0" encoding="utf-8"?>
 <p:sld xmlns:a="http://schemas.openxmlformats.org/drawingml/2006/main" xmlns:r="http://schemas.openxmlformats.org/officeDocument/2006/relationships" xmlns:p="http://schemas.openxmlformats.org/presentationml/2006/main">
   <p:cSld>
     <p:bg>
@@ -6500,7 +6738,7 @@
 </p:sld>
 </file>
 
-<file path=ppt/slides/slide6.xml><?xml version="1.0" encoding="utf-8"?>
+<file path=ppt/slides/slide7.xml><?xml version="1.0" encoding="utf-8"?>
 <p:sld xmlns:a="http://schemas.openxmlformats.org/drawingml/2006/main" xmlns:r="http://schemas.openxmlformats.org/officeDocument/2006/relationships" xmlns:p="http://schemas.openxmlformats.org/presentationml/2006/main">
   <p:cSld>
     <p:bg>
@@ -6713,7 +6951,7 @@
 </p:sld>
 </file>
 
-<file path=ppt/slides/slide7.xml><?xml version="1.0" encoding="utf-8"?>
+<file path=ppt/slides/slide8.xml><?xml version="1.0" encoding="utf-8"?>
 <p:sld xmlns:a="http://schemas.openxmlformats.org/drawingml/2006/main" xmlns:r="http://schemas.openxmlformats.org/officeDocument/2006/relationships" xmlns:p="http://schemas.openxmlformats.org/presentationml/2006/main">
   <p:cSld>
     <p:spTree>
@@ -6993,83 +7231,6 @@
 </p:sld>
 </file>
 
-<file path=ppt/slides/slide8.xml><?xml version="1.0" encoding="utf-8"?>
-<p:sld xmlns:a="http://schemas.openxmlformats.org/drawingml/2006/main" xmlns:r="http://schemas.openxmlformats.org/officeDocument/2006/relationships" xmlns:p="http://schemas.openxmlformats.org/presentationml/2006/main">
-  <p:cSld>
-    <p:bg>
-      <p:bgPr>
-        <a:pattFill prst="pct20">
-          <a:fgClr>
-            <a:schemeClr val="accent1"/>
-          </a:fgClr>
-          <a:bgClr>
-            <a:schemeClr val="bg1"/>
-          </a:bgClr>
-        </a:pattFill>
-        <a:effectLst/>
-      </p:bgPr>
-    </p:bg>
-    <p:spTree>
-      <p:nvGrpSpPr>
-        <p:cNvPr id="1" name=""/>
-        <p:cNvGrpSpPr/>
-        <p:nvPr/>
-      </p:nvGrpSpPr>
-      <p:grpSpPr>
-        <a:xfrm>
-          <a:off x="0" y="0"/>
-          <a:ext cx="0" cy="0"/>
-          <a:chOff x="0" y="0"/>
-          <a:chExt cx="0" cy="0"/>
-        </a:xfrm>
-      </p:grpSpPr>
-      <p:sp>
-        <p:nvSpPr>
-          <p:cNvPr id="2" name="Titre 1">
-            <a:extLst>
-              <a:ext uri="{FF2B5EF4-FFF2-40B4-BE49-F238E27FC236}">
-                <a16:creationId xmlns:a16="http://schemas.microsoft.com/office/drawing/2014/main" id="{86B61A9F-2F2B-04C4-CBC7-30F7120107AF}"/>
-              </a:ext>
-            </a:extLst>
-          </p:cNvPr>
-          <p:cNvSpPr>
-            <a:spLocks noGrp="1"/>
-          </p:cNvSpPr>
-          <p:nvPr>
-            <p:ph type="title"/>
-          </p:nvPr>
-        </p:nvSpPr>
-        <p:spPr/>
-        <p:txBody>
-          <a:bodyPr>
-            <a:normAutofit/>
-          </a:bodyPr>
-          <a:lstStyle/>
-          <a:p>
-            <a:r>
-              <a:rPr lang="fr-FR">
-                <a:latin typeface="Roboto" panose="02000000000000000000" pitchFamily="2" charset="0"/>
-                <a:ea typeface="Roboto" panose="02000000000000000000" pitchFamily="2" charset="0"/>
-                <a:cs typeface="Roboto" panose="02000000000000000000" pitchFamily="2" charset="0"/>
-              </a:rPr>
-              <a:t>Sortons des sentiers battus et voyons plus loins que ce qu’on nous apprend.</a:t>
-            </a:r>
-          </a:p>
-        </p:txBody>
-      </p:sp>
-    </p:spTree>
-    <p:extLst>
-      <p:ext uri="{BB962C8B-B14F-4D97-AF65-F5344CB8AC3E}">
-        <p14:creationId xmlns:p14="http://schemas.microsoft.com/office/powerpoint/2010/main" val="1763687260"/>
-      </p:ext>
-    </p:extLst>
-  </p:cSld>
-  <p:clrMapOvr>
-    <a:masterClrMapping/>
-  </p:clrMapOvr>
-</p:sld>
-</file>
-
 <file path=ppt/slides/slide9.xml><?xml version="1.0" encoding="utf-8"?>
 <p:sld xmlns:a="http://schemas.openxmlformats.org/drawingml/2006/main" xmlns:r="http://schemas.openxmlformats.org/officeDocument/2006/relationships" xmlns:p="http://schemas.openxmlformats.org/presentationml/2006/main">
   <p:cSld>
@@ -7105,20 +7266,22 @@
           <p:cNvPr id="2" name="Titre 1">
             <a:extLst>
               <a:ext uri="{FF2B5EF4-FFF2-40B4-BE49-F238E27FC236}">
-                <a16:creationId xmlns:a16="http://schemas.microsoft.com/office/drawing/2014/main" id="{BB81C4E9-D116-9039-9821-C867B37DB1CA}"/>
-              </a:ext>
-            </a:extLst>
-          </p:cNvPr>
-          <p:cNvSpPr>
-            <a:spLocks noGrp="1"/>
-          </p:cNvSpPr>
-          <p:nvPr>
-            <p:ph type="ctrTitle"/>
+                <a16:creationId xmlns:a16="http://schemas.microsoft.com/office/drawing/2014/main" id="{86B61A9F-2F2B-04C4-CBC7-30F7120107AF}"/>
+              </a:ext>
+            </a:extLst>
+          </p:cNvPr>
+          <p:cNvSpPr>
+            <a:spLocks noGrp="1"/>
+          </p:cNvSpPr>
+          <p:nvPr>
+            <p:ph type="title"/>
           </p:nvPr>
         </p:nvSpPr>
         <p:spPr/>
         <p:txBody>
-          <a:bodyPr/>
+          <a:bodyPr>
+            <a:normAutofit/>
+          </a:bodyPr>
           <a:lstStyle/>
           <a:p>
             <a:r>
@@ -7127,93 +7290,15 @@
                 <a:ea typeface="Roboto" panose="02000000000000000000" pitchFamily="2" charset="0"/>
                 <a:cs typeface="Roboto" panose="02000000000000000000" pitchFamily="2" charset="0"/>
               </a:rPr>
-              <a:t>Merci de votre écoute</a:t>
-            </a:r>
-            <a:endParaRPr lang="fr-FR" b="1">
-              <a:latin typeface="Roboto" panose="02000000000000000000" pitchFamily="2" charset="0"/>
-              <a:ea typeface="Roboto" panose="02000000000000000000" pitchFamily="2" charset="0"/>
-              <a:cs typeface="Roboto" panose="02000000000000000000" pitchFamily="2" charset="0"/>
-            </a:endParaRPr>
-          </a:p>
-        </p:txBody>
-      </p:sp>
-      <p:sp>
-        <p:nvSpPr>
-          <p:cNvPr id="3" name="Sous-titre 2">
-            <a:extLst>
-              <a:ext uri="{FF2B5EF4-FFF2-40B4-BE49-F238E27FC236}">
-                <a16:creationId xmlns:a16="http://schemas.microsoft.com/office/drawing/2014/main" id="{F937CF57-DD8D-CC1A-0349-65589F61BAAE}"/>
-              </a:ext>
-            </a:extLst>
-          </p:cNvPr>
-          <p:cNvSpPr>
-            <a:spLocks noGrp="1"/>
-          </p:cNvSpPr>
-          <p:nvPr>
-            <p:ph type="subTitle" idx="1"/>
-          </p:nvPr>
-        </p:nvSpPr>
-        <p:spPr>
-          <a:xfrm>
-            <a:off x="1337982" y="3628932"/>
-            <a:ext cx="9516035" cy="1655762"/>
-          </a:xfrm>
-        </p:spPr>
-        <p:txBody>
-          <a:bodyPr anchor="ctr"/>
-          <a:lstStyle/>
-          <a:p>
-            <a:r>
-              <a:rPr lang="fr-FR">
-                <a:latin typeface="Roboto" panose="02000000000000000000" pitchFamily="2" charset="0"/>
-                <a:ea typeface="Roboto" panose="02000000000000000000" pitchFamily="2" charset="0"/>
-                <a:cs typeface="Roboto" panose="02000000000000000000" pitchFamily="2" charset="0"/>
-              </a:rPr>
-              <a:t>Présentation et recherches réalisées </a:t>
-            </a:r>
-            <a:r>
-              <a:rPr lang="fr-FR" b="1">
-                <a:latin typeface="Roboto" panose="02000000000000000000" pitchFamily="2" charset="0"/>
-                <a:ea typeface="Roboto" panose="02000000000000000000" pitchFamily="2" charset="0"/>
-                <a:cs typeface="Roboto" panose="02000000000000000000" pitchFamily="2" charset="0"/>
-              </a:rPr>
-              <a:t>sans</a:t>
-            </a:r>
-            <a:r>
-              <a:rPr lang="fr-FR">
-                <a:latin typeface="Roboto" panose="02000000000000000000" pitchFamily="2" charset="0"/>
-                <a:ea typeface="Roboto" panose="02000000000000000000" pitchFamily="2" charset="0"/>
-                <a:cs typeface="Roboto" panose="02000000000000000000" pitchFamily="2" charset="0"/>
-              </a:rPr>
-              <a:t> ChatGPT</a:t>
-            </a:r>
-            <a:endParaRPr lang="fr-FR" b="1">
-              <a:latin typeface="Roboto" panose="02000000000000000000" pitchFamily="2" charset="0"/>
-              <a:ea typeface="Roboto" panose="02000000000000000000" pitchFamily="2" charset="0"/>
-              <a:cs typeface="Roboto" panose="02000000000000000000" pitchFamily="2" charset="0"/>
-            </a:endParaRPr>
-          </a:p>
-          <a:p>
-            <a:r>
-              <a:rPr lang="fr-FR" b="1">
-                <a:latin typeface="Roboto" panose="02000000000000000000" pitchFamily="2" charset="0"/>
-                <a:ea typeface="Roboto" panose="02000000000000000000" pitchFamily="2" charset="0"/>
-                <a:cs typeface="Roboto" panose="02000000000000000000" pitchFamily="2" charset="0"/>
-              </a:rPr>
-              <a:t>#GPTFree</a:t>
-            </a:r>
-            <a:endParaRPr lang="fr-FR">
-              <a:latin typeface="Roboto" panose="02000000000000000000" pitchFamily="2" charset="0"/>
-              <a:ea typeface="Roboto" panose="02000000000000000000" pitchFamily="2" charset="0"/>
-              <a:cs typeface="Roboto" panose="02000000000000000000" pitchFamily="2" charset="0"/>
-            </a:endParaRPr>
+              <a:t>Sortons des sentiers battus et voyons plus loins que ce qu’on nous apprend.</a:t>
+            </a:r>
           </a:p>
         </p:txBody>
       </p:sp>
     </p:spTree>
     <p:extLst>
       <p:ext uri="{BB962C8B-B14F-4D97-AF65-F5344CB8AC3E}">
-        <p14:creationId xmlns:p14="http://schemas.microsoft.com/office/powerpoint/2010/main" val="850454818"/>
+        <p14:creationId xmlns:p14="http://schemas.microsoft.com/office/powerpoint/2010/main" val="1763687260"/>
       </p:ext>
     </p:extLst>
   </p:cSld>

</xml_diff>

<commit_message>
chore: update EXP presentation
</commit_message>
<xml_diff>
--- a/S4/EXP/files/À-t-on encore besoin d'ingénieurs.pptx
+++ b/S4/EXP/files/À-t-on encore besoin d'ingénieurs.pptx
@@ -140,18 +140,18 @@
   <pc:docChgLst>
     <pc:chgData name="Trüeb Guillaume" userId="cdddf057-9811-4cdd-8552-6ae0b8a7753d" providerId="ADAL" clId="{ECDFB03D-1764-5B4F-B940-9C9F945837E9}"/>
     <pc:docChg chg="undo custSel addSld delSld modSld">
-      <pc:chgData name="Trüeb Guillaume" userId="cdddf057-9811-4cdd-8552-6ae0b8a7753d" providerId="ADAL" clId="{ECDFB03D-1764-5B4F-B940-9C9F945837E9}" dt="2024-05-13T14:20:08.770" v="3975" actId="1076"/>
+      <pc:chgData name="Trüeb Guillaume" userId="cdddf057-9811-4cdd-8552-6ae0b8a7753d" providerId="ADAL" clId="{ECDFB03D-1764-5B4F-B940-9C9F945837E9}" dt="2024-06-03T09:19:18.431" v="3978" actId="113"/>
       <pc:docMkLst>
         <pc:docMk/>
       </pc:docMkLst>
       <pc:sldChg chg="modSp mod setBg modNotesTx">
-        <pc:chgData name="Trüeb Guillaume" userId="cdddf057-9811-4cdd-8552-6ae0b8a7753d" providerId="ADAL" clId="{ECDFB03D-1764-5B4F-B940-9C9F945837E9}" dt="2024-05-10T07:08:03.234" v="3714" actId="113"/>
+        <pc:chgData name="Trüeb Guillaume" userId="cdddf057-9811-4cdd-8552-6ae0b8a7753d" providerId="ADAL" clId="{ECDFB03D-1764-5B4F-B940-9C9F945837E9}" dt="2024-06-03T09:19:18.431" v="3978" actId="113"/>
         <pc:sldMkLst>
           <pc:docMk/>
           <pc:sldMk cId="624417057" sldId="256"/>
         </pc:sldMkLst>
         <pc:spChg chg="mod">
-          <ac:chgData name="Trüeb Guillaume" userId="cdddf057-9811-4cdd-8552-6ae0b8a7753d" providerId="ADAL" clId="{ECDFB03D-1764-5B4F-B940-9C9F945837E9}" dt="2024-05-10T07:08:03.234" v="3714" actId="113"/>
+          <ac:chgData name="Trüeb Guillaume" userId="cdddf057-9811-4cdd-8552-6ae0b8a7753d" providerId="ADAL" clId="{ECDFB03D-1764-5B4F-B940-9C9F945837E9}" dt="2024-06-03T09:19:18.431" v="3978" actId="113"/>
           <ac:spMkLst>
             <pc:docMk/>
             <pc:sldMk cId="624417057" sldId="256"/>
@@ -606,7 +606,7 @@
           </a:lstStyle>
           <a:p>
             <a:fld id="{E2C0E638-932B-6049-A64B-454D3CE5F309}" type="datetimeFigureOut">
-              <a:t>13/05/2024</a:t>
+              <a:t>03/06/2024</a:t>
             </a:fld>
             <a:endParaRPr lang="fr-FR"/>
           </a:p>
@@ -2018,7 +2018,7 @@
           <a:lstStyle/>
           <a:p>
             <a:fld id="{E58754B6-4E19-8F42-807C-F64A7D215DCD}" type="datetimeFigureOut">
-              <a:t>13/05/2024</a:t>
+              <a:t>03/06/2024</a:t>
             </a:fld>
             <a:endParaRPr lang="fr-FR"/>
           </a:p>
@@ -2214,7 +2214,7 @@
           <a:lstStyle/>
           <a:p>
             <a:fld id="{E58754B6-4E19-8F42-807C-F64A7D215DCD}" type="datetimeFigureOut">
-              <a:t>13/05/2024</a:t>
+              <a:t>03/06/2024</a:t>
             </a:fld>
             <a:endParaRPr lang="fr-FR"/>
           </a:p>
@@ -2420,7 +2420,7 @@
           <a:lstStyle/>
           <a:p>
             <a:fld id="{E58754B6-4E19-8F42-807C-F64A7D215DCD}" type="datetimeFigureOut">
-              <a:t>13/05/2024</a:t>
+              <a:t>03/06/2024</a:t>
             </a:fld>
             <a:endParaRPr lang="fr-FR"/>
           </a:p>
@@ -2616,7 +2616,7 @@
           <a:lstStyle/>
           <a:p>
             <a:fld id="{E58754B6-4E19-8F42-807C-F64A7D215DCD}" type="datetimeFigureOut">
-              <a:t>13/05/2024</a:t>
+              <a:t>03/06/2024</a:t>
             </a:fld>
             <a:endParaRPr lang="fr-FR"/>
           </a:p>
@@ -2889,7 +2889,7 @@
           <a:lstStyle/>
           <a:p>
             <a:fld id="{E58754B6-4E19-8F42-807C-F64A7D215DCD}" type="datetimeFigureOut">
-              <a:t>13/05/2024</a:t>
+              <a:t>03/06/2024</a:t>
             </a:fld>
             <a:endParaRPr lang="fr-FR"/>
           </a:p>
@@ -3152,7 +3152,7 @@
           <a:lstStyle/>
           <a:p>
             <a:fld id="{E58754B6-4E19-8F42-807C-F64A7D215DCD}" type="datetimeFigureOut">
-              <a:t>13/05/2024</a:t>
+              <a:t>03/06/2024</a:t>
             </a:fld>
             <a:endParaRPr lang="fr-FR"/>
           </a:p>
@@ -3562,7 +3562,7 @@
           <a:lstStyle/>
           <a:p>
             <a:fld id="{E58754B6-4E19-8F42-807C-F64A7D215DCD}" type="datetimeFigureOut">
-              <a:t>13/05/2024</a:t>
+              <a:t>03/06/2024</a:t>
             </a:fld>
             <a:endParaRPr lang="fr-FR"/>
           </a:p>
@@ -3701,7 +3701,7 @@
           <a:lstStyle/>
           <a:p>
             <a:fld id="{E58754B6-4E19-8F42-807C-F64A7D215DCD}" type="datetimeFigureOut">
-              <a:t>13/05/2024</a:t>
+              <a:t>03/06/2024</a:t>
             </a:fld>
             <a:endParaRPr lang="fr-FR"/>
           </a:p>
@@ -3812,7 +3812,7 @@
           <a:lstStyle/>
           <a:p>
             <a:fld id="{E58754B6-4E19-8F42-807C-F64A7D215DCD}" type="datetimeFigureOut">
-              <a:t>13/05/2024</a:t>
+              <a:t>03/06/2024</a:t>
             </a:fld>
             <a:endParaRPr lang="fr-FR"/>
           </a:p>
@@ -4121,7 +4121,7 @@
           <a:lstStyle/>
           <a:p>
             <a:fld id="{E58754B6-4E19-8F42-807C-F64A7D215DCD}" type="datetimeFigureOut">
-              <a:t>13/05/2024</a:t>
+              <a:t>03/06/2024</a:t>
             </a:fld>
             <a:endParaRPr lang="fr-FR"/>
           </a:p>
@@ -4407,7 +4407,7 @@
           <a:lstStyle/>
           <a:p>
             <a:fld id="{E58754B6-4E19-8F42-807C-F64A7D215DCD}" type="datetimeFigureOut">
-              <a:t>13/05/2024</a:t>
+              <a:t>03/06/2024</a:t>
             </a:fld>
             <a:endParaRPr lang="fr-FR"/>
           </a:p>
@@ -4646,7 +4646,7 @@
           </a:lstStyle>
           <a:p>
             <a:fld id="{E58754B6-4E19-8F42-807C-F64A7D215DCD}" type="datetimeFigureOut">
-              <a:t>13/05/2024</a:t>
+              <a:t>03/06/2024</a:t>
             </a:fld>
             <a:endParaRPr lang="fr-FR"/>
           </a:p>
@@ -5111,6 +5111,14 @@
                 <a:cs typeface="Roboto" panose="02000000000000000000" pitchFamily="2" charset="0"/>
               </a:rPr>
               <a:t>ingénieur-e-s</a:t>
+            </a:r>
+            <a:r>
+              <a:rPr lang="fr-FR">
+                <a:latin typeface="Roboto" panose="02000000000000000000" pitchFamily="2" charset="0"/>
+                <a:ea typeface="Roboto" panose="02000000000000000000" pitchFamily="2" charset="0"/>
+                <a:cs typeface="Roboto" panose="02000000000000000000" pitchFamily="2" charset="0"/>
+              </a:rPr>
+              <a:t> ?</a:t>
             </a:r>
           </a:p>
         </p:txBody>

</xml_diff>